<commit_message>
minor updates to week 4 lecture
</commit_message>
<xml_diff>
--- a/lectures/infrastructure-week-4.pptx
+++ b/lectures/infrastructure-week-4.pptx
@@ -146,6 +146,22 @@
       </a:defRPr>
     </a:lvl9pPr>
   </p:defaultTextStyle>
+  <p:extLst>
+    <p:ext uri="{EFAFB233-063F-42B5-8137-9DF3F51BA10A}">
+      <p15:sldGuideLst xmlns:p15="http://schemas.microsoft.com/office/powerpoint/2012/main">
+        <p15:guide id="1" orient="horz" pos="2160">
+          <p15:clr>
+            <a:srgbClr val="A4A3A4"/>
+          </p15:clr>
+        </p15:guide>
+        <p15:guide id="2" pos="2880">
+          <p15:clr>
+            <a:srgbClr val="A4A3A4"/>
+          </p15:clr>
+        </p15:guide>
+      </p15:sldGuideLst>
+    </p:ext>
+  </p:extLst>
 </p:presentation>
 </file>
 
@@ -3664,7 +3680,7 @@
           <a:p>
             <a:fld id="{A4F65825-1538-3A4D-944A-D06B0D1CBF06}" type="datetimeFigureOut">
               <a:rPr lang="en-US" smtClean="0"/>
-              <a:t>8/13/16</a:t>
+              <a:t>10/2/16</a:t>
             </a:fld>
             <a:endParaRPr lang="en-US"/>
           </a:p>
@@ -3834,7 +3850,7 @@
           <a:p>
             <a:fld id="{A4F65825-1538-3A4D-944A-D06B0D1CBF06}" type="datetimeFigureOut">
               <a:rPr lang="en-US" smtClean="0"/>
-              <a:t>8/13/16</a:t>
+              <a:t>10/2/16</a:t>
             </a:fld>
             <a:endParaRPr lang="en-US"/>
           </a:p>
@@ -4014,7 +4030,7 @@
           <a:p>
             <a:fld id="{A4F65825-1538-3A4D-944A-D06B0D1CBF06}" type="datetimeFigureOut">
               <a:rPr lang="en-US" smtClean="0"/>
-              <a:t>8/13/16</a:t>
+              <a:t>10/2/16</a:t>
             </a:fld>
             <a:endParaRPr lang="en-US"/>
           </a:p>
@@ -4184,7 +4200,7 @@
           <a:p>
             <a:fld id="{A4F65825-1538-3A4D-944A-D06B0D1CBF06}" type="datetimeFigureOut">
               <a:rPr lang="en-US" smtClean="0"/>
-              <a:t>8/13/16</a:t>
+              <a:t>10/2/16</a:t>
             </a:fld>
             <a:endParaRPr lang="en-US"/>
           </a:p>
@@ -4430,7 +4446,7 @@
           <a:p>
             <a:fld id="{A4F65825-1538-3A4D-944A-D06B0D1CBF06}" type="datetimeFigureOut">
               <a:rPr lang="en-US" smtClean="0"/>
-              <a:t>8/13/16</a:t>
+              <a:t>10/2/16</a:t>
             </a:fld>
             <a:endParaRPr lang="en-US"/>
           </a:p>
@@ -4718,7 +4734,7 @@
           <a:p>
             <a:fld id="{A4F65825-1538-3A4D-944A-D06B0D1CBF06}" type="datetimeFigureOut">
               <a:rPr lang="en-US" smtClean="0"/>
-              <a:t>8/13/16</a:t>
+              <a:t>10/2/16</a:t>
             </a:fld>
             <a:endParaRPr lang="en-US"/>
           </a:p>
@@ -5140,7 +5156,7 @@
           <a:p>
             <a:fld id="{A4F65825-1538-3A4D-944A-D06B0D1CBF06}" type="datetimeFigureOut">
               <a:rPr lang="en-US" smtClean="0"/>
-              <a:t>8/13/16</a:t>
+              <a:t>10/2/16</a:t>
             </a:fld>
             <a:endParaRPr lang="en-US"/>
           </a:p>
@@ -5258,7 +5274,7 @@
           <a:p>
             <a:fld id="{A4F65825-1538-3A4D-944A-D06B0D1CBF06}" type="datetimeFigureOut">
               <a:rPr lang="en-US" smtClean="0"/>
-              <a:t>8/13/16</a:t>
+              <a:t>10/2/16</a:t>
             </a:fld>
             <a:endParaRPr lang="en-US"/>
           </a:p>
@@ -5353,7 +5369,7 @@
           <a:p>
             <a:fld id="{A4F65825-1538-3A4D-944A-D06B0D1CBF06}" type="datetimeFigureOut">
               <a:rPr lang="en-US" smtClean="0"/>
-              <a:t>8/13/16</a:t>
+              <a:t>10/2/16</a:t>
             </a:fld>
             <a:endParaRPr lang="en-US"/>
           </a:p>
@@ -5630,7 +5646,7 @@
           <a:p>
             <a:fld id="{A4F65825-1538-3A4D-944A-D06B0D1CBF06}" type="datetimeFigureOut">
               <a:rPr lang="en-US" smtClean="0"/>
-              <a:t>8/13/16</a:t>
+              <a:t>10/2/16</a:t>
             </a:fld>
             <a:endParaRPr lang="en-US"/>
           </a:p>
@@ -5883,7 +5899,7 @@
           <a:p>
             <a:fld id="{A4F65825-1538-3A4D-944A-D06B0D1CBF06}" type="datetimeFigureOut">
               <a:rPr lang="en-US" smtClean="0"/>
-              <a:t>8/13/16</a:t>
+              <a:t>10/2/16</a:t>
             </a:fld>
             <a:endParaRPr lang="en-US"/>
           </a:p>
@@ -6096,7 +6112,7 @@
           <a:p>
             <a:fld id="{A4F65825-1538-3A4D-944A-D06B0D1CBF06}" type="datetimeFigureOut">
               <a:rPr lang="en-US" smtClean="0"/>
-              <a:t>8/13/16</a:t>
+              <a:t>10/2/16</a:t>
             </a:fld>
             <a:endParaRPr lang="en-US"/>
           </a:p>
@@ -6658,7 +6674,7 @@
   <p:timing>
     <p:tnLst>
       <p:par>
-        <p:cTn xmlns:p14="http://schemas.microsoft.com/office/powerpoint/2010/main" id="1" dur="indefinite" restart="never" nodeType="tmRoot"/>
+        <p:cTn id="1" dur="indefinite" restart="never" nodeType="tmRoot"/>
       </p:par>
     </p:tnLst>
   </p:timing>
@@ -6747,22 +6763,37 @@
             </a:r>
             <a:r>
               <a:rPr lang="en-US" dirty="0" smtClean="0"/>
-              <a:t> and Benjamin Black described what Amazon infrastructure should like and how it could be sold as a service</a:t>
-            </a:r>
-          </a:p>
-          <a:p>
-            <a:pPr lvl="1"/>
-            <a:r>
-              <a:rPr lang="en-US" dirty="0" smtClean="0"/>
-              <a:t>Simple Queue Service (SQS) launched in 2004</a:t>
-            </a:r>
-          </a:p>
-          <a:p>
-            <a:pPr lvl="1"/>
-            <a:r>
-              <a:rPr lang="en-US" dirty="0" smtClean="0"/>
-              <a:t>S3 &amp; EC2 (AWS) launched in 2006</a:t>
-            </a:r>
+              <a:t> and Benjamin Black described what Amazon infrastructure should like and how it could be sold as a </a:t>
+            </a:r>
+            <a:r>
+              <a:rPr lang="en-US" dirty="0" smtClean="0"/>
+              <a:t>service.</a:t>
+            </a:r>
+            <a:endParaRPr lang="en-US" dirty="0" smtClean="0"/>
+          </a:p>
+          <a:p>
+            <a:pPr lvl="1"/>
+            <a:r>
+              <a:rPr lang="en-US" dirty="0" smtClean="0"/>
+              <a:t>Simple Queue Service (SQS) launched in </a:t>
+            </a:r>
+            <a:r>
+              <a:rPr lang="en-US" dirty="0" smtClean="0"/>
+              <a:t>2004.</a:t>
+            </a:r>
+            <a:endParaRPr lang="en-US" dirty="0" smtClean="0"/>
+          </a:p>
+          <a:p>
+            <a:pPr lvl="1"/>
+            <a:r>
+              <a:rPr lang="en-US" dirty="0" smtClean="0"/>
+              <a:t>S3 &amp; EC2 (AWS) launched in </a:t>
+            </a:r>
+            <a:r>
+              <a:rPr lang="en-US" dirty="0" smtClean="0"/>
+              <a:t>2006.</a:t>
+            </a:r>
+            <a:endParaRPr lang="en-US" dirty="0" smtClean="0"/>
           </a:p>
           <a:p>
             <a:pPr lvl="1"/>
@@ -6792,8 +6823,13 @@
             </a:r>
             <a:r>
               <a:rPr lang="en-US" dirty="0" smtClean="0"/>
-              <a:t> runs on top of AWS (though on completely separate infrastructure)</a:t>
-            </a:r>
+              <a:t> runs on top of AWS (though on completely separate infrastructure</a:t>
+            </a:r>
+            <a:r>
+              <a:rPr lang="en-US" dirty="0" smtClean="0"/>
+              <a:t>).</a:t>
+            </a:r>
+            <a:endParaRPr lang="en-US" dirty="0" smtClean="0"/>
           </a:p>
           <a:p>
             <a:endParaRPr lang="en-US" dirty="0"/>
@@ -6813,7 +6849,7 @@
   <p:timing>
     <p:tnLst>
       <p:par>
-        <p:cTn xmlns:p14="http://schemas.microsoft.com/office/powerpoint/2010/main" id="1" dur="indefinite" restart="never" nodeType="tmRoot"/>
+        <p:cTn id="1" dur="indefinite" restart="never" nodeType="tmRoot"/>
       </p:par>
     </p:tnLst>
   </p:timing>
@@ -6879,35 +6915,55 @@
           <a:p>
             <a:r>
               <a:rPr lang="en-US" dirty="0" smtClean="0"/>
-              <a:t>AWS platform contains all of the services needed to reinforce concepts in this course</a:t>
-            </a:r>
-          </a:p>
-          <a:p>
-            <a:endParaRPr lang="en-US" dirty="0" smtClean="0"/>
-          </a:p>
-          <a:p>
-            <a:r>
-              <a:rPr lang="en-US" dirty="0" smtClean="0"/>
-              <a:t>IT professionals should understand how to use the most popular cloud platform</a:t>
-            </a:r>
-          </a:p>
-          <a:p>
-            <a:endParaRPr lang="en-US" dirty="0" smtClean="0"/>
-          </a:p>
-          <a:p>
-            <a:r>
-              <a:rPr lang="en-US" dirty="0" smtClean="0"/>
-              <a:t>Students receive educational credits for using AWS</a:t>
-            </a:r>
-          </a:p>
-          <a:p>
-            <a:endParaRPr lang="en-US" dirty="0" smtClean="0"/>
-          </a:p>
-          <a:p>
-            <a:r>
-              <a:rPr lang="en-US" dirty="0" smtClean="0"/>
-              <a:t>Course lectures based on AWS Solution Architect Certification training</a:t>
-            </a:r>
+              <a:t>AWS platform contains all of the services needed to reinforce concepts in this </a:t>
+            </a:r>
+            <a:r>
+              <a:rPr lang="en-US" dirty="0" smtClean="0"/>
+              <a:t>course.</a:t>
+            </a:r>
+            <a:endParaRPr lang="en-US" dirty="0" smtClean="0"/>
+          </a:p>
+          <a:p>
+            <a:endParaRPr lang="en-US" dirty="0" smtClean="0"/>
+          </a:p>
+          <a:p>
+            <a:r>
+              <a:rPr lang="en-US" dirty="0" smtClean="0"/>
+              <a:t>IT professionals should understand how to use the most popular cloud </a:t>
+            </a:r>
+            <a:r>
+              <a:rPr lang="en-US" dirty="0" smtClean="0"/>
+              <a:t>platform.</a:t>
+            </a:r>
+            <a:endParaRPr lang="en-US" dirty="0" smtClean="0"/>
+          </a:p>
+          <a:p>
+            <a:endParaRPr lang="en-US" dirty="0" smtClean="0"/>
+          </a:p>
+          <a:p>
+            <a:r>
+              <a:rPr lang="en-US" dirty="0" smtClean="0"/>
+              <a:t>Students receive educational credits for using </a:t>
+            </a:r>
+            <a:r>
+              <a:rPr lang="en-US" dirty="0" smtClean="0"/>
+              <a:t>AWS.</a:t>
+            </a:r>
+            <a:endParaRPr lang="en-US" dirty="0" smtClean="0"/>
+          </a:p>
+          <a:p>
+            <a:endParaRPr lang="en-US" dirty="0" smtClean="0"/>
+          </a:p>
+          <a:p>
+            <a:r>
+              <a:rPr lang="en-US" dirty="0" smtClean="0"/>
+              <a:t>Course lectures based on AWS Solution Architect Certification </a:t>
+            </a:r>
+            <a:r>
+              <a:rPr lang="en-US" dirty="0" smtClean="0"/>
+              <a:t>training.</a:t>
+            </a:r>
+            <a:endParaRPr lang="en-US" dirty="0" smtClean="0"/>
           </a:p>
         </p:txBody>
       </p:sp>
@@ -7126,8 +7182,8 @@
         </p:nvGrpSpPr>
         <p:grpSpPr>
           <a:xfrm>
-            <a:off x="790482" y="3061463"/>
-            <a:ext cx="7896318" cy="3394985"/>
+            <a:off x="1130157" y="3914455"/>
+            <a:ext cx="6744984" cy="2634461"/>
             <a:chOff x="790482" y="1956652"/>
             <a:chExt cx="7896318" cy="3394985"/>
           </a:xfrm>
@@ -7303,10 +7359,10 @@
             <a:p>
               <a:pPr algn="ctr"/>
               <a:r>
-                <a:rPr lang="en-US" sz="1200" dirty="0" smtClean="0"/>
+                <a:rPr lang="en-US" sz="1000" dirty="0" smtClean="0"/>
                 <a:t>Availability Zone</a:t>
               </a:r>
-              <a:endParaRPr lang="en-US" sz="1200" dirty="0"/>
+              <a:endParaRPr lang="en-US" sz="1000" dirty="0"/>
             </a:p>
           </p:txBody>
         </p:sp>
@@ -7345,10 +7401,10 @@
             <a:p>
               <a:pPr algn="ctr"/>
               <a:r>
-                <a:rPr lang="en-US" sz="1200" dirty="0" smtClean="0"/>
+                <a:rPr lang="en-US" sz="1000" dirty="0" smtClean="0"/>
                 <a:t>Availability Zone</a:t>
               </a:r>
-              <a:endParaRPr lang="en-US" sz="1200" dirty="0"/>
+              <a:endParaRPr lang="en-US" sz="1000" dirty="0"/>
             </a:p>
           </p:txBody>
         </p:sp>
@@ -7387,10 +7443,10 @@
             <a:p>
               <a:pPr algn="ctr"/>
               <a:r>
-                <a:rPr lang="en-US" sz="1200" dirty="0" smtClean="0"/>
+                <a:rPr lang="en-US" sz="1000" dirty="0" smtClean="0"/>
                 <a:t>Availability Zone</a:t>
               </a:r>
-              <a:endParaRPr lang="en-US" sz="1200" dirty="0"/>
+              <a:endParaRPr lang="en-US" sz="1000" dirty="0"/>
             </a:p>
           </p:txBody>
         </p:sp>
@@ -7429,10 +7485,10 @@
             <a:p>
               <a:pPr algn="ctr"/>
               <a:r>
-                <a:rPr lang="en-US" sz="1200" dirty="0" smtClean="0"/>
+                <a:rPr lang="en-US" sz="1000" dirty="0" smtClean="0"/>
                 <a:t>Availability Zone</a:t>
               </a:r>
-              <a:endParaRPr lang="en-US" sz="1200" dirty="0"/>
+              <a:endParaRPr lang="en-US" sz="1000" dirty="0"/>
             </a:p>
           </p:txBody>
         </p:sp>
@@ -7471,10 +7527,10 @@
             <a:p>
               <a:pPr algn="ctr"/>
               <a:r>
-                <a:rPr lang="en-US" sz="1200" dirty="0" smtClean="0"/>
+                <a:rPr lang="en-US" sz="1000" dirty="0" smtClean="0"/>
                 <a:t>Availability Zone</a:t>
               </a:r>
-              <a:endParaRPr lang="en-US" sz="1200" dirty="0"/>
+              <a:endParaRPr lang="en-US" sz="1000" dirty="0"/>
             </a:p>
           </p:txBody>
         </p:sp>
@@ -7513,10 +7569,10 @@
             <a:p>
               <a:pPr algn="ctr"/>
               <a:r>
-                <a:rPr lang="en-US" sz="1200" dirty="0" smtClean="0"/>
+                <a:rPr lang="en-US" sz="1000" dirty="0" smtClean="0"/>
                 <a:t>Availability Zone</a:t>
               </a:r>
-              <a:endParaRPr lang="en-US" sz="1200" dirty="0"/>
+              <a:endParaRPr lang="en-US" sz="1000" dirty="0"/>
             </a:p>
           </p:txBody>
         </p:sp>
@@ -7691,8 +7747,8 @@
         </p:nvSpPr>
         <p:spPr>
           <a:xfrm>
-            <a:off x="790482" y="1417639"/>
-            <a:ext cx="7693051" cy="1908215"/>
+            <a:off x="790483" y="1417640"/>
+            <a:ext cx="7896317" cy="2585323"/>
           </a:xfrm>
           <a:prstGeom prst="rect">
             <a:avLst/>
@@ -7710,37 +7766,36 @@
               <a:buChar char="•"/>
             </a:pPr>
             <a:r>
-              <a:rPr lang="en-US" sz="2000" dirty="0" smtClean="0"/>
+              <a:rPr lang="en-US" dirty="0" smtClean="0"/>
               <a:t>AWS Infrastructure partitioned into many </a:t>
             </a:r>
             <a:r>
-              <a:rPr lang="en-US" sz="2000" b="1" dirty="0" smtClean="0"/>
+              <a:rPr lang="en-US" b="1" dirty="0" smtClean="0"/>
               <a:t>regions</a:t>
             </a:r>
             <a:r>
-              <a:rPr lang="en-US" sz="2000" dirty="0" smtClean="0"/>
+              <a:rPr lang="en-US" dirty="0" smtClean="0"/>
               <a:t>, each of which contains one or more </a:t>
             </a:r>
             <a:r>
-              <a:rPr lang="en-US" sz="2000" b="1" dirty="0" smtClean="0"/>
+              <a:rPr lang="en-US" b="1" dirty="0" smtClean="0"/>
               <a:t>availability zones </a:t>
             </a:r>
             <a:r>
-              <a:rPr lang="en-US" sz="2000" dirty="0" smtClean="0"/>
-              <a:t>(AZs)</a:t>
-            </a:r>
-            <a:endParaRPr lang="en-US" sz="2000" b="1" dirty="0" smtClean="0"/>
+              <a:rPr lang="en-US" dirty="0" smtClean="0"/>
+              <a:t>(AZs</a:t>
+            </a:r>
+            <a:r>
+              <a:rPr lang="en-US" dirty="0" smtClean="0"/>
+              <a:t>).</a:t>
+            </a:r>
           </a:p>
           <a:p>
             <a:pPr marL="285750" indent="-285750">
               <a:buFont typeface="Arial"/>
               <a:buChar char="•"/>
             </a:pPr>
-            <a:r>
-              <a:rPr lang="en-US" sz="2000" dirty="0" smtClean="0"/>
-              <a:t>Regions are in completely separate physical parts of the world</a:t>
-            </a:r>
-            <a:endParaRPr lang="en-US" sz="2000" dirty="0"/>
+            <a:endParaRPr lang="en-US" b="1" dirty="0" smtClean="0"/>
           </a:p>
           <a:p>
             <a:pPr marL="285750" indent="-285750">
@@ -7748,8 +7803,12 @@
               <a:buChar char="•"/>
             </a:pPr>
             <a:r>
-              <a:rPr lang="en-US" sz="2000" dirty="0" smtClean="0"/>
-              <a:t>AZs represent datacenters within a particular region </a:t>
+              <a:rPr lang="en-US" dirty="0" smtClean="0"/>
+              <a:t>Regions are in completely separate physical parts of the </a:t>
+            </a:r>
+            <a:r>
+              <a:rPr lang="en-US" dirty="0" smtClean="0"/>
+              <a:t>world.</a:t>
             </a:r>
           </a:p>
           <a:p>
@@ -7757,10 +7816,43 @@
               <a:buFont typeface="Arial"/>
               <a:buChar char="•"/>
             </a:pPr>
-            <a:r>
-              <a:rPr lang="en-US" sz="2000" dirty="0" smtClean="0"/>
-              <a:t>Note: Not all services are available in every region</a:t>
-            </a:r>
+            <a:endParaRPr lang="en-US" dirty="0"/>
+          </a:p>
+          <a:p>
+            <a:pPr marL="285750" indent="-285750">
+              <a:buFont typeface="Arial"/>
+              <a:buChar char="•"/>
+            </a:pPr>
+            <a:r>
+              <a:rPr lang="en-US" dirty="0" smtClean="0"/>
+              <a:t>AZs represent datacenters within a particular </a:t>
+            </a:r>
+            <a:r>
+              <a:rPr lang="en-US" dirty="0" smtClean="0"/>
+              <a:t>region.</a:t>
+            </a:r>
+          </a:p>
+          <a:p>
+            <a:pPr marL="285750" indent="-285750">
+              <a:buFont typeface="Arial"/>
+              <a:buChar char="•"/>
+            </a:pPr>
+            <a:endParaRPr lang="en-US" dirty="0" smtClean="0"/>
+          </a:p>
+          <a:p>
+            <a:pPr marL="285750" indent="-285750">
+              <a:buFont typeface="Arial"/>
+              <a:buChar char="•"/>
+            </a:pPr>
+            <a:r>
+              <a:rPr lang="en-US" dirty="0" smtClean="0"/>
+              <a:t>Note: Not all services are available in every </a:t>
+            </a:r>
+            <a:r>
+              <a:rPr lang="en-US" dirty="0" smtClean="0"/>
+              <a:t>region.</a:t>
+            </a:r>
+            <a:endParaRPr lang="en-US" dirty="0" smtClean="0"/>
           </a:p>
           <a:p>
             <a:endParaRPr lang="en-US" dirty="0"/>
@@ -7846,17 +7938,27 @@
           <a:p>
             <a:r>
               <a:rPr lang="en-US" dirty="0" smtClean="0"/>
-              <a:t>IAM allows organizations to create users and manage their access to AWS resources</a:t>
-            </a:r>
-          </a:p>
-          <a:p>
-            <a:endParaRPr lang="en-US" dirty="0" smtClean="0"/>
-          </a:p>
-          <a:p>
-            <a:r>
-              <a:rPr lang="en-US" dirty="0" smtClean="0"/>
-              <a:t>Provides granular governance controls and federated access</a:t>
-            </a:r>
+              <a:t>IAM allows organizations to create users and manage their access to AWS </a:t>
+            </a:r>
+            <a:r>
+              <a:rPr lang="en-US" dirty="0" smtClean="0"/>
+              <a:t>resources.</a:t>
+            </a:r>
+            <a:endParaRPr lang="en-US" dirty="0" smtClean="0"/>
+          </a:p>
+          <a:p>
+            <a:endParaRPr lang="en-US" dirty="0" smtClean="0"/>
+          </a:p>
+          <a:p>
+            <a:r>
+              <a:rPr lang="en-US" dirty="0" smtClean="0"/>
+              <a:t>Provides granular governance controls and federated </a:t>
+            </a:r>
+            <a:r>
+              <a:rPr lang="en-US" dirty="0" smtClean="0"/>
+              <a:t>access.</a:t>
+            </a:r>
+            <a:endParaRPr lang="en-US" dirty="0" smtClean="0"/>
           </a:p>
           <a:p>
             <a:pPr lvl="1"/>
@@ -7884,7 +7986,19 @@
           <a:p>
             <a:r>
               <a:rPr lang="en-US" dirty="0" smtClean="0"/>
-              <a:t>Signup account (root account) is your master account, best practice is not to use it for day-to-day management</a:t>
+              <a:t>Signup account (root account) is your master account, best practice is </a:t>
+            </a:r>
+            <a:r>
+              <a:rPr lang="en-US" b="1" dirty="0" smtClean="0"/>
+              <a:t>not</a:t>
+            </a:r>
+            <a:r>
+              <a:rPr lang="en-US" dirty="0" smtClean="0"/>
+              <a:t> to use it for day-to-day </a:t>
+            </a:r>
+            <a:r>
+              <a:rPr lang="en-US" dirty="0" smtClean="0"/>
+              <a:t>management.</a:t>
             </a:r>
             <a:endParaRPr lang="en-US" dirty="0"/>
           </a:p>
@@ -8062,8 +8176,13 @@
             </a:r>
             <a:r>
               <a:rPr lang="en-US" dirty="0" smtClean="0"/>
-              <a:t>: an individual setup with an account in IAM</a:t>
-            </a:r>
+              <a:t>: an individual setup with an account in </a:t>
+            </a:r>
+            <a:r>
+              <a:rPr lang="en-US" dirty="0" smtClean="0"/>
+              <a:t>IAM.</a:t>
+            </a:r>
+            <a:endParaRPr lang="en-US" dirty="0" smtClean="0"/>
           </a:p>
           <a:p>
             <a:endParaRPr lang="en-US" dirty="0" smtClean="0"/>
@@ -8075,8 +8194,13 @@
             </a:r>
             <a:r>
               <a:rPr lang="en-US" dirty="0" smtClean="0"/>
-              <a:t>: a set of users sharing similar access privileges</a:t>
-            </a:r>
+              <a:t>: a set of users sharing similar access </a:t>
+            </a:r>
+            <a:r>
+              <a:rPr lang="en-US" dirty="0" smtClean="0"/>
+              <a:t>privileges.</a:t>
+            </a:r>
+            <a:endParaRPr lang="en-US" dirty="0" smtClean="0"/>
           </a:p>
           <a:p>
             <a:endParaRPr lang="en-US" dirty="0" smtClean="0"/>
@@ -8088,15 +8212,25 @@
             </a:r>
             <a:r>
               <a:rPr lang="en-US" dirty="0" smtClean="0"/>
-              <a:t>: access privileges that may be assigned to AWS resources</a:t>
-            </a:r>
-          </a:p>
-          <a:p>
-            <a:pPr lvl="1"/>
-            <a:r>
-              <a:rPr lang="en-US" dirty="0" smtClean="0"/>
-              <a:t>Lets resources act like users with specific privileges</a:t>
-            </a:r>
+              <a:t>: access privileges that may be assigned to AWS </a:t>
+            </a:r>
+            <a:r>
+              <a:rPr lang="en-US" dirty="0" smtClean="0"/>
+              <a:t>resources.</a:t>
+            </a:r>
+            <a:endParaRPr lang="en-US" dirty="0" smtClean="0"/>
+          </a:p>
+          <a:p>
+            <a:pPr lvl="1"/>
+            <a:r>
+              <a:rPr lang="en-US" dirty="0" smtClean="0"/>
+              <a:t>Lets resources act like users with specific </a:t>
+            </a:r>
+            <a:r>
+              <a:rPr lang="en-US" dirty="0" smtClean="0"/>
+              <a:t>privileges.</a:t>
+            </a:r>
+            <a:endParaRPr lang="en-US" dirty="0" smtClean="0"/>
           </a:p>
           <a:p>
             <a:pPr lvl="1"/>
@@ -8109,7 +8243,11 @@
             </a:r>
             <a:r>
               <a:rPr lang="en-US" dirty="0" smtClean="0"/>
-              <a:t>: a document containing one or more defined privileges</a:t>
+              <a:t>: a document containing one or more defined </a:t>
+            </a:r>
+            <a:r>
+              <a:rPr lang="en-US" dirty="0" smtClean="0"/>
+              <a:t>privileges.</a:t>
             </a:r>
             <a:endParaRPr lang="en-US" dirty="0"/>
           </a:p>
@@ -8195,35 +8333,55 @@
             </a:r>
             <a:r>
               <a:rPr lang="en-US" dirty="0" smtClean="0"/>
-              <a:t>, any changes we make impact all regions</a:t>
-            </a:r>
-          </a:p>
-          <a:p>
-            <a:endParaRPr lang="en-US" dirty="0" smtClean="0"/>
-          </a:p>
-          <a:p>
-            <a:r>
-              <a:rPr lang="en-US" dirty="0" smtClean="0"/>
-              <a:t>All activities we do on the web console may also be done via command line or SDK</a:t>
-            </a:r>
-          </a:p>
-          <a:p>
-            <a:endParaRPr lang="en-US" dirty="0" smtClean="0"/>
-          </a:p>
-          <a:p>
-            <a:r>
-              <a:rPr lang="en-US" dirty="0" smtClean="0"/>
-              <a:t>IAM users sign-in link is the web login URL for users (and it may be customized)</a:t>
-            </a:r>
-          </a:p>
-          <a:p>
-            <a:endParaRPr lang="en-US" dirty="0" smtClean="0"/>
-          </a:p>
-          <a:p>
-            <a:r>
-              <a:rPr lang="en-US" dirty="0" smtClean="0"/>
-              <a:t>IAM Security Status shows important security steps (recommend turning on MFA)</a:t>
-            </a:r>
+              <a:t>, any changes we make impact all </a:t>
+            </a:r>
+            <a:r>
+              <a:rPr lang="en-US" dirty="0" smtClean="0"/>
+              <a:t>regions.</a:t>
+            </a:r>
+            <a:endParaRPr lang="en-US" dirty="0" smtClean="0"/>
+          </a:p>
+          <a:p>
+            <a:endParaRPr lang="en-US" dirty="0" smtClean="0"/>
+          </a:p>
+          <a:p>
+            <a:r>
+              <a:rPr lang="en-US" dirty="0" smtClean="0"/>
+              <a:t>All activities we do on the web console may also be done via command line or </a:t>
+            </a:r>
+            <a:r>
+              <a:rPr lang="en-US" dirty="0" smtClean="0"/>
+              <a:t>SDK.</a:t>
+            </a:r>
+            <a:endParaRPr lang="en-US" dirty="0" smtClean="0"/>
+          </a:p>
+          <a:p>
+            <a:endParaRPr lang="en-US" dirty="0" smtClean="0"/>
+          </a:p>
+          <a:p>
+            <a:r>
+              <a:rPr lang="en-US" dirty="0" smtClean="0"/>
+              <a:t>IAM users sign-in link is the web login URL for users (and it may be customized</a:t>
+            </a:r>
+            <a:r>
+              <a:rPr lang="en-US" dirty="0" smtClean="0"/>
+              <a:t>).</a:t>
+            </a:r>
+            <a:endParaRPr lang="en-US" dirty="0" smtClean="0"/>
+          </a:p>
+          <a:p>
+            <a:endParaRPr lang="en-US" dirty="0" smtClean="0"/>
+          </a:p>
+          <a:p>
+            <a:r>
+              <a:rPr lang="en-US" dirty="0" smtClean="0"/>
+              <a:t>IAM Security Status shows important security steps (recommend turning on MFA</a:t>
+            </a:r>
+            <a:r>
+              <a:rPr lang="en-US" dirty="0" smtClean="0"/>
+              <a:t>).</a:t>
+            </a:r>
+            <a:endParaRPr lang="en-US" dirty="0" smtClean="0"/>
           </a:p>
           <a:p>
             <a:endParaRPr lang="en-US" dirty="0" smtClean="0"/>
@@ -8342,15 +8500,25 @@
             <a:pPr lvl="1"/>
             <a:r>
               <a:rPr lang="en-US" dirty="0" smtClean="0"/>
-              <a:t>Each user has a user name, password, access key ID, and secret access key</a:t>
-            </a:r>
-          </a:p>
-          <a:p>
-            <a:pPr lvl="1"/>
-            <a:r>
-              <a:rPr lang="en-US" dirty="0" smtClean="0"/>
-              <a:t>User name and password required to log into web console</a:t>
-            </a:r>
+              <a:t>Each user has a user name, password, access key ID, and secret access </a:t>
+            </a:r>
+            <a:r>
+              <a:rPr lang="en-US" dirty="0" smtClean="0"/>
+              <a:t>key.</a:t>
+            </a:r>
+            <a:endParaRPr lang="en-US" dirty="0" smtClean="0"/>
+          </a:p>
+          <a:p>
+            <a:pPr lvl="1"/>
+            <a:r>
+              <a:rPr lang="en-US" dirty="0" smtClean="0"/>
+              <a:t>User name and password required to log into web </a:t>
+            </a:r>
+            <a:r>
+              <a:rPr lang="en-US" dirty="0" smtClean="0"/>
+              <a:t>console.</a:t>
+            </a:r>
+            <a:endParaRPr lang="en-US" dirty="0" smtClean="0"/>
           </a:p>
           <a:p>
             <a:pPr lvl="1"/>
@@ -8373,15 +8541,25 @@
             <a:pPr lvl="1"/>
             <a:r>
               <a:rPr lang="en-US" dirty="0" smtClean="0"/>
-              <a:t>Each group has one or more policies attached</a:t>
-            </a:r>
-          </a:p>
-          <a:p>
-            <a:pPr lvl="1"/>
-            <a:r>
-              <a:rPr lang="en-US" dirty="0" smtClean="0"/>
-              <a:t>Policies define access privileges for group members</a:t>
-            </a:r>
+              <a:t>Each group has one or more policies </a:t>
+            </a:r>
+            <a:r>
+              <a:rPr lang="en-US" dirty="0" smtClean="0"/>
+              <a:t>attached.</a:t>
+            </a:r>
+            <a:endParaRPr lang="en-US" dirty="0" smtClean="0"/>
+          </a:p>
+          <a:p>
+            <a:pPr lvl="1"/>
+            <a:r>
+              <a:rPr lang="en-US" dirty="0" smtClean="0"/>
+              <a:t>Policies define access privileges for group </a:t>
+            </a:r>
+            <a:r>
+              <a:rPr lang="en-US" dirty="0" smtClean="0"/>
+              <a:t>members.</a:t>
+            </a:r>
+            <a:endParaRPr lang="en-US" dirty="0" smtClean="0"/>
           </a:p>
           <a:p>
             <a:pPr lvl="1"/>
@@ -8397,8 +8575,13 @@
             <a:pPr lvl="1"/>
             <a:r>
               <a:rPr lang="en-US" dirty="0" smtClean="0"/>
-              <a:t>Define password strength/expiration requirements</a:t>
-            </a:r>
+              <a:t>Define password strength/expiration </a:t>
+            </a:r>
+            <a:r>
+              <a:rPr lang="en-US" dirty="0" smtClean="0"/>
+              <a:t>requirements.</a:t>
+            </a:r>
+            <a:endParaRPr lang="en-US" dirty="0" smtClean="0"/>
           </a:p>
           <a:p>
             <a:pPr lvl="1"/>
@@ -8414,15 +8597,25 @@
             <a:pPr lvl="1"/>
             <a:r>
               <a:rPr lang="en-US" dirty="0" smtClean="0"/>
-              <a:t>Allow a resource to access other resources with set privileges</a:t>
-            </a:r>
-          </a:p>
-          <a:p>
-            <a:pPr lvl="1"/>
-            <a:r>
-              <a:rPr lang="en-US" dirty="0" smtClean="0"/>
-              <a:t>Example: Allow webserver on EC2 to retrieve files stored on S3</a:t>
-            </a:r>
+              <a:t>Allow a resource to access other resources with set </a:t>
+            </a:r>
+            <a:r>
+              <a:rPr lang="en-US" dirty="0" smtClean="0"/>
+              <a:t>privileges.</a:t>
+            </a:r>
+            <a:endParaRPr lang="en-US" dirty="0" smtClean="0"/>
+          </a:p>
+          <a:p>
+            <a:pPr lvl="1"/>
+            <a:r>
+              <a:rPr lang="en-US" dirty="0" smtClean="0"/>
+              <a:t>Example: Allow webserver on EC2 to retrieve files stored on </a:t>
+            </a:r>
+            <a:r>
+              <a:rPr lang="en-US" dirty="0" smtClean="0"/>
+              <a:t>S3.</a:t>
+            </a:r>
+            <a:endParaRPr lang="en-US" dirty="0" smtClean="0"/>
           </a:p>
         </p:txBody>
       </p:sp>
@@ -8541,7 +8734,7 @@
   <p:timing>
     <p:tnLst>
       <p:par>
-        <p:cTn xmlns:p14="http://schemas.microsoft.com/office/powerpoint/2010/main" id="1" dur="indefinite" restart="never" nodeType="tmRoot"/>
+        <p:cTn id="1" dur="indefinite" restart="never" nodeType="tmRoot"/>
       </p:par>
     </p:tnLst>
   </p:timing>
@@ -8606,7 +8799,7 @@
         </p:spPr>
         <p:txBody>
           <a:bodyPr>
-            <a:normAutofit fontScale="77500" lnSpcReduction="20000"/>
+            <a:normAutofit fontScale="70000" lnSpcReduction="20000"/>
           </a:bodyPr>
           <a:lstStyle/>
           <a:p>
@@ -8633,8 +8826,13 @@
             <a:pPr lvl="2"/>
             <a:r>
               <a:rPr lang="en-US" dirty="0" smtClean="0"/>
-              <a:t>Value = file data</a:t>
-            </a:r>
+              <a:t>Value = </a:t>
+            </a:r>
+            <a:r>
+              <a:rPr lang="en-US" dirty="0" smtClean="0"/>
+              <a:t>data</a:t>
+            </a:r>
+            <a:endParaRPr lang="en-US" dirty="0" smtClean="0"/>
           </a:p>
           <a:p>
             <a:pPr lvl="2"/>
@@ -8658,15 +8856,31 @@
             <a:pPr lvl="1"/>
             <a:r>
               <a:rPr lang="en-US" dirty="0" smtClean="0"/>
-              <a:t>Standard S3 data is stored across multiple AZs in a region (11 9’s durability: 99.999999999%)</a:t>
-            </a:r>
-          </a:p>
-          <a:p>
-            <a:pPr lvl="1"/>
-            <a:r>
-              <a:rPr lang="en-US" dirty="0" smtClean="0"/>
-              <a:t>Highly available: 4 9’s availability (99.99%)</a:t>
-            </a:r>
+              <a:t>Standard S3 data is stored across multiple AZs in a region (11 9’s durability: 99.999999999</a:t>
+            </a:r>
+            <a:r>
+              <a:rPr lang="en-US" dirty="0" smtClean="0"/>
+              <a:t>%)</a:t>
+            </a:r>
+          </a:p>
+          <a:p>
+            <a:pPr lvl="1"/>
+            <a:endParaRPr lang="en-US" dirty="0" smtClean="0"/>
+          </a:p>
+          <a:p>
+            <a:pPr lvl="1"/>
+            <a:r>
+              <a:rPr lang="en-US" dirty="0" smtClean="0"/>
+              <a:t>Highly available: 4 9’s availability (99.99</a:t>
+            </a:r>
+            <a:r>
+              <a:rPr lang="en-US" dirty="0" smtClean="0"/>
+              <a:t>%)</a:t>
+            </a:r>
+          </a:p>
+          <a:p>
+            <a:pPr lvl="1"/>
+            <a:endParaRPr lang="en-US" dirty="0" smtClean="0"/>
           </a:p>
           <a:p>
             <a:pPr lvl="1"/>
@@ -8689,7 +8903,15 @@
           <a:p>
             <a:r>
               <a:rPr lang="en-US" dirty="0" smtClean="0"/>
-              <a:t>You cannot install a file system on S3 or use for database storage!</a:t>
+              <a:t>You </a:t>
+            </a:r>
+            <a:r>
+              <a:rPr lang="en-US" u="sng" dirty="0" smtClean="0"/>
+              <a:t>cannot</a:t>
+            </a:r>
+            <a:r>
+              <a:rPr lang="en-US" dirty="0" smtClean="0"/>
+              <a:t> install a file system on S3 or use for database storage!</a:t>
             </a:r>
           </a:p>
           <a:p>
@@ -8795,13 +9017,21 @@
         </p:spPr>
         <p:txBody>
           <a:bodyPr>
-            <a:normAutofit fontScale="92500" lnSpcReduction="20000"/>
+            <a:normAutofit fontScale="85000" lnSpcReduction="20000"/>
           </a:bodyPr>
           <a:lstStyle/>
           <a:p>
             <a:r>
               <a:rPr lang="en-US" dirty="0" smtClean="0"/>
-              <a:t>S3 storage namespace partitioned into </a:t>
+              <a:t>S3 storage namespace </a:t>
+            </a:r>
+            <a:r>
+              <a:rPr lang="en-US" dirty="0" smtClean="0"/>
+              <a:t>is partitioned </a:t>
+            </a:r>
+            <a:r>
+              <a:rPr lang="en-US" dirty="0" smtClean="0"/>
+              <a:t>into </a:t>
             </a:r>
             <a:r>
               <a:rPr lang="en-US" b="1" dirty="0" smtClean="0"/>
@@ -8809,15 +9039,28 @@
             </a:r>
             <a:r>
               <a:rPr lang="en-US" dirty="0" smtClean="0"/>
-              <a:t> in each region</a:t>
-            </a:r>
-          </a:p>
-          <a:p>
-            <a:pPr lvl="1"/>
-            <a:r>
-              <a:rPr lang="en-US" dirty="0" smtClean="0"/>
-              <a:t>Files are stored in a bucket</a:t>
-            </a:r>
+              <a:t> in each </a:t>
+            </a:r>
+            <a:r>
+              <a:rPr lang="en-US" dirty="0" smtClean="0"/>
+              <a:t>region.</a:t>
+            </a:r>
+            <a:endParaRPr lang="en-US" dirty="0" smtClean="0"/>
+          </a:p>
+          <a:p>
+            <a:pPr lvl="1"/>
+            <a:r>
+              <a:rPr lang="en-US" dirty="0" smtClean="0"/>
+              <a:t>Files are stored in a </a:t>
+            </a:r>
+            <a:r>
+              <a:rPr lang="en-US" dirty="0" smtClean="0"/>
+              <a:t>bucket.</a:t>
+            </a:r>
+          </a:p>
+          <a:p>
+            <a:pPr lvl="1"/>
+            <a:endParaRPr lang="en-US" dirty="0" smtClean="0"/>
           </a:p>
           <a:p>
             <a:pPr lvl="1"/>
@@ -8831,15 +9074,28 @@
             </a:r>
             <a:r>
               <a:rPr lang="en-US" dirty="0" smtClean="0"/>
-              <a:t> and must be unique</a:t>
-            </a:r>
-          </a:p>
-          <a:p>
-            <a:pPr lvl="1"/>
-            <a:r>
-              <a:rPr lang="en-US" dirty="0" smtClean="0"/>
-              <a:t>Limit of 100 buckets per account (but can be increased)</a:t>
-            </a:r>
+              <a:t> and must be </a:t>
+            </a:r>
+            <a:r>
+              <a:rPr lang="en-US" dirty="0" smtClean="0"/>
+              <a:t>unique.</a:t>
+            </a:r>
+          </a:p>
+          <a:p>
+            <a:pPr lvl="1"/>
+            <a:endParaRPr lang="en-US" dirty="0" smtClean="0"/>
+          </a:p>
+          <a:p>
+            <a:pPr lvl="1"/>
+            <a:r>
+              <a:rPr lang="en-US" dirty="0" smtClean="0"/>
+              <a:t>Limit of 100 buckets per account (but can be increased</a:t>
+            </a:r>
+            <a:r>
+              <a:rPr lang="en-US" dirty="0" smtClean="0"/>
+              <a:t>).</a:t>
+            </a:r>
+            <a:endParaRPr lang="en-US" dirty="0" smtClean="0"/>
           </a:p>
           <a:p>
             <a:pPr lvl="1"/>
@@ -8963,29 +9219,49 @@
             </a:r>
             <a:r>
               <a:rPr lang="en-US" dirty="0" smtClean="0"/>
-              <a:t>et access control policies on a bucket level or a per-file level</a:t>
-            </a:r>
-          </a:p>
-          <a:p>
-            <a:pPr lvl="1"/>
-            <a:r>
-              <a:rPr lang="en-US" dirty="0" smtClean="0"/>
-              <a:t>Encrypt data-at-rest for greater security (AES-256)</a:t>
-            </a:r>
-          </a:p>
-          <a:p>
-            <a:pPr lvl="1"/>
-            <a:r>
-              <a:rPr lang="en-US" dirty="0" smtClean="0"/>
-              <a:t>Transmit data via SSL/TLS</a:t>
-            </a:r>
-          </a:p>
-          <a:p>
-            <a:pPr lvl="1"/>
-            <a:r>
-              <a:rPr lang="en-US" dirty="0" smtClean="0"/>
-              <a:t>Create logs tracking all access to buckets and files</a:t>
-            </a:r>
+              <a:t>et access control policies on a bucket level or a per-file </a:t>
+            </a:r>
+            <a:r>
+              <a:rPr lang="en-US" dirty="0" smtClean="0"/>
+              <a:t>level.</a:t>
+            </a:r>
+            <a:endParaRPr lang="en-US" dirty="0" smtClean="0"/>
+          </a:p>
+          <a:p>
+            <a:pPr lvl="1"/>
+            <a:r>
+              <a:rPr lang="en-US" dirty="0" smtClean="0"/>
+              <a:t>Encrypt data-at-rest for greater security (AES-256</a:t>
+            </a:r>
+            <a:r>
+              <a:rPr lang="en-US" dirty="0" smtClean="0"/>
+              <a:t>).</a:t>
+            </a:r>
+            <a:endParaRPr lang="en-US" dirty="0" smtClean="0"/>
+          </a:p>
+          <a:p>
+            <a:pPr lvl="1"/>
+            <a:r>
+              <a:rPr lang="en-US" dirty="0" smtClean="0"/>
+              <a:t>Transmit data </a:t>
+            </a:r>
+            <a:r>
+              <a:rPr lang="en-US" dirty="0" smtClean="0"/>
+              <a:t>to S3 via SSL/TLS.</a:t>
+            </a:r>
+            <a:endParaRPr lang="en-US" dirty="0" smtClean="0"/>
+          </a:p>
+          <a:p>
+            <a:pPr lvl="1"/>
+            <a:r>
+              <a:rPr lang="en-US" dirty="0" smtClean="0"/>
+              <a:t>Create logs tracking all access to buckets and </a:t>
+            </a:r>
+            <a:r>
+              <a:rPr lang="en-US" dirty="0" smtClean="0"/>
+              <a:t>files.</a:t>
+            </a:r>
+            <a:endParaRPr lang="en-US" dirty="0" smtClean="0"/>
           </a:p>
           <a:p>
             <a:pPr lvl="1"/>
@@ -9001,15 +9277,25 @@
             <a:pPr lvl="1"/>
             <a:r>
               <a:rPr lang="en-US" dirty="0" smtClean="0"/>
-              <a:t>Pay for storage space per GB, number of requests (GET, PUT, etc.) and data transmission</a:t>
-            </a:r>
+              <a:t>Pay for storage space per GB, number of requests (GET, PUT, etc.) and data </a:t>
+            </a:r>
+            <a:r>
+              <a:rPr lang="en-US" dirty="0" smtClean="0"/>
+              <a:t>transmission.</a:t>
+            </a:r>
+            <a:endParaRPr lang="en-US" dirty="0" smtClean="0"/>
           </a:p>
           <a:p>
             <a:pPr lvl="2"/>
             <a:r>
               <a:rPr lang="en-US" dirty="0" smtClean="0"/>
-              <a:t>No fee for incoming data</a:t>
-            </a:r>
+              <a:t>No fee for incoming </a:t>
+            </a:r>
+            <a:r>
+              <a:rPr lang="en-US" dirty="0" smtClean="0"/>
+              <a:t>data.</a:t>
+            </a:r>
+            <a:endParaRPr lang="en-US" dirty="0" smtClean="0"/>
           </a:p>
           <a:p>
             <a:pPr lvl="1"/>
@@ -9025,22 +9311,37 @@
             <a:pPr lvl="1"/>
             <a:r>
               <a:rPr lang="en-US" dirty="0" smtClean="0"/>
-              <a:t>Tiered storage options for increased performance or lower cost</a:t>
-            </a:r>
-          </a:p>
-          <a:p>
-            <a:pPr lvl="1"/>
-            <a:r>
-              <a:rPr lang="en-US" dirty="0" smtClean="0"/>
-              <a:t>Lifecycle management to automatically delete or archive data</a:t>
-            </a:r>
-          </a:p>
-          <a:p>
-            <a:pPr lvl="1"/>
-            <a:r>
-              <a:rPr lang="en-US" dirty="0" smtClean="0"/>
-              <a:t>Versioning to track changes to file</a:t>
-            </a:r>
+              <a:t>Tiered storage options for increased performance or lower </a:t>
+            </a:r>
+            <a:r>
+              <a:rPr lang="en-US" dirty="0" smtClean="0"/>
+              <a:t>cost.</a:t>
+            </a:r>
+            <a:endParaRPr lang="en-US" dirty="0" smtClean="0"/>
+          </a:p>
+          <a:p>
+            <a:pPr lvl="1"/>
+            <a:r>
+              <a:rPr lang="en-US" dirty="0" smtClean="0"/>
+              <a:t>Lifecycle management to automatically delete or archive </a:t>
+            </a:r>
+            <a:r>
+              <a:rPr lang="en-US" dirty="0" smtClean="0"/>
+              <a:t>data.</a:t>
+            </a:r>
+            <a:endParaRPr lang="en-US" dirty="0" smtClean="0"/>
+          </a:p>
+          <a:p>
+            <a:pPr lvl="1"/>
+            <a:r>
+              <a:rPr lang="en-US" dirty="0" smtClean="0"/>
+              <a:t>Versioning to track changes to </a:t>
+            </a:r>
+            <a:r>
+              <a:rPr lang="en-US" dirty="0" smtClean="0"/>
+              <a:t>file.</a:t>
+            </a:r>
+            <a:endParaRPr lang="en-US" dirty="0" smtClean="0"/>
           </a:p>
         </p:txBody>
       </p:sp>
@@ -9125,8 +9426,13 @@
             </a:r>
             <a:r>
               <a:rPr lang="en-US" dirty="0" smtClean="0"/>
-              <a:t> S3: default storage tier appropriate for most requirements</a:t>
-            </a:r>
+              <a:t> S3: default storage tier appropriate for most </a:t>
+            </a:r>
+            <a:r>
+              <a:rPr lang="en-US" dirty="0" smtClean="0"/>
+              <a:t>requirements.</a:t>
+            </a:r>
+            <a:endParaRPr lang="en-US" dirty="0" smtClean="0"/>
           </a:p>
           <a:p>
             <a:pPr lvl="1"/>
@@ -9153,8 +9459,13 @@
             </a:r>
             <a:r>
               <a:rPr lang="en-US" dirty="0" smtClean="0"/>
-              <a:t>(Infrequently Accessed): data which isn’t accessed frequently, but must be available immediately</a:t>
-            </a:r>
+              <a:t>(Infrequently Accessed): data which isn’t accessed frequently, but must be available </a:t>
+            </a:r>
+            <a:r>
+              <a:rPr lang="en-US" dirty="0" smtClean="0"/>
+              <a:t>immediately.</a:t>
+            </a:r>
+            <a:endParaRPr lang="en-US" dirty="0" smtClean="0"/>
           </a:p>
           <a:p>
             <a:pPr lvl="1"/>
@@ -9191,8 +9502,13 @@
             </a:r>
             <a:r>
               <a:rPr lang="en-US" dirty="0" smtClean="0"/>
-              <a:t> (Reduced Redundancy Storage): storage for non-critical or easily reproduced data</a:t>
-            </a:r>
+              <a:t> (Reduced Redundancy Storage): storage for non-critical or easily reproduced </a:t>
+            </a:r>
+            <a:r>
+              <a:rPr lang="en-US" dirty="0" smtClean="0"/>
+              <a:t>data.</a:t>
+            </a:r>
+            <a:endParaRPr lang="en-US" dirty="0" smtClean="0"/>
           </a:p>
           <a:p>
             <a:pPr lvl="1"/>
@@ -9219,7 +9535,11 @@
             </a:r>
             <a:r>
               <a:rPr lang="en-US" dirty="0" smtClean="0"/>
-              <a:t>: inexpensive data archiving, 3-5 hours to restore data</a:t>
+              <a:t>: inexpensive data archiving, 3-5 hours to restore </a:t>
+            </a:r>
+            <a:r>
+              <a:rPr lang="en-US" dirty="0" smtClean="0"/>
+              <a:t>data.</a:t>
             </a:r>
             <a:endParaRPr lang="en-US" dirty="0"/>
           </a:p>
@@ -9288,10 +9608,15 @@
             <p:ph idx="1"/>
           </p:nvPr>
         </p:nvSpPr>
-        <p:spPr/>
+        <p:spPr>
+          <a:xfrm>
+            <a:off x="457200" y="1600200"/>
+            <a:ext cx="8229600" cy="5078002"/>
+          </a:xfrm>
+        </p:spPr>
         <p:txBody>
           <a:bodyPr>
-            <a:normAutofit fontScale="92500" lnSpcReduction="20000"/>
+            <a:normAutofit fontScale="70000" lnSpcReduction="20000"/>
           </a:bodyPr>
           <a:lstStyle/>
           <a:p>
@@ -9313,44 +9638,94 @@
               <a:rPr lang="en-US" dirty="0">
                 <a:hlinkClick r:id="rId2"/>
               </a:rPr>
-              <a:t>https://s3-us-east-1.amazonaws.com/ust123</a:t>
-            </a:r>
+              <a:t>https://</a:t>
+            </a:r>
+            <a:r>
+              <a:rPr lang="en-US" dirty="0" smtClean="0">
+                <a:hlinkClick r:id="rId2"/>
+              </a:rPr>
+              <a:t>s3-us-east-1.amazonaws.com/ust123</a:t>
+            </a:r>
+            <a:endParaRPr lang="en-US" dirty="0" smtClean="0"/>
+          </a:p>
+          <a:p>
+            <a:pPr lvl="2"/>
             <a:endParaRPr lang="en-US" dirty="0"/>
           </a:p>
           <a:p>
             <a:pPr lvl="1"/>
             <a:r>
               <a:rPr lang="en-US" dirty="0" smtClean="0"/>
-              <a:t>Permissions: set bucket-level access policy</a:t>
-            </a:r>
-          </a:p>
-          <a:p>
-            <a:pPr lvl="1"/>
-            <a:r>
-              <a:rPr lang="en-US" dirty="0" smtClean="0"/>
-              <a:t>Static website hosting: host a website using a set of files in a bucket</a:t>
-            </a:r>
-          </a:p>
-          <a:p>
-            <a:pPr lvl="1"/>
-            <a:r>
-              <a:rPr lang="en-US" dirty="0" smtClean="0"/>
-              <a:t>Events: trigger notifications based on file changes</a:t>
-            </a:r>
-          </a:p>
-          <a:p>
-            <a:pPr lvl="1"/>
-            <a:r>
-              <a:rPr lang="en-US" dirty="0" smtClean="0"/>
-              <a:t>Versioning: track file changes</a:t>
-            </a:r>
-          </a:p>
-          <a:p>
-            <a:pPr lvl="1"/>
-            <a:r>
-              <a:rPr lang="en-US" dirty="0" smtClean="0"/>
-              <a:t>Lifecycle: automate file archiving or deletion</a:t>
-            </a:r>
+              <a:t>Permissions: set bucket-level access </a:t>
+            </a:r>
+            <a:r>
+              <a:rPr lang="en-US" dirty="0" smtClean="0"/>
+              <a:t>policy.</a:t>
+            </a:r>
+          </a:p>
+          <a:p>
+            <a:pPr lvl="1"/>
+            <a:endParaRPr lang="en-US" dirty="0" smtClean="0"/>
+          </a:p>
+          <a:p>
+            <a:pPr lvl="1"/>
+            <a:r>
+              <a:rPr lang="en-US" dirty="0" smtClean="0"/>
+              <a:t>Static website hosting: host a website using a set of files in a </a:t>
+            </a:r>
+            <a:r>
+              <a:rPr lang="en-US" dirty="0" smtClean="0"/>
+              <a:t>bucket.</a:t>
+            </a:r>
+          </a:p>
+          <a:p>
+            <a:pPr lvl="1"/>
+            <a:endParaRPr lang="en-US" dirty="0" smtClean="0"/>
+          </a:p>
+          <a:p>
+            <a:pPr lvl="1"/>
+            <a:r>
+              <a:rPr lang="en-US" dirty="0" smtClean="0"/>
+              <a:t>Events: trigger notifications based on file </a:t>
+            </a:r>
+            <a:r>
+              <a:rPr lang="en-US" dirty="0" smtClean="0"/>
+              <a:t>changes.</a:t>
+            </a:r>
+          </a:p>
+          <a:p>
+            <a:pPr lvl="1"/>
+            <a:endParaRPr lang="en-US" dirty="0" smtClean="0"/>
+          </a:p>
+          <a:p>
+            <a:pPr lvl="1"/>
+            <a:r>
+              <a:rPr lang="en-US" dirty="0" smtClean="0"/>
+              <a:t>Versioning: track file </a:t>
+            </a:r>
+            <a:r>
+              <a:rPr lang="en-US" dirty="0" smtClean="0"/>
+              <a:t>changes.</a:t>
+            </a:r>
+          </a:p>
+          <a:p>
+            <a:pPr lvl="1"/>
+            <a:endParaRPr lang="en-US" dirty="0" smtClean="0"/>
+          </a:p>
+          <a:p>
+            <a:pPr lvl="1"/>
+            <a:r>
+              <a:rPr lang="en-US" dirty="0" smtClean="0"/>
+              <a:t>Lifecycle: automate file archiving or </a:t>
+            </a:r>
+            <a:r>
+              <a:rPr lang="en-US" dirty="0" smtClean="0"/>
+              <a:t>deletion.</a:t>
+            </a:r>
+          </a:p>
+          <a:p>
+            <a:pPr lvl="1"/>
+            <a:endParaRPr lang="en-US" dirty="0" smtClean="0"/>
           </a:p>
           <a:p>
             <a:pPr lvl="1"/>
@@ -9454,7 +9829,9 @@
         </p:nvSpPr>
         <p:spPr/>
         <p:txBody>
-          <a:bodyPr/>
+          <a:bodyPr>
+            <a:normAutofit fontScale="92500" lnSpcReduction="20000"/>
+          </a:bodyPr>
           <a:lstStyle/>
           <a:p>
             <a:r>
@@ -9466,36 +9843,73 @@
             <a:pPr lvl="1"/>
             <a:r>
               <a:rPr lang="en-US" dirty="0" smtClean="0"/>
-              <a:t>Upload a file through web console or API/SDK</a:t>
-            </a:r>
-          </a:p>
-          <a:p>
-            <a:pPr lvl="1"/>
-            <a:r>
-              <a:rPr lang="en-US" dirty="0" smtClean="0"/>
-              <a:t>File changes via HTTP PUT or DELETE</a:t>
-            </a:r>
-          </a:p>
-          <a:p>
-            <a:pPr lvl="1"/>
-            <a:r>
-              <a:rPr lang="en-US" dirty="0" smtClean="0"/>
-              <a:t>Each file has a set of metadata</a:t>
-            </a:r>
-          </a:p>
-          <a:p>
-            <a:pPr lvl="1"/>
-            <a:r>
-              <a:rPr lang="en-US" dirty="0" smtClean="0"/>
-              <a:t>Each file has a unique web link</a:t>
-            </a:r>
-          </a:p>
-          <a:p>
-            <a:pPr lvl="1"/>
-            <a:r>
-              <a:rPr lang="en-US" dirty="0" smtClean="0"/>
-              <a:t>Can set storage class and encryption on a per-file basis</a:t>
-            </a:r>
+              <a:t>Upload a file through web console or </a:t>
+            </a:r>
+            <a:r>
+              <a:rPr lang="en-US" dirty="0" smtClean="0"/>
+              <a:t>API/SDK.</a:t>
+            </a:r>
+          </a:p>
+          <a:p>
+            <a:pPr lvl="1"/>
+            <a:endParaRPr lang="en-US" dirty="0" smtClean="0"/>
+          </a:p>
+          <a:p>
+            <a:pPr lvl="1"/>
+            <a:r>
+              <a:rPr lang="en-US" dirty="0" smtClean="0"/>
+              <a:t>File changes via HTTP PUT or </a:t>
+            </a:r>
+            <a:r>
+              <a:rPr lang="en-US" dirty="0" smtClean="0"/>
+              <a:t>DELETE.</a:t>
+            </a:r>
+          </a:p>
+          <a:p>
+            <a:pPr lvl="1"/>
+            <a:endParaRPr lang="en-US" dirty="0" smtClean="0"/>
+          </a:p>
+          <a:p>
+            <a:pPr lvl="1"/>
+            <a:r>
+              <a:rPr lang="en-US" dirty="0" smtClean="0"/>
+              <a:t>Each file has a set of </a:t>
+            </a:r>
+            <a:r>
+              <a:rPr lang="en-US" dirty="0" smtClean="0"/>
+              <a:t>metadata.</a:t>
+            </a:r>
+          </a:p>
+          <a:p>
+            <a:pPr lvl="1"/>
+            <a:endParaRPr lang="en-US" dirty="0" smtClean="0"/>
+          </a:p>
+          <a:p>
+            <a:pPr lvl="1"/>
+            <a:r>
+              <a:rPr lang="en-US" dirty="0" smtClean="0"/>
+              <a:t>Each file has a unique web </a:t>
+            </a:r>
+            <a:r>
+              <a:rPr lang="en-US" dirty="0" smtClean="0"/>
+              <a:t>link.</a:t>
+            </a:r>
+          </a:p>
+          <a:p>
+            <a:pPr lvl="1"/>
+            <a:endParaRPr lang="en-US" dirty="0" smtClean="0"/>
+          </a:p>
+          <a:p>
+            <a:pPr lvl="1"/>
+            <a:r>
+              <a:rPr lang="en-US" dirty="0" smtClean="0"/>
+              <a:t>Can set storage class and encryption on a per-file </a:t>
+            </a:r>
+            <a:r>
+              <a:rPr lang="en-US" dirty="0" smtClean="0"/>
+              <a:t>basis.</a:t>
+            </a:r>
+            <a:endParaRPr lang="en-US" dirty="0" smtClean="0"/>
           </a:p>
           <a:p>
             <a:endParaRPr lang="en-US" dirty="0" smtClean="0"/>
@@ -9569,10 +9983,15 @@
             <p:ph idx="1"/>
           </p:nvPr>
         </p:nvSpPr>
-        <p:spPr/>
+        <p:spPr>
+          <a:xfrm>
+            <a:off x="457200" y="1600200"/>
+            <a:ext cx="8229600" cy="5026631"/>
+          </a:xfrm>
+        </p:spPr>
         <p:txBody>
           <a:bodyPr>
-            <a:normAutofit lnSpcReduction="10000"/>
+            <a:normAutofit fontScale="77500" lnSpcReduction="20000"/>
           </a:bodyPr>
           <a:lstStyle/>
           <a:p>
@@ -9585,42 +10004,86 @@
             <a:pPr lvl="1"/>
             <a:r>
               <a:rPr lang="en-US" dirty="0" smtClean="0"/>
-              <a:t>Enabled on a per-bucket basis</a:t>
-            </a:r>
-          </a:p>
-          <a:p>
-            <a:pPr lvl="1"/>
-            <a:r>
-              <a:rPr lang="en-US" dirty="0" smtClean="0"/>
-              <a:t>Once versioning on a bucket is enabled, it cannot be disabled only suspended</a:t>
-            </a:r>
-          </a:p>
-          <a:p>
-            <a:pPr lvl="1"/>
-            <a:r>
-              <a:rPr lang="en-US" dirty="0" smtClean="0"/>
-              <a:t>S3 tracks the version of each file</a:t>
-            </a:r>
-          </a:p>
-          <a:p>
-            <a:pPr lvl="1"/>
-            <a:r>
-              <a:rPr lang="en-US" dirty="0" smtClean="0"/>
-              <a:t>Files are hidden (delete markers) and not deleted</a:t>
-            </a:r>
-          </a:p>
-          <a:p>
-            <a:pPr lvl="1"/>
-            <a:r>
-              <a:rPr lang="en-US" dirty="0" smtClean="0"/>
-              <a:t>Great for protecting and tracking files, but consumes more storage space</a:t>
-            </a:r>
-          </a:p>
-          <a:p>
-            <a:pPr lvl="1"/>
-            <a:r>
-              <a:rPr lang="en-US" dirty="0" smtClean="0"/>
-              <a:t>Cross region replication: requires versioning to be enabled on the source bucket</a:t>
+              <a:t>Enabled on a per-bucket </a:t>
+            </a:r>
+            <a:r>
+              <a:rPr lang="en-US" dirty="0" smtClean="0"/>
+              <a:t>basis.</a:t>
+            </a:r>
+          </a:p>
+          <a:p>
+            <a:pPr lvl="1"/>
+            <a:endParaRPr lang="en-US" dirty="0" smtClean="0"/>
+          </a:p>
+          <a:p>
+            <a:pPr lvl="1"/>
+            <a:r>
+              <a:rPr lang="en-US" dirty="0" smtClean="0"/>
+              <a:t>Once versioning on a bucket is enabled, it cannot be disabled only </a:t>
+            </a:r>
+            <a:r>
+              <a:rPr lang="en-US" dirty="0" smtClean="0"/>
+              <a:t>suspended.</a:t>
+            </a:r>
+          </a:p>
+          <a:p>
+            <a:pPr lvl="1"/>
+            <a:endParaRPr lang="en-US" dirty="0" smtClean="0"/>
+          </a:p>
+          <a:p>
+            <a:pPr lvl="1"/>
+            <a:r>
+              <a:rPr lang="en-US" dirty="0" smtClean="0"/>
+              <a:t>S3 tracks the version of each </a:t>
+            </a:r>
+            <a:r>
+              <a:rPr lang="en-US" dirty="0" smtClean="0"/>
+              <a:t>file.</a:t>
+            </a:r>
+          </a:p>
+          <a:p>
+            <a:pPr lvl="1"/>
+            <a:endParaRPr lang="en-US" dirty="0" smtClean="0"/>
+          </a:p>
+          <a:p>
+            <a:pPr lvl="1"/>
+            <a:r>
+              <a:rPr lang="en-US" dirty="0" smtClean="0"/>
+              <a:t>Files are hidden (delete markers) and not </a:t>
+            </a:r>
+            <a:r>
+              <a:rPr lang="en-US" dirty="0" smtClean="0"/>
+              <a:t>deleted.</a:t>
+            </a:r>
+          </a:p>
+          <a:p>
+            <a:pPr lvl="1"/>
+            <a:endParaRPr lang="en-US" dirty="0" smtClean="0"/>
+          </a:p>
+          <a:p>
+            <a:pPr lvl="1"/>
+            <a:r>
+              <a:rPr lang="en-US" dirty="0" smtClean="0"/>
+              <a:t>Great for protecting and tracking files, but consumes more storage </a:t>
+            </a:r>
+            <a:r>
+              <a:rPr lang="en-US" dirty="0" smtClean="0"/>
+              <a:t>space.</a:t>
+            </a:r>
+          </a:p>
+          <a:p>
+            <a:pPr lvl="1"/>
+            <a:endParaRPr lang="en-US" dirty="0" smtClean="0"/>
+          </a:p>
+          <a:p>
+            <a:pPr lvl="1"/>
+            <a:r>
+              <a:rPr lang="en-US" dirty="0" smtClean="0"/>
+              <a:t>Cross region replication: requires versioning to be enabled on the source </a:t>
+            </a:r>
+            <a:r>
+              <a:rPr lang="en-US" dirty="0" smtClean="0"/>
+              <a:t>bucket.</a:t>
             </a:r>
             <a:endParaRPr lang="en-US" dirty="0"/>
           </a:p>
@@ -9691,7 +10154,9 @@
         </p:nvSpPr>
         <p:spPr/>
         <p:txBody>
-          <a:bodyPr/>
+          <a:bodyPr>
+            <a:normAutofit fontScale="92500" lnSpcReduction="10000"/>
+          </a:bodyPr>
           <a:lstStyle/>
           <a:p>
             <a:r>
@@ -9703,15 +10168,31 @@
             <a:pPr lvl="1"/>
             <a:r>
               <a:rPr lang="en-US" dirty="0" smtClean="0"/>
-              <a:t>Automatically transition files from one storage tier to another after a specified amount of time</a:t>
-            </a:r>
-          </a:p>
-          <a:p>
-            <a:pPr lvl="1"/>
-            <a:r>
-              <a:rPr lang="en-US" dirty="0" smtClean="0"/>
-              <a:t>Permanently delete files based on a set schedule</a:t>
-            </a:r>
+              <a:t>Automatically transition files from one storage tier to another after a specified amount of </a:t>
+            </a:r>
+            <a:r>
+              <a:rPr lang="en-US" dirty="0" smtClean="0"/>
+              <a:t>time.</a:t>
+            </a:r>
+          </a:p>
+          <a:p>
+            <a:pPr lvl="1"/>
+            <a:endParaRPr lang="en-US" dirty="0" smtClean="0"/>
+          </a:p>
+          <a:p>
+            <a:pPr lvl="1"/>
+            <a:r>
+              <a:rPr lang="en-US" dirty="0" smtClean="0"/>
+              <a:t>Permanently delete files based on a set </a:t>
+            </a:r>
+            <a:r>
+              <a:rPr lang="en-US" dirty="0" smtClean="0"/>
+              <a:t>schedule.</a:t>
+            </a:r>
+          </a:p>
+          <a:p>
+            <a:pPr lvl="1"/>
+            <a:endParaRPr lang="en-US" dirty="0" smtClean="0"/>
           </a:p>
           <a:p>
             <a:pPr lvl="1"/>
@@ -9724,14 +10205,23 @@
             <a:pPr lvl="2"/>
             <a:r>
               <a:rPr lang="en-US" dirty="0" smtClean="0"/>
-              <a:t>Convenient way to enforce organizational data retention policies</a:t>
-            </a:r>
+              <a:t>Convenient way to enforce organizational data retention </a:t>
+            </a:r>
+            <a:r>
+              <a:rPr lang="en-US" dirty="0" smtClean="0"/>
+              <a:t>policies.</a:t>
+            </a:r>
+            <a:endParaRPr lang="en-US" dirty="0" smtClean="0"/>
           </a:p>
           <a:p>
             <a:pPr lvl="2"/>
             <a:r>
               <a:rPr lang="en-US" dirty="0" smtClean="0"/>
-              <a:t>Reduce storage costs by moving older data to cheaper tiers of storage</a:t>
+              <a:t>Reduce storage costs by moving older data to cheaper tiers of </a:t>
+            </a:r>
+            <a:r>
+              <a:rPr lang="en-US" dirty="0" smtClean="0"/>
+              <a:t>storage.</a:t>
             </a:r>
             <a:endParaRPr lang="en-US" dirty="0"/>
           </a:p>
@@ -9821,8 +10311,13 @@
             <a:pPr lvl="1"/>
             <a:r>
               <a:rPr lang="en-US" dirty="0" smtClean="0"/>
-              <a:t>Cache S3 files at over 50 edge locations throughout the world</a:t>
-            </a:r>
+              <a:t>Cache S3 files at over 50 edge locations throughout the </a:t>
+            </a:r>
+            <a:r>
+              <a:rPr lang="en-US" dirty="0" smtClean="0"/>
+              <a:t>world.</a:t>
+            </a:r>
+            <a:endParaRPr lang="en-US" dirty="0" smtClean="0"/>
           </a:p>
           <a:p>
             <a:pPr lvl="1"/>
@@ -9850,8 +10345,21 @@
             <a:pPr lvl="1"/>
             <a:r>
               <a:rPr lang="en-US" dirty="0" smtClean="0"/>
-              <a:t>Distribution: set of S3 files that are cached</a:t>
-            </a:r>
+              <a:t>Distribution: </a:t>
+            </a:r>
+            <a:r>
+              <a:rPr lang="en-US" dirty="0" smtClean="0"/>
+              <a:t>a set </a:t>
+            </a:r>
+            <a:r>
+              <a:rPr lang="en-US" dirty="0" smtClean="0"/>
+              <a:t>of S3 files that are </a:t>
+            </a:r>
+            <a:r>
+              <a:rPr lang="en-US" dirty="0" smtClean="0"/>
+              <a:t>cached in edge locations.</a:t>
+            </a:r>
+            <a:endParaRPr lang="en-US" dirty="0" smtClean="0"/>
           </a:p>
           <a:p>
             <a:pPr lvl="1"/>
@@ -9888,7 +10396,15 @@
             <a:pPr lvl="1"/>
             <a:r>
               <a:rPr lang="en-US" dirty="0" smtClean="0"/>
-              <a:t>Note: it can be expensive to remove (invalidate) cached objects. Most people just add new versions of their files to the distribution.</a:t>
+              <a:t>Note: it can be expensive to remove (invalidate) cached objects. </a:t>
+            </a:r>
+            <a:r>
+              <a:rPr lang="en-US" dirty="0" smtClean="0"/>
+              <a:t>Oftentimes people </a:t>
+            </a:r>
+            <a:r>
+              <a:rPr lang="en-US" dirty="0" smtClean="0"/>
+              <a:t>just add new versions of their files to the distribution.</a:t>
             </a:r>
             <a:endParaRPr lang="en-US" dirty="0"/>
           </a:p>
@@ -9995,8 +10511,13 @@
           <a:p>
             <a:r>
               <a:rPr lang="en-US" dirty="0" smtClean="0"/>
-              <a:t>A software solution to connect data storage within an enterprise to S3</a:t>
-            </a:r>
+              <a:t>A software solution to connect data storage within an enterprise to </a:t>
+            </a:r>
+            <a:r>
+              <a:rPr lang="en-US" dirty="0" smtClean="0"/>
+              <a:t>S3.</a:t>
+            </a:r>
+            <a:endParaRPr lang="en-US" dirty="0" smtClean="0"/>
           </a:p>
           <a:p>
             <a:r>
@@ -10016,8 +10537,13 @@
             </a:r>
             <a:r>
               <a:rPr lang="en-US" dirty="0" smtClean="0"/>
-              <a:t> frequently-accessed files locally</a:t>
-            </a:r>
+              <a:t> frequently-accessed files </a:t>
+            </a:r>
+            <a:r>
+              <a:rPr lang="en-US" dirty="0" smtClean="0"/>
+              <a:t>locally.</a:t>
+            </a:r>
+            <a:endParaRPr lang="en-US" dirty="0" smtClean="0"/>
           </a:p>
           <a:p>
             <a:pPr lvl="1"/>
@@ -10035,8 +10561,13 @@
             </a:r>
             <a:r>
               <a:rPr lang="en-US" dirty="0" smtClean="0"/>
-              <a:t> some or all files on S3</a:t>
-            </a:r>
+              <a:t> some or all files on </a:t>
+            </a:r>
+            <a:r>
+              <a:rPr lang="en-US" dirty="0" smtClean="0"/>
+              <a:t>S3.</a:t>
+            </a:r>
+            <a:endParaRPr lang="en-US" dirty="0" smtClean="0"/>
           </a:p>
           <a:p>
             <a:pPr lvl="1"/>
@@ -10054,8 +10585,13 @@
             </a:r>
             <a:r>
               <a:rPr lang="en-US" dirty="0" smtClean="0"/>
-              <a:t>when using backup software</a:t>
-            </a:r>
+              <a:t>when using backup </a:t>
+            </a:r>
+            <a:r>
+              <a:rPr lang="en-US" dirty="0" smtClean="0"/>
+              <a:t>software.</a:t>
+            </a:r>
+            <a:endParaRPr lang="en-US" dirty="0" smtClean="0"/>
           </a:p>
           <a:p>
             <a:pPr lvl="1"/>
@@ -10071,14 +10607,23 @@
             <a:pPr lvl="1"/>
             <a:r>
               <a:rPr lang="en-US" dirty="0" smtClean="0"/>
-              <a:t>Backup data in a highly-resilient secondary location</a:t>
-            </a:r>
-          </a:p>
-          <a:p>
-            <a:pPr lvl="1"/>
-            <a:r>
-              <a:rPr lang="en-US" dirty="0" smtClean="0"/>
-              <a:t>Leverage unlimited storage available on S3</a:t>
+              <a:t>Backup data in a highly-resilient secondary </a:t>
+            </a:r>
+            <a:r>
+              <a:rPr lang="en-US" dirty="0" smtClean="0"/>
+              <a:t>location.</a:t>
+            </a:r>
+            <a:endParaRPr lang="en-US" dirty="0" smtClean="0"/>
+          </a:p>
+          <a:p>
+            <a:pPr lvl="1"/>
+            <a:r>
+              <a:rPr lang="en-US" dirty="0" smtClean="0"/>
+              <a:t>Leverage unlimited storage available on </a:t>
+            </a:r>
+            <a:r>
+              <a:rPr lang="en-US" dirty="0" smtClean="0"/>
+              <a:t>S3.</a:t>
             </a:r>
             <a:endParaRPr lang="en-US" dirty="0"/>
           </a:p>
@@ -10243,7 +10788,7 @@
   <p:timing>
     <p:tnLst>
       <p:par>
-        <p:cTn xmlns:p14="http://schemas.microsoft.com/office/powerpoint/2010/main" id="1" dur="indefinite" restart="never" nodeType="tmRoot"/>
+        <p:cTn id="1" dur="indefinite" restart="never" nodeType="tmRoot"/>
       </p:par>
     </p:tnLst>
   </p:timing>
@@ -10463,17 +11008,27 @@
           <a:p>
             <a:r>
               <a:rPr lang="en-US" dirty="0" smtClean="0"/>
-              <a:t>Service that provides resizable compute capacity in the cloud</a:t>
-            </a:r>
-          </a:p>
-          <a:p>
-            <a:endParaRPr lang="en-US" dirty="0" smtClean="0"/>
-          </a:p>
-          <a:p>
-            <a:r>
-              <a:rPr lang="en-US" dirty="0" smtClean="0"/>
-              <a:t>Core computing infrastructure building block that supports many other AWS services</a:t>
-            </a:r>
+              <a:t>Service that provides resizable compute capacity in the </a:t>
+            </a:r>
+            <a:r>
+              <a:rPr lang="en-US" dirty="0" smtClean="0"/>
+              <a:t>cloud.</a:t>
+            </a:r>
+            <a:endParaRPr lang="en-US" dirty="0" smtClean="0"/>
+          </a:p>
+          <a:p>
+            <a:endParaRPr lang="en-US" dirty="0" smtClean="0"/>
+          </a:p>
+          <a:p>
+            <a:r>
+              <a:rPr lang="en-US" dirty="0" smtClean="0"/>
+              <a:t>Core computing infrastructure building block that supports many other AWS </a:t>
+            </a:r>
+            <a:r>
+              <a:rPr lang="en-US" dirty="0" smtClean="0"/>
+              <a:t>services.</a:t>
+            </a:r>
+            <a:endParaRPr lang="en-US" dirty="0" smtClean="0"/>
           </a:p>
           <a:p>
             <a:endParaRPr lang="en-US" dirty="0" smtClean="0"/>
@@ -10613,8 +11168,13 @@
             </a:r>
             <a:r>
               <a:rPr lang="en-US" dirty="0" smtClean="0"/>
-              <a:t>: pay a fixed rate for the EC2 instance on an hourly basis (default)</a:t>
-            </a:r>
+              <a:t>: pay a fixed rate for the EC2 instance on an hourly basis (default</a:t>
+            </a:r>
+            <a:r>
+              <a:rPr lang="en-US" dirty="0" smtClean="0"/>
+              <a:t>).</a:t>
+            </a:r>
+            <a:endParaRPr lang="en-US" dirty="0" smtClean="0"/>
           </a:p>
           <a:p>
             <a:pPr lvl="2"/>
@@ -10639,8 +11199,9 @@
             </a:r>
             <a:r>
               <a:rPr lang="en-US" dirty="0" smtClean="0"/>
-              <a:t>interrupted</a:t>
-            </a:r>
+              <a:t>interrupted.</a:t>
+            </a:r>
+            <a:endParaRPr lang="en-US" dirty="0" smtClean="0"/>
           </a:p>
           <a:p>
             <a:pPr lvl="2"/>
@@ -10653,15 +11214,25 @@
             </a:r>
             <a:r>
               <a:rPr lang="en-US" dirty="0" smtClean="0"/>
-              <a:t>: reserve a certain amount of computing capacity for 1-to-3 years at a discounted rate</a:t>
-            </a:r>
+              <a:t>: reserve a certain amount of computing capacity for 1-to-3 years at a discounted </a:t>
+            </a:r>
+            <a:r>
+              <a:rPr lang="en-US" dirty="0" smtClean="0"/>
+              <a:t>rate.</a:t>
+            </a:r>
+            <a:endParaRPr lang="en-US" dirty="0" smtClean="0"/>
           </a:p>
           <a:p>
             <a:pPr lvl="2"/>
             <a:r>
               <a:rPr lang="en-US" dirty="0" smtClean="0"/>
-              <a:t>Long-term, predictable workloads with known capacity requirements</a:t>
-            </a:r>
+              <a:t>Long-term, predictable workloads with known capacity </a:t>
+            </a:r>
+            <a:r>
+              <a:rPr lang="en-US" dirty="0" smtClean="0"/>
+              <a:t>requirements.</a:t>
+            </a:r>
+            <a:endParaRPr lang="en-US" dirty="0" smtClean="0"/>
           </a:p>
           <a:p>
             <a:pPr lvl="2"/>
@@ -10674,8 +11245,13 @@
             </a:r>
             <a:r>
               <a:rPr lang="en-US" dirty="0" smtClean="0"/>
-              <a:t>: make a bid for computing capacity that’s not currently being used</a:t>
-            </a:r>
+              <a:t>: make a bid for computing capacity that’s not currently being </a:t>
+            </a:r>
+            <a:r>
+              <a:rPr lang="en-US" dirty="0" smtClean="0"/>
+              <a:t>used.</a:t>
+            </a:r>
+            <a:endParaRPr lang="en-US" dirty="0" smtClean="0"/>
           </a:p>
           <a:p>
             <a:pPr lvl="2"/>
@@ -10688,7 +11264,11 @@
             <a:pPr lvl="2"/>
             <a:r>
               <a:rPr lang="en-US" dirty="0" smtClean="0"/>
-              <a:t>AWS may terminate the instance at any time if the spot prices increases over the bid price</a:t>
+              <a:t>AWS may terminate the instance at any time if the spot prices increases over the bid </a:t>
+            </a:r>
+            <a:r>
+              <a:rPr lang="en-US" dirty="0" smtClean="0"/>
+              <a:t>price.</a:t>
             </a:r>
             <a:endParaRPr lang="en-US" dirty="0"/>
           </a:p>
@@ -11354,8 +11934,13 @@
           <a:p>
             <a:r>
               <a:rPr lang="en-US" dirty="0" smtClean="0"/>
-              <a:t>Each volume replicated within the AZ to provide high availability</a:t>
-            </a:r>
+              <a:t>Each volume replicated within the AZ to provide high </a:t>
+            </a:r>
+            <a:r>
+              <a:rPr lang="en-US" dirty="0" smtClean="0"/>
+              <a:t>availability.</a:t>
+            </a:r>
+            <a:endParaRPr lang="en-US" dirty="0" smtClean="0"/>
           </a:p>
           <a:p>
             <a:pPr lvl="1"/>
@@ -11582,7 +12167,15 @@
           <a:p>
             <a:r>
               <a:rPr lang="en-US" dirty="0" smtClean="0"/>
-              <a:t>A snapshot is a point-in-time copy of an EBS volume stored on S3.</a:t>
+              <a:t>A </a:t>
+            </a:r>
+            <a:r>
+              <a:rPr lang="en-US" b="1" dirty="0" smtClean="0"/>
+              <a:t>snapshot</a:t>
+            </a:r>
+            <a:r>
+              <a:rPr lang="en-US" dirty="0" smtClean="0"/>
+              <a:t> is a point-in-time copy of an EBS volume stored on S3.</a:t>
             </a:r>
           </a:p>
           <a:p>
@@ -11616,15 +12209,25 @@
             <a:pPr lvl="1"/>
             <a:r>
               <a:rPr lang="en-US" dirty="0" smtClean="0"/>
-              <a:t>Quickly backup data periodically or before making big changes</a:t>
-            </a:r>
-          </a:p>
-          <a:p>
-            <a:pPr lvl="1"/>
-            <a:r>
-              <a:rPr lang="en-US" dirty="0" smtClean="0"/>
-              <a:t>Roll back system changes by reverting to previous snapshots</a:t>
-            </a:r>
+              <a:t>Quickly backup data periodically or before making big </a:t>
+            </a:r>
+            <a:r>
+              <a:rPr lang="en-US" dirty="0" smtClean="0"/>
+              <a:t>changes.</a:t>
+            </a:r>
+            <a:endParaRPr lang="en-US" dirty="0" smtClean="0"/>
+          </a:p>
+          <a:p>
+            <a:pPr lvl="1"/>
+            <a:r>
+              <a:rPr lang="en-US" dirty="0" smtClean="0"/>
+              <a:t>Roll back system changes by reverting to previous </a:t>
+            </a:r>
+            <a:r>
+              <a:rPr lang="en-US" dirty="0" smtClean="0"/>
+              <a:t>snapshots.</a:t>
+            </a:r>
+            <a:endParaRPr lang="en-US" dirty="0" smtClean="0"/>
           </a:p>
           <a:p>
             <a:pPr lvl="1"/>
@@ -11640,8 +12243,13 @@
             <a:pPr lvl="1"/>
             <a:r>
               <a:rPr lang="en-US" dirty="0" smtClean="0"/>
-              <a:t>Initial snapshots will take longer</a:t>
-            </a:r>
+              <a:t>Initial snapshots will take </a:t>
+            </a:r>
+            <a:r>
+              <a:rPr lang="en-US" dirty="0" smtClean="0"/>
+              <a:t>longer.</a:t>
+            </a:r>
+            <a:endParaRPr lang="en-US" dirty="0" smtClean="0"/>
           </a:p>
           <a:p>
             <a:pPr lvl="1"/>
@@ -11729,14 +12337,31 @@
           <a:p>
             <a:r>
               <a:rPr lang="en-US" dirty="0" smtClean="0"/>
-              <a:t>Another data storage option for EC2 instances</a:t>
-            </a:r>
-          </a:p>
-          <a:p>
-            <a:pPr lvl="1"/>
-            <a:r>
-              <a:rPr lang="en-US" dirty="0" smtClean="0"/>
-              <a:t>Actually, the original storage option!</a:t>
+              <a:t>Instance store is another </a:t>
+            </a:r>
+            <a:r>
+              <a:rPr lang="en-US" dirty="0" smtClean="0"/>
+              <a:t>data storage option for EC2 </a:t>
+            </a:r>
+            <a:r>
+              <a:rPr lang="en-US" dirty="0" smtClean="0"/>
+              <a:t>instances.</a:t>
+            </a:r>
+            <a:endParaRPr lang="en-US" dirty="0" smtClean="0"/>
+          </a:p>
+          <a:p>
+            <a:pPr lvl="1"/>
+            <a:r>
+              <a:rPr lang="en-US" dirty="0"/>
+              <a:t>T</a:t>
+            </a:r>
+            <a:r>
+              <a:rPr lang="en-US" dirty="0" smtClean="0"/>
+              <a:t>he </a:t>
+            </a:r>
+            <a:r>
+              <a:rPr lang="en-US" dirty="0" smtClean="0"/>
+              <a:t>original storage option!</a:t>
             </a:r>
           </a:p>
           <a:p>
@@ -11794,8 +12419,9 @@
             <a:pPr lvl="1"/>
             <a:r>
               <a:rPr lang="en-US" dirty="0" smtClean="0"/>
-              <a:t>Data persistence may not matter in certain architectures</a:t>
-            </a:r>
+              <a:t>Data persistence may not matter in certain architectures.</a:t>
+            </a:r>
+            <a:endParaRPr lang="en-US" dirty="0" smtClean="0"/>
           </a:p>
         </p:txBody>
       </p:sp>
@@ -11895,7 +12521,7 @@
   <p:timing>
     <p:tnLst>
       <p:par>
-        <p:cTn xmlns:p14="http://schemas.microsoft.com/office/powerpoint/2010/main" id="1" dur="indefinite" restart="never" nodeType="tmRoot"/>
+        <p:cTn id="1" dur="indefinite" restart="never" nodeType="tmRoot"/>
       </p:par>
     </p:tnLst>
   </p:timing>
@@ -11966,8 +12592,13 @@
           <a:p>
             <a:r>
               <a:rPr lang="en-US" dirty="0" smtClean="0"/>
-              <a:t>Security groups provide a security layer around EC2 instances</a:t>
-            </a:r>
+              <a:t>Security groups provide a security layer around EC2 </a:t>
+            </a:r>
+            <a:r>
+              <a:rPr lang="en-US" dirty="0" smtClean="0"/>
+              <a:t>instances.</a:t>
+            </a:r>
+            <a:endParaRPr lang="en-US" dirty="0" smtClean="0"/>
           </a:p>
           <a:p>
             <a:pPr lvl="1"/>
@@ -12022,8 +12653,13 @@
             </a:r>
             <a:r>
               <a:rPr lang="en-US" dirty="0" smtClean="0"/>
-              <a:t> meaning that responses from allowed connections are valid</a:t>
-            </a:r>
+              <a:t> meaning that responses from allowed connections are </a:t>
+            </a:r>
+            <a:r>
+              <a:rPr lang="en-US" dirty="0" smtClean="0"/>
+              <a:t>valid.</a:t>
+            </a:r>
+            <a:endParaRPr lang="en-US" dirty="0" smtClean="0"/>
           </a:p>
           <a:p>
             <a:pPr lvl="1"/>
@@ -13051,11 +13687,7 @@
             </a:r>
             <a:r>
               <a:rPr lang="en-US" i="1" dirty="0" smtClean="0"/>
-              <a:t>Architecting for the Cloud: AWS Best Practices (February 2016</a:t>
-            </a:r>
-            <a:r>
-              <a:rPr lang="en-US" i="1" dirty="0" smtClean="0"/>
-              <a:t>)</a:t>
+              <a:t>Architecting for the Cloud: AWS Best Practices (February 2016)</a:t>
             </a:r>
           </a:p>
           <a:p>
@@ -13144,7 +13776,7 @@
         <p:spPr/>
         <p:txBody>
           <a:bodyPr>
-            <a:normAutofit lnSpcReduction="10000"/>
+            <a:normAutofit fontScale="92500" lnSpcReduction="20000"/>
           </a:bodyPr>
           <a:lstStyle/>
           <a:p>
@@ -13157,15 +13789,31 @@
             <a:pPr lvl="1"/>
             <a:r>
               <a:rPr lang="en-US" dirty="0" smtClean="0"/>
-              <a:t>Rapidly provision infrastructure to support development, testing, project deployment</a:t>
-            </a:r>
-          </a:p>
-          <a:p>
-            <a:pPr lvl="1"/>
-            <a:r>
-              <a:rPr lang="en-US" dirty="0" smtClean="0"/>
-              <a:t>Easily support transient applications that require significant resources for a short period of time</a:t>
-            </a:r>
+              <a:t>Rapidly provision infrastructure to support development, testing, project </a:t>
+            </a:r>
+            <a:r>
+              <a:rPr lang="en-US" dirty="0" smtClean="0"/>
+              <a:t>deployment.</a:t>
+            </a:r>
+          </a:p>
+          <a:p>
+            <a:pPr lvl="1"/>
+            <a:endParaRPr lang="en-US" dirty="0" smtClean="0"/>
+          </a:p>
+          <a:p>
+            <a:pPr lvl="1"/>
+            <a:r>
+              <a:rPr lang="en-US" dirty="0" smtClean="0"/>
+              <a:t>Easily support transient applications that require significant resources for a short period of </a:t>
+            </a:r>
+            <a:r>
+              <a:rPr lang="en-US" dirty="0" smtClean="0"/>
+              <a:t>time.</a:t>
+            </a:r>
+          </a:p>
+          <a:p>
+            <a:pPr lvl="1"/>
+            <a:endParaRPr lang="en-US" dirty="0" smtClean="0"/>
           </a:p>
           <a:p>
             <a:pPr lvl="1"/>
@@ -13174,17 +13822,25 @@
               <a:t>Self-service interfaces = reduced demand on system admins, storage engineers, network admins, </a:t>
             </a:r>
             <a:r>
-              <a:rPr lang="en-US" dirty="0" err="1" smtClean="0"/>
-              <a:t>etc</a:t>
-            </a:r>
-            <a:endParaRPr lang="en-US" dirty="0" smtClean="0"/>
-          </a:p>
-          <a:p>
-            <a:pPr lvl="1"/>
-            <a:r>
-              <a:rPr lang="en-US" dirty="0" smtClean="0"/>
-              <a:t>Manage infrastructure programmatically via APIs (Infrastructure as code)</a:t>
-            </a:r>
+              <a:rPr lang="en-US" dirty="0" smtClean="0"/>
+              <a:t>etc.</a:t>
+            </a:r>
+          </a:p>
+          <a:p>
+            <a:pPr lvl="1"/>
+            <a:endParaRPr lang="en-US" dirty="0" smtClean="0"/>
+          </a:p>
+          <a:p>
+            <a:pPr lvl="1"/>
+            <a:r>
+              <a:rPr lang="en-US" dirty="0" smtClean="0"/>
+              <a:t>Manage infrastructure programmatically via APIs (Infrastructure as code</a:t>
+            </a:r>
+            <a:r>
+              <a:rPr lang="en-US" dirty="0" smtClean="0"/>
+              <a:t>).</a:t>
+            </a:r>
+            <a:endParaRPr lang="en-US" dirty="0" smtClean="0"/>
           </a:p>
           <a:p>
             <a:pPr marL="914400" lvl="2" indent="0">
@@ -13207,7 +13863,7 @@
   <p:timing>
     <p:tnLst>
       <p:par>
-        <p:cTn xmlns:p14="http://schemas.microsoft.com/office/powerpoint/2010/main" id="1" dur="indefinite" restart="never" nodeType="tmRoot"/>
+        <p:cTn id="1" dur="indefinite" restart="never" nodeType="tmRoot"/>
       </p:par>
     </p:tnLst>
   </p:timing>
@@ -13271,15 +13927,17 @@
           <a:p>
             <a:r>
               <a:rPr lang="en-US" dirty="0" smtClean="0"/>
-              <a:t>Elasticity</a:t>
-            </a:r>
-          </a:p>
-          <a:p>
-            <a:pPr lvl="1"/>
-            <a:r>
-              <a:rPr lang="en-US" sz="2400" dirty="0" smtClean="0"/>
-              <a:t>Align infrastructure capacity with current IT demand to achieve cost savings</a:t>
-            </a:r>
+              <a:t>Align </a:t>
+            </a:r>
+            <a:r>
+              <a:rPr lang="en-US" dirty="0" smtClean="0"/>
+              <a:t>infrastructure capacity with current IT demand to achieve cost </a:t>
+            </a:r>
+            <a:r>
+              <a:rPr lang="en-US" dirty="0" smtClean="0"/>
+              <a:t>savings.</a:t>
+            </a:r>
+            <a:endParaRPr lang="en-US" dirty="0" smtClean="0"/>
           </a:p>
           <a:p>
             <a:endParaRPr lang="en-US" dirty="0"/>
@@ -13323,7 +13981,7 @@
   <p:timing>
     <p:tnLst>
       <p:par>
-        <p:cTn xmlns:p14="http://schemas.microsoft.com/office/powerpoint/2010/main" id="1" dur="indefinite" restart="never" nodeType="tmRoot"/>
+        <p:cTn id="1" dur="indefinite" restart="never" nodeType="tmRoot"/>
       </p:par>
     </p:tnLst>
   </p:timing>
@@ -13492,7 +14150,7 @@
   <p:timing>
     <p:tnLst>
       <p:par>
-        <p:cTn xmlns:p14="http://schemas.microsoft.com/office/powerpoint/2010/main" id="1" dur="indefinite" restart="never" nodeType="tmRoot"/>
+        <p:cTn id="1" dur="indefinite" restart="never" nodeType="tmRoot"/>
       </p:par>
     </p:tnLst>
   </p:timing>
@@ -13576,7 +14234,7 @@
   <p:timing>
     <p:tnLst>
       <p:par>
-        <p:cTn xmlns:p14="http://schemas.microsoft.com/office/powerpoint/2010/main" id="1" dur="indefinite" restart="never" nodeType="tmRoot"/>
+        <p:cTn id="1" dur="indefinite" restart="never" nodeType="tmRoot"/>
       </p:par>
     </p:tnLst>
   </p:timing>
@@ -13637,7 +14295,7 @@
   <p:timing>
     <p:tnLst>
       <p:par>
-        <p:cTn xmlns:p14="http://schemas.microsoft.com/office/powerpoint/2010/main" id="1" dur="indefinite" restart="never" nodeType="tmRoot"/>
+        <p:cTn id="1" dur="indefinite" restart="never" nodeType="tmRoot"/>
       </p:par>
     </p:tnLst>
   </p:timing>

</xml_diff>

<commit_message>
update lectures with new AWS services and changes
</commit_message>
<xml_diff>
--- a/lectures/infrastructure-week-4.pptx
+++ b/lectures/infrastructure-week-4.pptx
@@ -10,37 +10,44 @@
     <p:sldId id="260" r:id="rId4"/>
     <p:sldId id="261" r:id="rId5"/>
     <p:sldId id="268" r:id="rId6"/>
-    <p:sldId id="269" r:id="rId7"/>
-    <p:sldId id="262" r:id="rId8"/>
-    <p:sldId id="263" r:id="rId9"/>
-    <p:sldId id="264" r:id="rId10"/>
-    <p:sldId id="265" r:id="rId11"/>
-    <p:sldId id="266" r:id="rId12"/>
-    <p:sldId id="271" r:id="rId13"/>
-    <p:sldId id="270" r:id="rId14"/>
-    <p:sldId id="295" r:id="rId15"/>
-    <p:sldId id="273" r:id="rId16"/>
-    <p:sldId id="275" r:id="rId17"/>
-    <p:sldId id="276" r:id="rId18"/>
-    <p:sldId id="272" r:id="rId19"/>
-    <p:sldId id="274" r:id="rId20"/>
-    <p:sldId id="277" r:id="rId21"/>
-    <p:sldId id="281" r:id="rId22"/>
-    <p:sldId id="282" r:id="rId23"/>
-    <p:sldId id="284" r:id="rId24"/>
-    <p:sldId id="278" r:id="rId25"/>
-    <p:sldId id="279" r:id="rId26"/>
-    <p:sldId id="283" r:id="rId27"/>
-    <p:sldId id="285" r:id="rId28"/>
-    <p:sldId id="267" r:id="rId29"/>
-    <p:sldId id="287" r:id="rId30"/>
-    <p:sldId id="291" r:id="rId31"/>
-    <p:sldId id="292" r:id="rId32"/>
-    <p:sldId id="293" r:id="rId33"/>
-    <p:sldId id="294" r:id="rId34"/>
-    <p:sldId id="288" r:id="rId35"/>
-    <p:sldId id="289" r:id="rId36"/>
-    <p:sldId id="290" r:id="rId37"/>
+    <p:sldId id="303" r:id="rId7"/>
+    <p:sldId id="302" r:id="rId8"/>
+    <p:sldId id="269" r:id="rId9"/>
+    <p:sldId id="263" r:id="rId10"/>
+    <p:sldId id="264" r:id="rId11"/>
+    <p:sldId id="265" r:id="rId12"/>
+    <p:sldId id="266" r:id="rId13"/>
+    <p:sldId id="271" r:id="rId14"/>
+    <p:sldId id="270" r:id="rId15"/>
+    <p:sldId id="295" r:id="rId16"/>
+    <p:sldId id="273" r:id="rId17"/>
+    <p:sldId id="275" r:id="rId18"/>
+    <p:sldId id="276" r:id="rId19"/>
+    <p:sldId id="272" r:id="rId20"/>
+    <p:sldId id="274" r:id="rId21"/>
+    <p:sldId id="277" r:id="rId22"/>
+    <p:sldId id="281" r:id="rId23"/>
+    <p:sldId id="282" r:id="rId24"/>
+    <p:sldId id="284" r:id="rId25"/>
+    <p:sldId id="278" r:id="rId26"/>
+    <p:sldId id="279" r:id="rId27"/>
+    <p:sldId id="283" r:id="rId28"/>
+    <p:sldId id="285" r:id="rId29"/>
+    <p:sldId id="267" r:id="rId30"/>
+    <p:sldId id="287" r:id="rId31"/>
+    <p:sldId id="291" r:id="rId32"/>
+    <p:sldId id="292" r:id="rId33"/>
+    <p:sldId id="293" r:id="rId34"/>
+    <p:sldId id="294" r:id="rId35"/>
+    <p:sldId id="298" r:id="rId36"/>
+    <p:sldId id="299" r:id="rId37"/>
+    <p:sldId id="301" r:id="rId38"/>
+    <p:sldId id="288" r:id="rId39"/>
+    <p:sldId id="289" r:id="rId40"/>
+    <p:sldId id="296" r:id="rId41"/>
+    <p:sldId id="290" r:id="rId42"/>
+    <p:sldId id="297" r:id="rId43"/>
+    <p:sldId id="304" r:id="rId44"/>
   </p:sldIdLst>
   <p:sldSz cx="9144000" cy="6858000" type="screen4x3"/>
   <p:notesSz cx="6858000" cy="9144000"/>
@@ -337,7 +344,7 @@
           <a:p>
             <a:fld id="{5C992B2E-871F-DF41-938B-F17F540EA4B5}" type="datetimeFigureOut">
               <a:rPr lang="en-US" smtClean="0"/>
-              <a:t>8/19/18</a:t>
+              <a:t>7/5/19</a:t>
             </a:fld>
             <a:endParaRPr lang="en-US"/>
           </a:p>
@@ -505,7 +512,7 @@
           <a:p>
             <a:fld id="{5C992B2E-871F-DF41-938B-F17F540EA4B5}" type="datetimeFigureOut">
               <a:rPr lang="en-US" smtClean="0"/>
-              <a:t>8/19/18</a:t>
+              <a:t>7/5/19</a:t>
             </a:fld>
             <a:endParaRPr lang="en-US"/>
           </a:p>
@@ -683,7 +690,7 @@
           <a:p>
             <a:fld id="{5C992B2E-871F-DF41-938B-F17F540EA4B5}" type="datetimeFigureOut">
               <a:rPr lang="en-US" smtClean="0"/>
-              <a:t>8/19/18</a:t>
+              <a:t>7/5/19</a:t>
             </a:fld>
             <a:endParaRPr lang="en-US"/>
           </a:p>
@@ -851,7 +858,7 @@
           <a:p>
             <a:fld id="{5C992B2E-871F-DF41-938B-F17F540EA4B5}" type="datetimeFigureOut">
               <a:rPr lang="en-US" smtClean="0"/>
-              <a:t>8/19/18</a:t>
+              <a:t>7/5/19</a:t>
             </a:fld>
             <a:endParaRPr lang="en-US"/>
           </a:p>
@@ -1096,7 +1103,7 @@
           <a:p>
             <a:fld id="{5C992B2E-871F-DF41-938B-F17F540EA4B5}" type="datetimeFigureOut">
               <a:rPr lang="en-US" smtClean="0"/>
-              <a:t>8/19/18</a:t>
+              <a:t>7/5/19</a:t>
             </a:fld>
             <a:endParaRPr lang="en-US"/>
           </a:p>
@@ -1381,7 +1388,7 @@
           <a:p>
             <a:fld id="{5C992B2E-871F-DF41-938B-F17F540EA4B5}" type="datetimeFigureOut">
               <a:rPr lang="en-US" smtClean="0"/>
-              <a:t>8/19/18</a:t>
+              <a:t>7/5/19</a:t>
             </a:fld>
             <a:endParaRPr lang="en-US"/>
           </a:p>
@@ -1800,7 +1807,7 @@
           <a:p>
             <a:fld id="{5C992B2E-871F-DF41-938B-F17F540EA4B5}" type="datetimeFigureOut">
               <a:rPr lang="en-US" smtClean="0"/>
-              <a:t>8/19/18</a:t>
+              <a:t>7/5/19</a:t>
             </a:fld>
             <a:endParaRPr lang="en-US"/>
           </a:p>
@@ -1917,7 +1924,7 @@
           <a:p>
             <a:fld id="{5C992B2E-871F-DF41-938B-F17F540EA4B5}" type="datetimeFigureOut">
               <a:rPr lang="en-US" smtClean="0"/>
-              <a:t>8/19/18</a:t>
+              <a:t>7/5/19</a:t>
             </a:fld>
             <a:endParaRPr lang="en-US"/>
           </a:p>
@@ -2012,7 +2019,7 @@
           <a:p>
             <a:fld id="{5C992B2E-871F-DF41-938B-F17F540EA4B5}" type="datetimeFigureOut">
               <a:rPr lang="en-US" smtClean="0"/>
-              <a:t>8/19/18</a:t>
+              <a:t>7/5/19</a:t>
             </a:fld>
             <a:endParaRPr lang="en-US"/>
           </a:p>
@@ -2287,7 +2294,7 @@
           <a:p>
             <a:fld id="{5C992B2E-871F-DF41-938B-F17F540EA4B5}" type="datetimeFigureOut">
               <a:rPr lang="en-US" smtClean="0"/>
-              <a:t>8/19/18</a:t>
+              <a:t>7/5/19</a:t>
             </a:fld>
             <a:endParaRPr lang="en-US"/>
           </a:p>
@@ -2539,7 +2546,7 @@
           <a:p>
             <a:fld id="{5C992B2E-871F-DF41-938B-F17F540EA4B5}" type="datetimeFigureOut">
               <a:rPr lang="en-US" smtClean="0"/>
-              <a:t>8/19/18</a:t>
+              <a:t>7/5/19</a:t>
             </a:fld>
             <a:endParaRPr lang="en-US"/>
           </a:p>
@@ -2750,7 +2757,7 @@
           <a:p>
             <a:fld id="{5C992B2E-871F-DF41-938B-F17F540EA4B5}" type="datetimeFigureOut">
               <a:rPr lang="en-US" smtClean="0"/>
-              <a:t>8/19/18</a:t>
+              <a:t>7/5/19</a:t>
             </a:fld>
             <a:endParaRPr lang="en-US"/>
           </a:p>
@@ -3336,85 +3343,59 @@
             <p:ph idx="1"/>
           </p:nvPr>
         </p:nvSpPr>
-        <p:spPr>
-          <a:xfrm>
-            <a:off x="457200" y="1600200"/>
-            <a:ext cx="8229600" cy="4967748"/>
-          </a:xfrm>
-        </p:spPr>
+        <p:spPr/>
         <p:txBody>
           <a:bodyPr>
-            <a:normAutofit fontScale="85000" lnSpcReduction="20000"/>
+            <a:normAutofit lnSpcReduction="10000"/>
           </a:bodyPr>
           <a:lstStyle/>
           <a:p>
             <a:r>
               <a:rPr lang="en-US" dirty="0"/>
-              <a:t>Use cases:</a:t>
-            </a:r>
-          </a:p>
-          <a:p>
-            <a:pPr lvl="1"/>
-            <a:r>
-              <a:rPr lang="en-US" dirty="0"/>
-              <a:t>Scalable content repository storing customer uploads.</a:t>
-            </a:r>
-          </a:p>
-          <a:p>
-            <a:pPr lvl="1"/>
-            <a:endParaRPr lang="en-US" dirty="0"/>
-          </a:p>
-          <a:p>
-            <a:pPr lvl="1"/>
-            <a:r>
-              <a:rPr lang="en-US" dirty="0"/>
-              <a:t>Deploying website files across fleet of deployed EC2 instances.</a:t>
-            </a:r>
-          </a:p>
-          <a:p>
-            <a:pPr lvl="1"/>
-            <a:endParaRPr lang="en-US" dirty="0"/>
-          </a:p>
-          <a:p>
-            <a:pPr lvl="1"/>
-            <a:r>
-              <a:rPr lang="en-US" dirty="0"/>
-              <a:t>Sharing home directories across instances.</a:t>
-            </a:r>
-          </a:p>
-          <a:p>
-            <a:endParaRPr lang="en-US" dirty="0"/>
-          </a:p>
-          <a:p>
-            <a:r>
-              <a:rPr lang="en-US" dirty="0"/>
-              <a:t>Benefits:</a:t>
-            </a:r>
-          </a:p>
-          <a:p>
-            <a:pPr lvl="1"/>
-            <a:endParaRPr lang="en-US" dirty="0"/>
-          </a:p>
-          <a:p>
-            <a:pPr lvl="1"/>
-            <a:r>
-              <a:rPr lang="en-US" dirty="0"/>
-              <a:t>Native file system interaction with OS and applications.</a:t>
-            </a:r>
-          </a:p>
-          <a:p>
-            <a:pPr lvl="1"/>
-            <a:endParaRPr lang="en-US" dirty="0"/>
-          </a:p>
-          <a:p>
-            <a:pPr lvl="1"/>
-            <a:r>
-              <a:rPr lang="en-US" dirty="0"/>
-              <a:t>AWS managed infrastructure.</a:t>
-            </a:r>
-          </a:p>
-          <a:p>
-            <a:pPr lvl="1"/>
+              <a:t>A fully managed file system for EC2 instances.</a:t>
+            </a:r>
+          </a:p>
+          <a:p>
+            <a:pPr lvl="1"/>
+            <a:r>
+              <a:rPr lang="en-US" dirty="0"/>
+              <a:t>Shareable across thousands of instances</a:t>
+            </a:r>
+          </a:p>
+          <a:p>
+            <a:pPr lvl="1"/>
+            <a:r>
+              <a:rPr lang="en-US" dirty="0"/>
+              <a:t>Scalable to petabytes</a:t>
+            </a:r>
+          </a:p>
+          <a:p>
+            <a:pPr lvl="1"/>
+            <a:r>
+              <a:rPr lang="en-US" dirty="0"/>
+              <a:t>Works with standard operating system APIs</a:t>
+            </a:r>
+          </a:p>
+          <a:p>
+            <a:pPr lvl="1"/>
+            <a:endParaRPr lang="en-US" dirty="0"/>
+          </a:p>
+          <a:p>
+            <a:r>
+              <a:rPr lang="en-US" dirty="0"/>
+              <a:t>Based on Network File System version 4 (NFSv4).</a:t>
+            </a:r>
+          </a:p>
+          <a:p>
+            <a:endParaRPr lang="en-US" dirty="0"/>
+          </a:p>
+          <a:p>
+            <a:r>
+              <a:rPr lang="en-US" dirty="0"/>
+              <a:t>Files redundantly stored across multiple AZs.</a:t>
+            </a:r>
+          </a:p>
+          <a:p>
             <a:endParaRPr lang="en-US" dirty="0"/>
           </a:p>
         </p:txBody>
@@ -3422,7 +3403,7 @@
     </p:spTree>
     <p:extLst>
       <p:ext uri="{BB962C8B-B14F-4D97-AF65-F5344CB8AC3E}">
-        <p14:creationId xmlns:p14="http://schemas.microsoft.com/office/powerpoint/2010/main" val="1737073371"/>
+        <p14:creationId xmlns:p14="http://schemas.microsoft.com/office/powerpoint/2010/main" val="2891050390"/>
       </p:ext>
     </p:extLst>
   </p:cSld>
@@ -3466,6 +3447,151 @@
           <a:p>
             <a:r>
               <a:rPr lang="en-US" dirty="0"/>
+              <a:t>EFS</a:t>
+            </a:r>
+          </a:p>
+        </p:txBody>
+      </p:sp>
+      <p:sp>
+        <p:nvSpPr>
+          <p:cNvPr id="3" name="Content Placeholder 2"/>
+          <p:cNvSpPr>
+            <a:spLocks noGrp="1"/>
+          </p:cNvSpPr>
+          <p:nvPr>
+            <p:ph idx="1"/>
+          </p:nvPr>
+        </p:nvSpPr>
+        <p:spPr>
+          <a:xfrm>
+            <a:off x="457200" y="1600200"/>
+            <a:ext cx="8229600" cy="4967748"/>
+          </a:xfrm>
+        </p:spPr>
+        <p:txBody>
+          <a:bodyPr>
+            <a:normAutofit fontScale="85000" lnSpcReduction="20000"/>
+          </a:bodyPr>
+          <a:lstStyle/>
+          <a:p>
+            <a:r>
+              <a:rPr lang="en-US" dirty="0"/>
+              <a:t>Use cases:</a:t>
+            </a:r>
+          </a:p>
+          <a:p>
+            <a:pPr lvl="1"/>
+            <a:r>
+              <a:rPr lang="en-US" dirty="0"/>
+              <a:t>Scalable content repository storing customer uploads.</a:t>
+            </a:r>
+          </a:p>
+          <a:p>
+            <a:pPr lvl="1"/>
+            <a:endParaRPr lang="en-US" dirty="0"/>
+          </a:p>
+          <a:p>
+            <a:pPr lvl="1"/>
+            <a:r>
+              <a:rPr lang="en-US" dirty="0"/>
+              <a:t>Deploying website files across fleet of deployed EC2 instances.</a:t>
+            </a:r>
+          </a:p>
+          <a:p>
+            <a:pPr lvl="1"/>
+            <a:endParaRPr lang="en-US" dirty="0"/>
+          </a:p>
+          <a:p>
+            <a:pPr lvl="1"/>
+            <a:r>
+              <a:rPr lang="en-US" dirty="0"/>
+              <a:t>Sharing home directories across instances.</a:t>
+            </a:r>
+          </a:p>
+          <a:p>
+            <a:endParaRPr lang="en-US" dirty="0"/>
+          </a:p>
+          <a:p>
+            <a:r>
+              <a:rPr lang="en-US" dirty="0"/>
+              <a:t>Benefits:</a:t>
+            </a:r>
+          </a:p>
+          <a:p>
+            <a:pPr lvl="1"/>
+            <a:endParaRPr lang="en-US" dirty="0"/>
+          </a:p>
+          <a:p>
+            <a:pPr lvl="1"/>
+            <a:r>
+              <a:rPr lang="en-US" dirty="0"/>
+              <a:t>Native file system interaction with OS and applications.</a:t>
+            </a:r>
+          </a:p>
+          <a:p>
+            <a:pPr lvl="1"/>
+            <a:endParaRPr lang="en-US" dirty="0"/>
+          </a:p>
+          <a:p>
+            <a:pPr lvl="1"/>
+            <a:r>
+              <a:rPr lang="en-US" dirty="0"/>
+              <a:t>AWS managed infrastructure.</a:t>
+            </a:r>
+          </a:p>
+          <a:p>
+            <a:pPr lvl="1"/>
+            <a:endParaRPr lang="en-US" dirty="0"/>
+          </a:p>
+        </p:txBody>
+      </p:sp>
+    </p:spTree>
+    <p:extLst>
+      <p:ext uri="{BB962C8B-B14F-4D97-AF65-F5344CB8AC3E}">
+        <p14:creationId xmlns:p14="http://schemas.microsoft.com/office/powerpoint/2010/main" val="1737073371"/>
+      </p:ext>
+    </p:extLst>
+  </p:cSld>
+  <p:clrMapOvr>
+    <a:masterClrMapping/>
+  </p:clrMapOvr>
+</p:sld>
+</file>
+
+<file path=ppt/slides/slide12.xml><?xml version="1.0" encoding="utf-8"?>
+<p:sld xmlns:a="http://schemas.openxmlformats.org/drawingml/2006/main" xmlns:r="http://schemas.openxmlformats.org/officeDocument/2006/relationships" xmlns:p="http://schemas.openxmlformats.org/presentationml/2006/main">
+  <p:cSld>
+    <p:spTree>
+      <p:nvGrpSpPr>
+        <p:cNvPr id="1" name=""/>
+        <p:cNvGrpSpPr/>
+        <p:nvPr/>
+      </p:nvGrpSpPr>
+      <p:grpSpPr>
+        <a:xfrm>
+          <a:off x="0" y="0"/>
+          <a:ext cx="0" cy="0"/>
+          <a:chOff x="0" y="0"/>
+          <a:chExt cx="0" cy="0"/>
+        </a:xfrm>
+      </p:grpSpPr>
+      <p:sp>
+        <p:nvSpPr>
+          <p:cNvPr id="2" name="Title 1"/>
+          <p:cNvSpPr>
+            <a:spLocks noGrp="1"/>
+          </p:cNvSpPr>
+          <p:nvPr>
+            <p:ph type="title"/>
+          </p:nvPr>
+        </p:nvSpPr>
+        <p:spPr/>
+        <p:txBody>
+          <a:bodyPr/>
+          <a:lstStyle/>
+          <a:p>
+            <a:r>
+              <a:rPr lang="en-US" dirty="0"/>
               <a:t>Virtual Private Cloud (VPC)</a:t>
             </a:r>
           </a:p>
@@ -3537,13 +3663,8 @@
           <a:p>
             <a:r>
               <a:rPr lang="en-US" dirty="0"/>
-              <a:t>VPCs are hard to understand at first, but are critically important to working </a:t>
-            </a:r>
-            <a:r>
-              <a:rPr lang="en-US"/>
-              <a:t>with AWS.</a:t>
-            </a:r>
-            <a:endParaRPr lang="en-US" dirty="0"/>
+              <a:t>VPCs are challenging to understand at first, but are critically important to working with AWS.</a:t>
+            </a:r>
           </a:p>
           <a:p>
             <a:endParaRPr lang="en-US" dirty="0"/>
@@ -3552,22 +3673,34 @@
       </p:sp>
       <p:pic>
         <p:nvPicPr>
-          <p:cNvPr id="4" name="Picture 3"/>
+          <p:cNvPr id="5" name="Graphic 4">
+            <a:extLst>
+              <a:ext uri="{FF2B5EF4-FFF2-40B4-BE49-F238E27FC236}">
+                <a16:creationId xmlns:a16="http://schemas.microsoft.com/office/drawing/2014/main" id="{68DA7E4E-7917-7F4B-9358-22CA192083C8}"/>
+              </a:ext>
+            </a:extLst>
+          </p:cNvPr>
           <p:cNvPicPr>
             <a:picLocks noChangeAspect="1"/>
           </p:cNvPicPr>
           <p:nvPr/>
         </p:nvPicPr>
         <p:blipFill>
-          <a:blip r:embed="rId2"/>
+          <a:blip r:embed="rId2">
+            <a:extLst>
+              <a:ext uri="{96DAC541-7B7A-43D3-8B79-37D633B846F1}">
+                <asvg:svgBlip xmlns:asvg="http://schemas.microsoft.com/office/drawing/2016/SVG/main" r:embed="rId3"/>
+              </a:ext>
+            </a:extLst>
+          </a:blip>
           <a:stretch>
             <a:fillRect/>
           </a:stretch>
         </p:blipFill>
         <p:spPr>
           <a:xfrm>
-            <a:off x="7780922" y="274638"/>
-            <a:ext cx="1102734" cy="1102734"/>
+            <a:off x="7839848" y="274638"/>
+            <a:ext cx="1041394" cy="1041394"/>
           </a:xfrm>
           <a:prstGeom prst="rect">
             <a:avLst/>
@@ -3587,7 +3720,7 @@
 </p:sld>
 </file>
 
-<file path=ppt/slides/slide12.xml><?xml version="1.0" encoding="utf-8"?>
+<file path=ppt/slides/slide13.xml><?xml version="1.0" encoding="utf-8"?>
 <p:sld xmlns:a="http://schemas.openxmlformats.org/drawingml/2006/main" xmlns:r="http://schemas.openxmlformats.org/officeDocument/2006/relationships" xmlns:p="http://schemas.openxmlformats.org/presentationml/2006/main">
   <p:cSld>
     <p:spTree>
@@ -3687,7 +3820,7 @@
 </p:sld>
 </file>
 
-<file path=ppt/slides/slide13.xml><?xml version="1.0" encoding="utf-8"?>
+<file path=ppt/slides/slide14.xml><?xml version="1.0" encoding="utf-8"?>
 <p:sld xmlns:a="http://schemas.openxmlformats.org/drawingml/2006/main" xmlns:r="http://schemas.openxmlformats.org/officeDocument/2006/relationships" xmlns:p="http://schemas.openxmlformats.org/presentationml/2006/main">
   <p:cSld>
     <p:spTree>
@@ -3801,7 +3934,7 @@
 </p:sld>
 </file>
 
-<file path=ppt/slides/slide14.xml><?xml version="1.0" encoding="utf-8"?>
+<file path=ppt/slides/slide15.xml><?xml version="1.0" encoding="utf-8"?>
 <p:sld xmlns:a="http://schemas.openxmlformats.org/drawingml/2006/main" xmlns:r="http://schemas.openxmlformats.org/officeDocument/2006/relationships" xmlns:p="http://schemas.openxmlformats.org/presentationml/2006/main">
   <p:cSld>
     <p:spTree>
@@ -3877,7 +4010,7 @@
 </p:sld>
 </file>
 
-<file path=ppt/slides/slide15.xml><?xml version="1.0" encoding="utf-8"?>
+<file path=ppt/slides/slide16.xml><?xml version="1.0" encoding="utf-8"?>
 <p:sld xmlns:a="http://schemas.openxmlformats.org/drawingml/2006/main" xmlns:r="http://schemas.openxmlformats.org/officeDocument/2006/relationships" xmlns:p="http://schemas.openxmlformats.org/presentationml/2006/main">
   <p:cSld>
     <p:spTree>
@@ -4003,103 +4136,6 @@
 </p:sld>
 </file>
 
-<file path=ppt/slides/slide16.xml><?xml version="1.0" encoding="utf-8"?>
-<p:sld xmlns:a="http://schemas.openxmlformats.org/drawingml/2006/main" xmlns:r="http://schemas.openxmlformats.org/officeDocument/2006/relationships" xmlns:p="http://schemas.openxmlformats.org/presentationml/2006/main">
-  <p:cSld>
-    <p:spTree>
-      <p:nvGrpSpPr>
-        <p:cNvPr id="1" name=""/>
-        <p:cNvGrpSpPr/>
-        <p:nvPr/>
-      </p:nvGrpSpPr>
-      <p:grpSpPr>
-        <a:xfrm>
-          <a:off x="0" y="0"/>
-          <a:ext cx="0" cy="0"/>
-          <a:chOff x="0" y="0"/>
-          <a:chExt cx="0" cy="0"/>
-        </a:xfrm>
-      </p:grpSpPr>
-      <p:sp>
-        <p:nvSpPr>
-          <p:cNvPr id="2" name="Title 1"/>
-          <p:cNvSpPr>
-            <a:spLocks noGrp="1"/>
-          </p:cNvSpPr>
-          <p:nvPr>
-            <p:ph type="title"/>
-          </p:nvPr>
-        </p:nvSpPr>
-        <p:spPr/>
-        <p:txBody>
-          <a:bodyPr/>
-          <a:lstStyle/>
-          <a:p>
-            <a:r>
-              <a:rPr lang="en-US" dirty="0"/>
-              <a:t>VPC IP addressing</a:t>
-            </a:r>
-          </a:p>
-        </p:txBody>
-      </p:sp>
-      <p:sp>
-        <p:nvSpPr>
-          <p:cNvPr id="3" name="Content Placeholder 2"/>
-          <p:cNvSpPr>
-            <a:spLocks noGrp="1"/>
-          </p:cNvSpPr>
-          <p:nvPr>
-            <p:ph idx="1"/>
-          </p:nvPr>
-        </p:nvSpPr>
-        <p:spPr/>
-        <p:txBody>
-          <a:bodyPr>
-            <a:normAutofit fontScale="92500" lnSpcReduction="20000"/>
-          </a:bodyPr>
-          <a:lstStyle/>
-          <a:p>
-            <a:r>
-              <a:rPr lang="en-US" dirty="0"/>
-              <a:t>Every EC2 instance has a private IP address, automatically assigned based on the subnet.</a:t>
-            </a:r>
-          </a:p>
-          <a:p>
-            <a:endParaRPr lang="en-US" dirty="0"/>
-          </a:p>
-          <a:p>
-            <a:r>
-              <a:rPr lang="en-US" dirty="0"/>
-              <a:t>Some instances may also have a dynamically assigned public IP address based on subnet setting.</a:t>
-            </a:r>
-          </a:p>
-          <a:p>
-            <a:endParaRPr lang="en-US" dirty="0"/>
-          </a:p>
-          <a:p>
-            <a:r>
-              <a:rPr lang="en-US" dirty="0"/>
-              <a:t>Dynamically assigned public IP addresses are pulled from a general pool and change every time an instance starts.</a:t>
-            </a:r>
-          </a:p>
-          <a:p>
-            <a:endParaRPr lang="en-US" dirty="0"/>
-          </a:p>
-        </p:txBody>
-      </p:sp>
-    </p:spTree>
-    <p:extLst>
-      <p:ext uri="{BB962C8B-B14F-4D97-AF65-F5344CB8AC3E}">
-        <p14:creationId xmlns:p14="http://schemas.microsoft.com/office/powerpoint/2010/main" val="1088868007"/>
-      </p:ext>
-    </p:extLst>
-  </p:cSld>
-  <p:clrMapOvr>
-    <a:masterClrMapping/>
-  </p:clrMapOvr>
-</p:sld>
-</file>
-
 <file path=ppt/slides/slide17.xml><?xml version="1.0" encoding="utf-8"?>
 <p:sld xmlns:a="http://schemas.openxmlformats.org/drawingml/2006/main" xmlns:r="http://schemas.openxmlformats.org/officeDocument/2006/relationships" xmlns:p="http://schemas.openxmlformats.org/presentationml/2006/main">
   <p:cSld>
@@ -4134,6 +4170,103 @@
           <a:p>
             <a:r>
               <a:rPr lang="en-US" dirty="0"/>
+              <a:t>VPC IP addressing</a:t>
+            </a:r>
+          </a:p>
+        </p:txBody>
+      </p:sp>
+      <p:sp>
+        <p:nvSpPr>
+          <p:cNvPr id="3" name="Content Placeholder 2"/>
+          <p:cNvSpPr>
+            <a:spLocks noGrp="1"/>
+          </p:cNvSpPr>
+          <p:nvPr>
+            <p:ph idx="1"/>
+          </p:nvPr>
+        </p:nvSpPr>
+        <p:spPr/>
+        <p:txBody>
+          <a:bodyPr>
+            <a:normAutofit fontScale="92500" lnSpcReduction="20000"/>
+          </a:bodyPr>
+          <a:lstStyle/>
+          <a:p>
+            <a:r>
+              <a:rPr lang="en-US" dirty="0"/>
+              <a:t>Every EC2 instance has a private IP address, automatically assigned based on the subnet.</a:t>
+            </a:r>
+          </a:p>
+          <a:p>
+            <a:endParaRPr lang="en-US" dirty="0"/>
+          </a:p>
+          <a:p>
+            <a:r>
+              <a:rPr lang="en-US" dirty="0"/>
+              <a:t>Some instances may also have a dynamically assigned public IP address based on subnet setting.</a:t>
+            </a:r>
+          </a:p>
+          <a:p>
+            <a:endParaRPr lang="en-US" dirty="0"/>
+          </a:p>
+          <a:p>
+            <a:r>
+              <a:rPr lang="en-US" dirty="0"/>
+              <a:t>Dynamically assigned public IP addresses are pulled from a general pool and change every time an instance starts.</a:t>
+            </a:r>
+          </a:p>
+          <a:p>
+            <a:endParaRPr lang="en-US" dirty="0"/>
+          </a:p>
+        </p:txBody>
+      </p:sp>
+    </p:spTree>
+    <p:extLst>
+      <p:ext uri="{BB962C8B-B14F-4D97-AF65-F5344CB8AC3E}">
+        <p14:creationId xmlns:p14="http://schemas.microsoft.com/office/powerpoint/2010/main" val="1088868007"/>
+      </p:ext>
+    </p:extLst>
+  </p:cSld>
+  <p:clrMapOvr>
+    <a:masterClrMapping/>
+  </p:clrMapOvr>
+</p:sld>
+</file>
+
+<file path=ppt/slides/slide18.xml><?xml version="1.0" encoding="utf-8"?>
+<p:sld xmlns:a="http://schemas.openxmlformats.org/drawingml/2006/main" xmlns:r="http://schemas.openxmlformats.org/officeDocument/2006/relationships" xmlns:p="http://schemas.openxmlformats.org/presentationml/2006/main">
+  <p:cSld>
+    <p:spTree>
+      <p:nvGrpSpPr>
+        <p:cNvPr id="1" name=""/>
+        <p:cNvGrpSpPr/>
+        <p:nvPr/>
+      </p:nvGrpSpPr>
+      <p:grpSpPr>
+        <a:xfrm>
+          <a:off x="0" y="0"/>
+          <a:ext cx="0" cy="0"/>
+          <a:chOff x="0" y="0"/>
+          <a:chExt cx="0" cy="0"/>
+        </a:xfrm>
+      </p:grpSpPr>
+      <p:sp>
+        <p:nvSpPr>
+          <p:cNvPr id="2" name="Title 1"/>
+          <p:cNvSpPr>
+            <a:spLocks noGrp="1"/>
+          </p:cNvSpPr>
+          <p:nvPr>
+            <p:ph type="title"/>
+          </p:nvPr>
+        </p:nvSpPr>
+        <p:spPr/>
+        <p:txBody>
+          <a:bodyPr/>
+          <a:lstStyle/>
+          <a:p>
+            <a:r>
+              <a:rPr lang="en-US" dirty="0"/>
               <a:t>Elastic IP</a:t>
             </a:r>
           </a:p>
@@ -4200,7 +4333,7 @@
 </p:sld>
 </file>
 
-<file path=ppt/slides/slide18.xml><?xml version="1.0" encoding="utf-8"?>
+<file path=ppt/slides/slide19.xml><?xml version="1.0" encoding="utf-8"?>
 <p:sld xmlns:a="http://schemas.openxmlformats.org/drawingml/2006/main" xmlns:r="http://schemas.openxmlformats.org/officeDocument/2006/relationships" xmlns:p="http://schemas.openxmlformats.org/presentationml/2006/main">
   <p:cSld>
     <p:spTree>
@@ -4337,7 +4470,175 @@
 </p:sld>
 </file>
 
-<file path=ppt/slides/slide19.xml><?xml version="1.0" encoding="utf-8"?>
+<file path=ppt/slides/slide2.xml><?xml version="1.0" encoding="utf-8"?>
+<p:sld xmlns:a="http://schemas.openxmlformats.org/drawingml/2006/main" xmlns:r="http://schemas.openxmlformats.org/officeDocument/2006/relationships" xmlns:p="http://schemas.openxmlformats.org/presentationml/2006/main">
+  <p:cSld>
+    <p:spTree>
+      <p:nvGrpSpPr>
+        <p:cNvPr id="1" name=""/>
+        <p:cNvGrpSpPr/>
+        <p:nvPr/>
+      </p:nvGrpSpPr>
+      <p:grpSpPr>
+        <a:xfrm>
+          <a:off x="0" y="0"/>
+          <a:ext cx="0" cy="0"/>
+          <a:chOff x="0" y="0"/>
+          <a:chExt cx="0" cy="0"/>
+        </a:xfrm>
+      </p:grpSpPr>
+      <p:sp>
+        <p:nvSpPr>
+          <p:cNvPr id="2" name="Title 1"/>
+          <p:cNvSpPr>
+            <a:spLocks noGrp="1"/>
+          </p:cNvSpPr>
+          <p:nvPr>
+            <p:ph type="title"/>
+          </p:nvPr>
+        </p:nvSpPr>
+        <p:spPr/>
+        <p:txBody>
+          <a:bodyPr/>
+          <a:lstStyle/>
+          <a:p>
+            <a:r>
+              <a:rPr lang="en-US" dirty="0"/>
+              <a:t>Agenda</a:t>
+            </a:r>
+          </a:p>
+        </p:txBody>
+      </p:sp>
+      <p:sp>
+        <p:nvSpPr>
+          <p:cNvPr id="3" name="Content Placeholder 2"/>
+          <p:cNvSpPr>
+            <a:spLocks noGrp="1"/>
+          </p:cNvSpPr>
+          <p:nvPr>
+            <p:ph idx="1"/>
+          </p:nvPr>
+        </p:nvSpPr>
+        <p:spPr/>
+        <p:txBody>
+          <a:bodyPr>
+            <a:normAutofit fontScale="77500" lnSpcReduction="20000"/>
+          </a:bodyPr>
+          <a:lstStyle/>
+          <a:p>
+            <a:r>
+              <a:rPr lang="en-US" dirty="0"/>
+              <a:t>EC2</a:t>
+            </a:r>
+          </a:p>
+          <a:p>
+            <a:pPr lvl="1"/>
+            <a:r>
+              <a:rPr lang="en-US" dirty="0"/>
+              <a:t>Elastic Load Balancing</a:t>
+            </a:r>
+          </a:p>
+          <a:p>
+            <a:pPr lvl="1"/>
+            <a:r>
+              <a:rPr lang="en-US" dirty="0"/>
+              <a:t>EFS</a:t>
+            </a:r>
+          </a:p>
+          <a:p>
+            <a:r>
+              <a:rPr lang="en-US" dirty="0"/>
+              <a:t>VPC</a:t>
+            </a:r>
+          </a:p>
+          <a:p>
+            <a:pPr lvl="1"/>
+            <a:r>
+              <a:rPr lang="en-US" dirty="0"/>
+              <a:t>Bastion hosts</a:t>
+            </a:r>
+          </a:p>
+          <a:p>
+            <a:pPr lvl="1"/>
+            <a:r>
+              <a:rPr lang="en-US" dirty="0" err="1"/>
+              <a:t>NATing</a:t>
+            </a:r>
+            <a:endParaRPr lang="en-US" dirty="0"/>
+          </a:p>
+          <a:p>
+            <a:r>
+              <a:rPr lang="en-US" dirty="0"/>
+              <a:t>Databases</a:t>
+            </a:r>
+          </a:p>
+          <a:p>
+            <a:pPr lvl="1"/>
+            <a:r>
+              <a:rPr lang="en-US" dirty="0"/>
+              <a:t>RDS</a:t>
+            </a:r>
+          </a:p>
+          <a:p>
+            <a:pPr lvl="1"/>
+            <a:r>
+              <a:rPr lang="en-US" dirty="0" err="1"/>
+              <a:t>ElastiCache</a:t>
+            </a:r>
+            <a:endParaRPr lang="en-US" dirty="0"/>
+          </a:p>
+          <a:p>
+            <a:pPr lvl="1"/>
+            <a:r>
+              <a:rPr lang="en-US" dirty="0"/>
+              <a:t>DynamoDB</a:t>
+            </a:r>
+          </a:p>
+          <a:p>
+            <a:pPr lvl="1"/>
+            <a:r>
+              <a:rPr lang="en-US" dirty="0"/>
+              <a:t>Redshift</a:t>
+            </a:r>
+          </a:p>
+          <a:p>
+            <a:pPr lvl="1"/>
+            <a:r>
+              <a:rPr lang="en-US" dirty="0"/>
+              <a:t>Elasticsearch</a:t>
+            </a:r>
+          </a:p>
+          <a:p>
+            <a:pPr lvl="1"/>
+            <a:r>
+              <a:rPr lang="en-US" dirty="0"/>
+              <a:t>Neptune</a:t>
+            </a:r>
+          </a:p>
+          <a:p>
+            <a:pPr lvl="1"/>
+            <a:endParaRPr lang="en-US" dirty="0"/>
+          </a:p>
+          <a:p>
+            <a:pPr lvl="1"/>
+            <a:endParaRPr lang="en-US" dirty="0"/>
+          </a:p>
+        </p:txBody>
+      </p:sp>
+    </p:spTree>
+    <p:extLst>
+      <p:ext uri="{BB962C8B-B14F-4D97-AF65-F5344CB8AC3E}">
+        <p14:creationId xmlns:p14="http://schemas.microsoft.com/office/powerpoint/2010/main" val="916232898"/>
+      </p:ext>
+    </p:extLst>
+  </p:cSld>
+  <p:clrMapOvr>
+    <a:masterClrMapping/>
+  </p:clrMapOvr>
+</p:sld>
+</file>
+
+<file path=ppt/slides/slide20.xml><?xml version="1.0" encoding="utf-8"?>
 <p:sld xmlns:a="http://schemas.openxmlformats.org/drawingml/2006/main" xmlns:r="http://schemas.openxmlformats.org/officeDocument/2006/relationships" xmlns:p="http://schemas.openxmlformats.org/presentationml/2006/main">
   <p:cSld>
     <p:spTree>
@@ -4459,152 +4760,7 @@
 </p:sld>
 </file>
 
-<file path=ppt/slides/slide2.xml><?xml version="1.0" encoding="utf-8"?>
-<p:sld xmlns:a="http://schemas.openxmlformats.org/drawingml/2006/main" xmlns:r="http://schemas.openxmlformats.org/officeDocument/2006/relationships" xmlns:p="http://schemas.openxmlformats.org/presentationml/2006/main">
-  <p:cSld>
-    <p:spTree>
-      <p:nvGrpSpPr>
-        <p:cNvPr id="1" name=""/>
-        <p:cNvGrpSpPr/>
-        <p:nvPr/>
-      </p:nvGrpSpPr>
-      <p:grpSpPr>
-        <a:xfrm>
-          <a:off x="0" y="0"/>
-          <a:ext cx="0" cy="0"/>
-          <a:chOff x="0" y="0"/>
-          <a:chExt cx="0" cy="0"/>
-        </a:xfrm>
-      </p:grpSpPr>
-      <p:sp>
-        <p:nvSpPr>
-          <p:cNvPr id="2" name="Title 1"/>
-          <p:cNvSpPr>
-            <a:spLocks noGrp="1"/>
-          </p:cNvSpPr>
-          <p:nvPr>
-            <p:ph type="title"/>
-          </p:nvPr>
-        </p:nvSpPr>
-        <p:spPr/>
-        <p:txBody>
-          <a:bodyPr/>
-          <a:lstStyle/>
-          <a:p>
-            <a:r>
-              <a:rPr lang="en-US" dirty="0"/>
-              <a:t>Agenda</a:t>
-            </a:r>
-          </a:p>
-        </p:txBody>
-      </p:sp>
-      <p:sp>
-        <p:nvSpPr>
-          <p:cNvPr id="3" name="Content Placeholder 2"/>
-          <p:cNvSpPr>
-            <a:spLocks noGrp="1"/>
-          </p:cNvSpPr>
-          <p:nvPr>
-            <p:ph idx="1"/>
-          </p:nvPr>
-        </p:nvSpPr>
-        <p:spPr/>
-        <p:txBody>
-          <a:bodyPr>
-            <a:normAutofit lnSpcReduction="10000"/>
-          </a:bodyPr>
-          <a:lstStyle/>
-          <a:p>
-            <a:r>
-              <a:rPr lang="en-US" dirty="0"/>
-              <a:t>EC2</a:t>
-            </a:r>
-          </a:p>
-          <a:p>
-            <a:pPr lvl="1"/>
-            <a:r>
-              <a:rPr lang="en-US" dirty="0"/>
-              <a:t>Elastic Load Balancing</a:t>
-            </a:r>
-          </a:p>
-          <a:p>
-            <a:pPr lvl="1"/>
-            <a:r>
-              <a:rPr lang="en-US" dirty="0"/>
-              <a:t>Placement Groups</a:t>
-            </a:r>
-          </a:p>
-          <a:p>
-            <a:pPr lvl="1"/>
-            <a:r>
-              <a:rPr lang="en-US" dirty="0"/>
-              <a:t>EFS</a:t>
-            </a:r>
-          </a:p>
-          <a:p>
-            <a:r>
-              <a:rPr lang="en-US" dirty="0"/>
-              <a:t>VPC</a:t>
-            </a:r>
-          </a:p>
-          <a:p>
-            <a:pPr lvl="1"/>
-            <a:r>
-              <a:rPr lang="en-US" dirty="0"/>
-              <a:t>Bastion hosts</a:t>
-            </a:r>
-          </a:p>
-          <a:p>
-            <a:pPr lvl="1"/>
-            <a:r>
-              <a:rPr lang="en-US" dirty="0" err="1"/>
-              <a:t>NATing</a:t>
-            </a:r>
-            <a:endParaRPr lang="en-US" dirty="0"/>
-          </a:p>
-          <a:p>
-            <a:r>
-              <a:rPr lang="en-US" dirty="0"/>
-              <a:t>RDS</a:t>
-            </a:r>
-          </a:p>
-          <a:p>
-            <a:r>
-              <a:rPr lang="en-US" dirty="0" err="1"/>
-              <a:t>DynamoDB</a:t>
-            </a:r>
-            <a:r>
-              <a:rPr lang="en-US" dirty="0"/>
-              <a:t>, Redshift</a:t>
-            </a:r>
-          </a:p>
-          <a:p>
-            <a:endParaRPr lang="en-US" dirty="0"/>
-          </a:p>
-          <a:p>
-            <a:pPr lvl="1"/>
-            <a:endParaRPr lang="en-US" dirty="0"/>
-          </a:p>
-          <a:p>
-            <a:pPr lvl="1"/>
-            <a:endParaRPr lang="en-US" dirty="0"/>
-          </a:p>
-        </p:txBody>
-      </p:sp>
-    </p:spTree>
-    <p:extLst>
-      <p:ext uri="{BB962C8B-B14F-4D97-AF65-F5344CB8AC3E}">
-        <p14:creationId xmlns:p14="http://schemas.microsoft.com/office/powerpoint/2010/main" val="916232898"/>
-      </p:ext>
-    </p:extLst>
-  </p:cSld>
-  <p:clrMapOvr>
-    <a:masterClrMapping/>
-  </p:clrMapOvr>
-</p:sld>
-</file>
-
-<file path=ppt/slides/slide20.xml><?xml version="1.0" encoding="utf-8"?>
+<file path=ppt/slides/slide21.xml><?xml version="1.0" encoding="utf-8"?>
 <p:sld xmlns:a="http://schemas.openxmlformats.org/drawingml/2006/main" xmlns:r="http://schemas.openxmlformats.org/officeDocument/2006/relationships" xmlns:p="http://schemas.openxmlformats.org/presentationml/2006/main">
   <p:cSld>
     <p:spTree>
@@ -4709,7 +4865,7 @@
 </p:sld>
 </file>
 
-<file path=ppt/slides/slide21.xml><?xml version="1.0" encoding="utf-8"?>
+<file path=ppt/slides/slide22.xml><?xml version="1.0" encoding="utf-8"?>
 <p:sld xmlns:a="http://schemas.openxmlformats.org/drawingml/2006/main" xmlns:r="http://schemas.openxmlformats.org/officeDocument/2006/relationships" xmlns:p="http://schemas.openxmlformats.org/presentationml/2006/main">
   <p:cSld>
     <p:spTree>
@@ -4844,7 +5000,7 @@
 </p:sld>
 </file>
 
-<file path=ppt/slides/slide22.xml><?xml version="1.0" encoding="utf-8"?>
+<file path=ppt/slides/slide23.xml><?xml version="1.0" encoding="utf-8"?>
 <p:sld xmlns:a="http://schemas.openxmlformats.org/drawingml/2006/main" xmlns:r="http://schemas.openxmlformats.org/officeDocument/2006/relationships" xmlns:p="http://schemas.openxmlformats.org/presentationml/2006/main">
   <p:cSld>
     <p:spTree>
@@ -4920,7 +5076,7 @@
 </p:sld>
 </file>
 
-<file path=ppt/slides/slide23.xml><?xml version="1.0" encoding="utf-8"?>
+<file path=ppt/slides/slide24.xml><?xml version="1.0" encoding="utf-8"?>
 <p:sld xmlns:a="http://schemas.openxmlformats.org/drawingml/2006/main" xmlns:r="http://schemas.openxmlformats.org/officeDocument/2006/relationships" xmlns:p="http://schemas.openxmlformats.org/presentationml/2006/main">
   <p:cSld>
     <p:spTree>
@@ -5062,7 +5218,7 @@
 </p:sld>
 </file>
 
-<file path=ppt/slides/slide24.xml><?xml version="1.0" encoding="utf-8"?>
+<file path=ppt/slides/slide25.xml><?xml version="1.0" encoding="utf-8"?>
 <p:sld xmlns:a="http://schemas.openxmlformats.org/drawingml/2006/main" xmlns:r="http://schemas.openxmlformats.org/officeDocument/2006/relationships" xmlns:p="http://schemas.openxmlformats.org/presentationml/2006/main">
   <p:cSld>
     <p:spTree>
@@ -5192,7 +5348,7 @@
 </p:sld>
 </file>
 
-<file path=ppt/slides/slide25.xml><?xml version="1.0" encoding="utf-8"?>
+<file path=ppt/slides/slide26.xml><?xml version="1.0" encoding="utf-8"?>
 <p:sld xmlns:a="http://schemas.openxmlformats.org/drawingml/2006/main" xmlns:r="http://schemas.openxmlformats.org/officeDocument/2006/relationships" xmlns:p="http://schemas.openxmlformats.org/presentationml/2006/main">
   <p:cSld>
     <p:spTree>
@@ -5300,7 +5456,7 @@
 </p:sld>
 </file>
 
-<file path=ppt/slides/slide26.xml><?xml version="1.0" encoding="utf-8"?>
+<file path=ppt/slides/slide27.xml><?xml version="1.0" encoding="utf-8"?>
 <p:sld xmlns:a="http://schemas.openxmlformats.org/drawingml/2006/main" xmlns:r="http://schemas.openxmlformats.org/officeDocument/2006/relationships" xmlns:p="http://schemas.openxmlformats.org/presentationml/2006/main">
   <p:cSld>
     <p:spTree>
@@ -5487,7 +5643,7 @@
 </p:sld>
 </file>
 
-<file path=ppt/slides/slide27.xml><?xml version="1.0" encoding="utf-8"?>
+<file path=ppt/slides/slide28.xml><?xml version="1.0" encoding="utf-8"?>
 <p:sld xmlns:a="http://schemas.openxmlformats.org/drawingml/2006/main" xmlns:r="http://schemas.openxmlformats.org/officeDocument/2006/relationships" xmlns:p="http://schemas.openxmlformats.org/presentationml/2006/main">
   <p:cSld>
     <p:spTree>
@@ -5726,7 +5882,7 @@
 </p:sld>
 </file>
 
-<file path=ppt/slides/slide28.xml><?xml version="1.0" encoding="utf-8"?>
+<file path=ppt/slides/slide29.xml><?xml version="1.0" encoding="utf-8"?>
 <p:sld xmlns:a="http://schemas.openxmlformats.org/drawingml/2006/main" xmlns:r="http://schemas.openxmlformats.org/officeDocument/2006/relationships" xmlns:p="http://schemas.openxmlformats.org/presentationml/2006/main">
   <p:cSld>
     <p:spTree>
@@ -5811,7 +5967,7 @@
       </p:sp>
       <p:pic>
         <p:nvPicPr>
-          <p:cNvPr id="4" name="Picture 3"/>
+          <p:cNvPr id="5" name="Picture 4"/>
           <p:cNvPicPr>
             <a:picLocks noChangeAspect="1"/>
           </p:cNvPicPr>
@@ -5819,30 +5975,6 @@
         </p:nvPicPr>
         <p:blipFill>
           <a:blip r:embed="rId2"/>
-          <a:stretch>
-            <a:fillRect/>
-          </a:stretch>
-        </p:blipFill>
-        <p:spPr>
-          <a:xfrm>
-            <a:off x="7785179" y="1417638"/>
-            <a:ext cx="901621" cy="901621"/>
-          </a:xfrm>
-          <a:prstGeom prst="rect">
-            <a:avLst/>
-          </a:prstGeom>
-        </p:spPr>
-      </p:pic>
-      <p:pic>
-        <p:nvPicPr>
-          <p:cNvPr id="5" name="Picture 4"/>
-          <p:cNvPicPr>
-            <a:picLocks noChangeAspect="1"/>
-          </p:cNvPicPr>
-          <p:nvPr/>
-        </p:nvPicPr>
-        <p:blipFill>
-          <a:blip r:embed="rId3"/>
           <a:stretch>
             <a:fillRect/>
           </a:stretch>
@@ -5866,7 +5998,7 @@
           <p:nvPr/>
         </p:nvPicPr>
         <p:blipFill>
-          <a:blip r:embed="rId4"/>
+          <a:blip r:embed="rId3"/>
           <a:stretch>
             <a:fillRect/>
           </a:stretch>
@@ -5881,150 +6013,46 @@
           </a:prstGeom>
         </p:spPr>
       </p:pic>
+      <p:pic>
+        <p:nvPicPr>
+          <p:cNvPr id="7" name="Graphic 6">
+            <a:extLst>
+              <a:ext uri="{FF2B5EF4-FFF2-40B4-BE49-F238E27FC236}">
+                <a16:creationId xmlns:a16="http://schemas.microsoft.com/office/drawing/2014/main" id="{381FEBC1-B1C1-914A-B171-625442CF24E2}"/>
+              </a:ext>
+            </a:extLst>
+          </p:cNvPr>
+          <p:cNvPicPr>
+            <a:picLocks noChangeAspect="1"/>
+          </p:cNvPicPr>
+          <p:nvPr/>
+        </p:nvPicPr>
+        <p:blipFill>
+          <a:blip r:embed="rId4">
+            <a:extLst>
+              <a:ext uri="{96DAC541-7B7A-43D3-8B79-37D633B846F1}">
+                <asvg:svgBlip xmlns:asvg="http://schemas.microsoft.com/office/drawing/2016/SVG/main" r:embed="rId5"/>
+              </a:ext>
+            </a:extLst>
+          </a:blip>
+          <a:stretch>
+            <a:fillRect/>
+          </a:stretch>
+        </p:blipFill>
+        <p:spPr>
+          <a:xfrm>
+            <a:off x="7508772" y="1417638"/>
+            <a:ext cx="1178028" cy="1178028"/>
+          </a:xfrm>
+          <a:prstGeom prst="rect">
+            <a:avLst/>
+          </a:prstGeom>
+        </p:spPr>
+      </p:pic>
     </p:spTree>
     <p:extLst>
       <p:ext uri="{BB962C8B-B14F-4D97-AF65-F5344CB8AC3E}">
         <p14:creationId xmlns:p14="http://schemas.microsoft.com/office/powerpoint/2010/main" val="1722707233"/>
-      </p:ext>
-    </p:extLst>
-  </p:cSld>
-  <p:clrMapOvr>
-    <a:masterClrMapping/>
-  </p:clrMapOvr>
-</p:sld>
-</file>
-
-<file path=ppt/slides/slide29.xml><?xml version="1.0" encoding="utf-8"?>
-<p:sld xmlns:a="http://schemas.openxmlformats.org/drawingml/2006/main" xmlns:r="http://schemas.openxmlformats.org/officeDocument/2006/relationships" xmlns:p="http://schemas.openxmlformats.org/presentationml/2006/main">
-  <p:cSld>
-    <p:spTree>
-      <p:nvGrpSpPr>
-        <p:cNvPr id="1" name=""/>
-        <p:cNvGrpSpPr/>
-        <p:nvPr/>
-      </p:nvGrpSpPr>
-      <p:grpSpPr>
-        <a:xfrm>
-          <a:off x="0" y="0"/>
-          <a:ext cx="0" cy="0"/>
-          <a:chOff x="0" y="0"/>
-          <a:chExt cx="0" cy="0"/>
-        </a:xfrm>
-      </p:grpSpPr>
-      <p:sp>
-        <p:nvSpPr>
-          <p:cNvPr id="2" name="Title 1"/>
-          <p:cNvSpPr>
-            <a:spLocks noGrp="1"/>
-          </p:cNvSpPr>
-          <p:nvPr>
-            <p:ph type="title"/>
-          </p:nvPr>
-        </p:nvSpPr>
-        <p:spPr/>
-        <p:txBody>
-          <a:bodyPr/>
-          <a:lstStyle/>
-          <a:p>
-            <a:r>
-              <a:rPr lang="en-US" dirty="0"/>
-              <a:t>RDS</a:t>
-            </a:r>
-          </a:p>
-        </p:txBody>
-      </p:sp>
-      <p:sp>
-        <p:nvSpPr>
-          <p:cNvPr id="3" name="Content Placeholder 2"/>
-          <p:cNvSpPr>
-            <a:spLocks noGrp="1"/>
-          </p:cNvSpPr>
-          <p:nvPr>
-            <p:ph idx="1"/>
-          </p:nvPr>
-        </p:nvSpPr>
-        <p:spPr/>
-        <p:txBody>
-          <a:bodyPr>
-            <a:normAutofit fontScale="85000" lnSpcReduction="10000"/>
-          </a:bodyPr>
-          <a:lstStyle/>
-          <a:p>
-            <a:r>
-              <a:rPr lang="en-US" dirty="0"/>
-              <a:t>Supported databases:</a:t>
-            </a:r>
-          </a:p>
-          <a:p>
-            <a:pPr lvl="1"/>
-            <a:r>
-              <a:rPr lang="en-US" dirty="0"/>
-              <a:t>MySQL</a:t>
-            </a:r>
-          </a:p>
-          <a:p>
-            <a:pPr lvl="1"/>
-            <a:r>
-              <a:rPr lang="en-US" dirty="0" err="1"/>
-              <a:t>MariaDB</a:t>
-            </a:r>
-            <a:r>
-              <a:rPr lang="en-US" dirty="0"/>
-              <a:t> (MySQL fork)</a:t>
-            </a:r>
-          </a:p>
-          <a:p>
-            <a:pPr lvl="1"/>
-            <a:r>
-              <a:rPr lang="en-US" dirty="0"/>
-              <a:t>Microsoft SQL Server</a:t>
-            </a:r>
-          </a:p>
-          <a:p>
-            <a:pPr lvl="1"/>
-            <a:r>
-              <a:rPr lang="en-US" dirty="0"/>
-              <a:t>Oracle</a:t>
-            </a:r>
-          </a:p>
-          <a:p>
-            <a:pPr lvl="1"/>
-            <a:r>
-              <a:rPr lang="en-US" dirty="0" err="1"/>
-              <a:t>PostgreSQL</a:t>
-            </a:r>
-            <a:endParaRPr lang="en-US" dirty="0"/>
-          </a:p>
-          <a:p>
-            <a:pPr lvl="1"/>
-            <a:r>
-              <a:rPr lang="en-US" dirty="0"/>
-              <a:t>Aurora (designed by AWS)</a:t>
-            </a:r>
-          </a:p>
-          <a:p>
-            <a:pPr lvl="2"/>
-            <a:r>
-              <a:rPr lang="en-US" dirty="0"/>
-              <a:t>MySQL &amp; PostgreSQL compatible engines</a:t>
-            </a:r>
-          </a:p>
-          <a:p>
-            <a:pPr lvl="1"/>
-            <a:endParaRPr lang="en-US" dirty="0"/>
-          </a:p>
-          <a:p>
-            <a:r>
-              <a:rPr lang="en-US" dirty="0"/>
-              <a:t>RDS provides an endpoint for each database which is used by an application for communication.</a:t>
-            </a:r>
-          </a:p>
-        </p:txBody>
-      </p:sp>
-    </p:spTree>
-    <p:extLst>
-      <p:ext uri="{BB962C8B-B14F-4D97-AF65-F5344CB8AC3E}">
-        <p14:creationId xmlns:p14="http://schemas.microsoft.com/office/powerpoint/2010/main" val="2135207824"/>
       </p:ext>
     </p:extLst>
   </p:cSld>
@@ -6140,22 +6168,34 @@
       </p:sp>
       <p:pic>
         <p:nvPicPr>
-          <p:cNvPr id="4" name="Picture 3"/>
+          <p:cNvPr id="5" name="Graphic 4">
+            <a:extLst>
+              <a:ext uri="{FF2B5EF4-FFF2-40B4-BE49-F238E27FC236}">
+                <a16:creationId xmlns:a16="http://schemas.microsoft.com/office/drawing/2014/main" id="{E02D177E-9FDD-684D-B509-263E849079C9}"/>
+              </a:ext>
+            </a:extLst>
+          </p:cNvPr>
           <p:cNvPicPr>
             <a:picLocks noChangeAspect="1"/>
           </p:cNvPicPr>
           <p:nvPr/>
         </p:nvPicPr>
         <p:blipFill>
-          <a:blip r:embed="rId2"/>
+          <a:blip r:embed="rId2">
+            <a:extLst>
+              <a:ext uri="{96DAC541-7B7A-43D3-8B79-37D633B846F1}">
+                <asvg:svgBlip xmlns:asvg="http://schemas.microsoft.com/office/drawing/2016/SVG/main" r:embed="rId3"/>
+              </a:ext>
+            </a:extLst>
+          </a:blip>
           <a:stretch>
             <a:fillRect/>
           </a:stretch>
         </p:blipFill>
         <p:spPr>
           <a:xfrm>
-            <a:off x="7984941" y="998844"/>
-            <a:ext cx="837588" cy="837588"/>
+            <a:off x="7975600" y="706438"/>
+            <a:ext cx="893762" cy="893762"/>
           </a:xfrm>
           <a:prstGeom prst="rect">
             <a:avLst/>
@@ -6224,84 +6264,80 @@
             <p:ph idx="1"/>
           </p:nvPr>
         </p:nvSpPr>
-        <p:spPr>
-          <a:xfrm>
-            <a:off x="457200" y="1600200"/>
-            <a:ext cx="8229600" cy="5106916"/>
-          </a:xfrm>
-        </p:spPr>
+        <p:spPr/>
         <p:txBody>
           <a:bodyPr>
-            <a:normAutofit fontScale="70000" lnSpcReduction="20000"/>
+            <a:normAutofit fontScale="85000" lnSpcReduction="10000"/>
           </a:bodyPr>
           <a:lstStyle/>
           <a:p>
             <a:r>
               <a:rPr lang="en-US" dirty="0"/>
-              <a:t>RDS supports two different database backup schemes:</a:t>
-            </a:r>
-          </a:p>
-          <a:p>
-            <a:pPr lvl="1"/>
-            <a:r>
-              <a:rPr lang="en-US" dirty="0"/>
-              <a:t>automated backups</a:t>
-            </a:r>
-          </a:p>
-          <a:p>
-            <a:pPr lvl="1"/>
-            <a:r>
-              <a:rPr lang="en-US" dirty="0"/>
-              <a:t>snapshots.</a:t>
-            </a:r>
-          </a:p>
-          <a:p>
-            <a:endParaRPr lang="en-US" dirty="0"/>
-          </a:p>
-          <a:p>
-            <a:r>
-              <a:rPr lang="en-US" dirty="0"/>
-              <a:t>Automated backups: RDS performs a full daily backup of the database and stores transaction logs since the backup job.</a:t>
-            </a:r>
-          </a:p>
-          <a:p>
-            <a:pPr lvl="1"/>
-            <a:r>
-              <a:rPr lang="en-US" dirty="0"/>
-              <a:t>Retains backup data for 1 to 35 days.</a:t>
-            </a:r>
-          </a:p>
-          <a:p>
-            <a:pPr lvl="1"/>
-            <a:endParaRPr lang="en-US" dirty="0"/>
-          </a:p>
-          <a:p>
-            <a:pPr lvl="1"/>
-            <a:r>
-              <a:rPr lang="en-US" dirty="0"/>
-              <a:t>During recovery full backup is restored and then transaction logs are replayed.</a:t>
-            </a:r>
-          </a:p>
-          <a:p>
-            <a:pPr lvl="1"/>
-            <a:endParaRPr lang="en-US" dirty="0"/>
-          </a:p>
-          <a:p>
-            <a:pPr lvl="1"/>
-            <a:r>
-              <a:rPr lang="en-US" dirty="0"/>
-              <a:t>Backup data is stored on S3.</a:t>
-            </a:r>
-          </a:p>
-          <a:p>
-            <a:pPr lvl="1"/>
-            <a:endParaRPr lang="en-US" dirty="0"/>
-          </a:p>
-          <a:p>
-            <a:pPr lvl="1"/>
-            <a:r>
-              <a:rPr lang="en-US" dirty="0"/>
-              <a:t>Backups occur during a specified window and the database storage I/O may be significantly reduced.</a:t>
+              <a:t>Supported databases:</a:t>
+            </a:r>
+          </a:p>
+          <a:p>
+            <a:pPr lvl="1"/>
+            <a:r>
+              <a:rPr lang="en-US" dirty="0"/>
+              <a:t>MySQL</a:t>
+            </a:r>
+          </a:p>
+          <a:p>
+            <a:pPr lvl="1"/>
+            <a:r>
+              <a:rPr lang="en-US" dirty="0" err="1"/>
+              <a:t>MariaDB</a:t>
+            </a:r>
+            <a:r>
+              <a:rPr lang="en-US" dirty="0"/>
+              <a:t> (MySQL fork)</a:t>
+            </a:r>
+          </a:p>
+          <a:p>
+            <a:pPr lvl="1"/>
+            <a:r>
+              <a:rPr lang="en-US" dirty="0"/>
+              <a:t>Microsoft SQL Server</a:t>
+            </a:r>
+          </a:p>
+          <a:p>
+            <a:pPr lvl="1"/>
+            <a:r>
+              <a:rPr lang="en-US" dirty="0"/>
+              <a:t>Oracle</a:t>
+            </a:r>
+          </a:p>
+          <a:p>
+            <a:pPr lvl="1"/>
+            <a:r>
+              <a:rPr lang="en-US" dirty="0" err="1"/>
+              <a:t>PostgreSQL</a:t>
+            </a:r>
+            <a:endParaRPr lang="en-US" dirty="0"/>
+          </a:p>
+          <a:p>
+            <a:pPr lvl="1"/>
+            <a:r>
+              <a:rPr lang="en-US" dirty="0"/>
+              <a:t>Aurora (designed by AWS)</a:t>
+            </a:r>
+          </a:p>
+          <a:p>
+            <a:pPr lvl="2"/>
+            <a:r>
+              <a:rPr lang="en-US" dirty="0"/>
+              <a:t>MySQL &amp; PostgreSQL compatible engines</a:t>
+            </a:r>
+          </a:p>
+          <a:p>
+            <a:pPr lvl="1"/>
+            <a:endParaRPr lang="en-US" dirty="0"/>
+          </a:p>
+          <a:p>
+            <a:r>
+              <a:rPr lang="en-US" dirty="0"/>
+              <a:t>RDS provides an endpoint for each database which is used by an application for communication.</a:t>
             </a:r>
           </a:p>
         </p:txBody>
@@ -6309,7 +6345,7 @@
     </p:spTree>
     <p:extLst>
       <p:ext uri="{BB962C8B-B14F-4D97-AF65-F5344CB8AC3E}">
-        <p14:creationId xmlns:p14="http://schemas.microsoft.com/office/powerpoint/2010/main" val="3250670807"/>
+        <p14:creationId xmlns:p14="http://schemas.microsoft.com/office/powerpoint/2010/main" val="2135207824"/>
       </p:ext>
     </p:extLst>
   </p:cSld>
@@ -6371,60 +6407,81 @@
         <p:spPr>
           <a:xfrm>
             <a:off x="457200" y="1600200"/>
-            <a:ext cx="8229600" cy="4959968"/>
+            <a:ext cx="8229600" cy="5106916"/>
           </a:xfrm>
         </p:spPr>
         <p:txBody>
           <a:bodyPr>
-            <a:normAutofit fontScale="85000" lnSpcReduction="20000"/>
+            <a:normAutofit fontScale="70000" lnSpcReduction="20000"/>
           </a:bodyPr>
           <a:lstStyle/>
           <a:p>
             <a:r>
               <a:rPr lang="en-US" dirty="0"/>
-              <a:t>RDS snapshots are initiated manually by the user and exist indefinitely – even after database is removed.</a:t>
-            </a:r>
-          </a:p>
-          <a:p>
-            <a:pPr lvl="1"/>
-            <a:r>
-              <a:rPr lang="en-US" dirty="0"/>
-              <a:t>It’s possible to use RDS data backups to copy databases (for testing or to move).</a:t>
-            </a:r>
-          </a:p>
-          <a:p>
-            <a:pPr lvl="1"/>
-            <a:endParaRPr lang="en-US" dirty="0"/>
-          </a:p>
-          <a:p>
-            <a:r>
-              <a:rPr lang="en-US" dirty="0"/>
-              <a:t>Multi-AZ capability provides standby database instance in a separate AZ for fail-over purposes.</a:t>
-            </a:r>
-          </a:p>
-          <a:p>
-            <a:pPr lvl="1"/>
-            <a:r>
-              <a:rPr lang="en-US" dirty="0"/>
-              <a:t>Writes to main database server are synchronized to the standby database.</a:t>
-            </a:r>
-          </a:p>
-          <a:p>
-            <a:pPr lvl="1"/>
-            <a:endParaRPr lang="en-US" dirty="0"/>
-          </a:p>
-          <a:p>
-            <a:pPr lvl="1"/>
-            <a:r>
-              <a:rPr lang="en-US" dirty="0"/>
-              <a:t>Main purpose is for greater service resiliency, it does not improve performance.</a:t>
-            </a:r>
-          </a:p>
-          <a:p>
-            <a:pPr lvl="2"/>
-            <a:r>
-              <a:rPr lang="en-US" dirty="0"/>
-              <a:t>Although, it allows RDS to update or backup a server without degrading I/O.</a:t>
+              <a:t>RDS supports two different database backup schemes:</a:t>
+            </a:r>
+          </a:p>
+          <a:p>
+            <a:pPr lvl="1"/>
+            <a:r>
+              <a:rPr lang="en-US" dirty="0"/>
+              <a:t>automated backups</a:t>
+            </a:r>
+          </a:p>
+          <a:p>
+            <a:pPr lvl="1"/>
+            <a:r>
+              <a:rPr lang="en-US" dirty="0"/>
+              <a:t>snapshots.</a:t>
+            </a:r>
+          </a:p>
+          <a:p>
+            <a:endParaRPr lang="en-US" dirty="0"/>
+          </a:p>
+          <a:p>
+            <a:r>
+              <a:rPr lang="en-US" dirty="0"/>
+              <a:t>Automated backups: RDS performs a full daily backup of the database and stores transaction logs since the backup job.</a:t>
+            </a:r>
+          </a:p>
+          <a:p>
+            <a:pPr lvl="1"/>
+            <a:r>
+              <a:rPr lang="en-US" dirty="0"/>
+              <a:t>Retains backup data for 1 to 35 days.</a:t>
+            </a:r>
+          </a:p>
+          <a:p>
+            <a:pPr lvl="1"/>
+            <a:endParaRPr lang="en-US" dirty="0"/>
+          </a:p>
+          <a:p>
+            <a:pPr lvl="1"/>
+            <a:r>
+              <a:rPr lang="en-US" dirty="0"/>
+              <a:t>During recovery full backup is restored and then transaction logs are replayed.</a:t>
+            </a:r>
+          </a:p>
+          <a:p>
+            <a:pPr lvl="1"/>
+            <a:endParaRPr lang="en-US" dirty="0"/>
+          </a:p>
+          <a:p>
+            <a:pPr lvl="1"/>
+            <a:r>
+              <a:rPr lang="en-US" dirty="0"/>
+              <a:t>Backup data is stored on S3.</a:t>
+            </a:r>
+          </a:p>
+          <a:p>
+            <a:pPr lvl="1"/>
+            <a:endParaRPr lang="en-US" dirty="0"/>
+          </a:p>
+          <a:p>
+            <a:pPr lvl="1"/>
+            <a:r>
+              <a:rPr lang="en-US" dirty="0"/>
+              <a:t>Backups occur during a specified window and the database storage I/O may be significantly reduced.</a:t>
             </a:r>
           </a:p>
         </p:txBody>
@@ -6432,7 +6489,7 @@
     </p:spTree>
     <p:extLst>
       <p:ext uri="{BB962C8B-B14F-4D97-AF65-F5344CB8AC3E}">
-        <p14:creationId xmlns:p14="http://schemas.microsoft.com/office/powerpoint/2010/main" val="2213812657"/>
+        <p14:creationId xmlns:p14="http://schemas.microsoft.com/office/powerpoint/2010/main" val="3250670807"/>
       </p:ext>
     </p:extLst>
   </p:cSld>
@@ -6494,6 +6551,129 @@
         <p:spPr>
           <a:xfrm>
             <a:off x="457200" y="1600200"/>
+            <a:ext cx="8229600" cy="4959968"/>
+          </a:xfrm>
+        </p:spPr>
+        <p:txBody>
+          <a:bodyPr>
+            <a:normAutofit fontScale="85000" lnSpcReduction="20000"/>
+          </a:bodyPr>
+          <a:lstStyle/>
+          <a:p>
+            <a:r>
+              <a:rPr lang="en-US" dirty="0"/>
+              <a:t>RDS snapshots are initiated manually by the user and exist indefinitely – even after database is removed.</a:t>
+            </a:r>
+          </a:p>
+          <a:p>
+            <a:pPr lvl="1"/>
+            <a:r>
+              <a:rPr lang="en-US" dirty="0"/>
+              <a:t>It’s possible to use RDS data backups to copy databases (for testing or to move).</a:t>
+            </a:r>
+          </a:p>
+          <a:p>
+            <a:pPr lvl="1"/>
+            <a:endParaRPr lang="en-US" dirty="0"/>
+          </a:p>
+          <a:p>
+            <a:r>
+              <a:rPr lang="en-US" dirty="0"/>
+              <a:t>Multi-AZ capability provides standby database instance in a separate AZ for fail-over purposes.</a:t>
+            </a:r>
+          </a:p>
+          <a:p>
+            <a:pPr lvl="1"/>
+            <a:r>
+              <a:rPr lang="en-US" dirty="0"/>
+              <a:t>Writes to main database server are synchronized to the standby database.</a:t>
+            </a:r>
+          </a:p>
+          <a:p>
+            <a:pPr lvl="1"/>
+            <a:endParaRPr lang="en-US" dirty="0"/>
+          </a:p>
+          <a:p>
+            <a:pPr lvl="1"/>
+            <a:r>
+              <a:rPr lang="en-US" dirty="0"/>
+              <a:t>Main purpose is for greater service resiliency, it does not improve performance.</a:t>
+            </a:r>
+          </a:p>
+          <a:p>
+            <a:pPr lvl="2"/>
+            <a:r>
+              <a:rPr lang="en-US" dirty="0"/>
+              <a:t>Although, it allows RDS to update or backup a server without degrading I/O.</a:t>
+            </a:r>
+          </a:p>
+        </p:txBody>
+      </p:sp>
+    </p:spTree>
+    <p:extLst>
+      <p:ext uri="{BB962C8B-B14F-4D97-AF65-F5344CB8AC3E}">
+        <p14:creationId xmlns:p14="http://schemas.microsoft.com/office/powerpoint/2010/main" val="2213812657"/>
+      </p:ext>
+    </p:extLst>
+  </p:cSld>
+  <p:clrMapOvr>
+    <a:masterClrMapping/>
+  </p:clrMapOvr>
+</p:sld>
+</file>
+
+<file path=ppt/slides/slide33.xml><?xml version="1.0" encoding="utf-8"?>
+<p:sld xmlns:a="http://schemas.openxmlformats.org/drawingml/2006/main" xmlns:r="http://schemas.openxmlformats.org/officeDocument/2006/relationships" xmlns:p="http://schemas.openxmlformats.org/presentationml/2006/main">
+  <p:cSld>
+    <p:spTree>
+      <p:nvGrpSpPr>
+        <p:cNvPr id="1" name=""/>
+        <p:cNvGrpSpPr/>
+        <p:nvPr/>
+      </p:nvGrpSpPr>
+      <p:grpSpPr>
+        <a:xfrm>
+          <a:off x="0" y="0"/>
+          <a:ext cx="0" cy="0"/>
+          <a:chOff x="0" y="0"/>
+          <a:chExt cx="0" cy="0"/>
+        </a:xfrm>
+      </p:grpSpPr>
+      <p:sp>
+        <p:nvSpPr>
+          <p:cNvPr id="2" name="Title 1"/>
+          <p:cNvSpPr>
+            <a:spLocks noGrp="1"/>
+          </p:cNvSpPr>
+          <p:nvPr>
+            <p:ph type="title"/>
+          </p:nvPr>
+        </p:nvSpPr>
+        <p:spPr/>
+        <p:txBody>
+          <a:bodyPr/>
+          <a:lstStyle/>
+          <a:p>
+            <a:r>
+              <a:rPr lang="en-US" dirty="0"/>
+              <a:t>RDS</a:t>
+            </a:r>
+          </a:p>
+        </p:txBody>
+      </p:sp>
+      <p:sp>
+        <p:nvSpPr>
+          <p:cNvPr id="3" name="Content Placeholder 2"/>
+          <p:cNvSpPr>
+            <a:spLocks noGrp="1"/>
+          </p:cNvSpPr>
+          <p:nvPr>
+            <p:ph idx="1"/>
+          </p:nvPr>
+        </p:nvSpPr>
+        <p:spPr>
+          <a:xfrm>
+            <a:off x="457200" y="1600200"/>
             <a:ext cx="8229600" cy="5001953"/>
           </a:xfrm>
         </p:spPr>
@@ -6588,7 +6768,7 @@
 </p:sld>
 </file>
 
-<file path=ppt/slides/slide33.xml><?xml version="1.0" encoding="utf-8"?>
+<file path=ppt/slides/slide34.xml><?xml version="1.0" encoding="utf-8"?>
 <p:sld xmlns:a="http://schemas.openxmlformats.org/drawingml/2006/main" xmlns:r="http://schemas.openxmlformats.org/officeDocument/2006/relationships" xmlns:p="http://schemas.openxmlformats.org/presentationml/2006/main">
   <p:cSld>
     <p:spTree>
@@ -6723,7 +6903,7 @@
 </p:sld>
 </file>
 
-<file path=ppt/slides/slide34.xml><?xml version="1.0" encoding="utf-8"?>
+<file path=ppt/slides/slide35.xml><?xml version="1.0" encoding="utf-8"?>
 <p:sld xmlns:a="http://schemas.openxmlformats.org/drawingml/2006/main" xmlns:r="http://schemas.openxmlformats.org/officeDocument/2006/relationships" xmlns:p="http://schemas.openxmlformats.org/presentationml/2006/main">
   <p:cSld>
     <p:spTree>
@@ -6757,6 +6937,526 @@
           <a:p>
             <a:r>
               <a:rPr lang="en-US" dirty="0" err="1"/>
+              <a:t>ElastiCache</a:t>
+            </a:r>
+            <a:endParaRPr lang="en-US" dirty="0"/>
+          </a:p>
+        </p:txBody>
+      </p:sp>
+      <p:sp>
+        <p:nvSpPr>
+          <p:cNvPr id="3" name="Content Placeholder 2"/>
+          <p:cNvSpPr>
+            <a:spLocks noGrp="1"/>
+          </p:cNvSpPr>
+          <p:nvPr>
+            <p:ph idx="1"/>
+          </p:nvPr>
+        </p:nvSpPr>
+        <p:spPr>
+          <a:xfrm>
+            <a:off x="457200" y="1600200"/>
+            <a:ext cx="8229600" cy="5075182"/>
+          </a:xfrm>
+        </p:spPr>
+        <p:txBody>
+          <a:bodyPr>
+            <a:normAutofit fontScale="85000" lnSpcReduction="10000"/>
+          </a:bodyPr>
+          <a:lstStyle/>
+          <a:p>
+            <a:r>
+              <a:rPr lang="en-US" b="1" dirty="0" err="1"/>
+              <a:t>ElastiCache</a:t>
+            </a:r>
+            <a:r>
+              <a:rPr lang="en-US" dirty="0"/>
+              <a:t> is a distributed in-memory caching system.</a:t>
+            </a:r>
+          </a:p>
+          <a:p>
+            <a:pPr lvl="1"/>
+            <a:r>
+              <a:rPr lang="en-US" dirty="0"/>
+              <a:t>Huge performance improvement when reading from memory vs. disk.</a:t>
+            </a:r>
+          </a:p>
+          <a:p>
+            <a:pPr lvl="2"/>
+            <a:r>
+              <a:rPr lang="en-US" dirty="0"/>
+              <a:t>Main memory reference = 100 ns</a:t>
+            </a:r>
+          </a:p>
+          <a:p>
+            <a:pPr lvl="2"/>
+            <a:r>
+              <a:rPr lang="en-US" dirty="0"/>
+              <a:t>Read 4k randomly from SSD = 150,000 ns</a:t>
+            </a:r>
+          </a:p>
+          <a:p>
+            <a:pPr lvl="2"/>
+            <a:endParaRPr lang="en-US" dirty="0"/>
+          </a:p>
+          <a:p>
+            <a:r>
+              <a:rPr lang="en-US" dirty="0"/>
+              <a:t>Benefits:</a:t>
+            </a:r>
+          </a:p>
+          <a:p>
+            <a:pPr lvl="1"/>
+            <a:r>
+              <a:rPr lang="en-US" dirty="0"/>
+              <a:t>Cache frequent database queries </a:t>
+            </a:r>
+          </a:p>
+          <a:p>
+            <a:pPr lvl="2"/>
+            <a:r>
+              <a:rPr lang="en-US" dirty="0"/>
+              <a:t>List of corporate store locations</a:t>
+            </a:r>
+          </a:p>
+          <a:p>
+            <a:pPr lvl="2"/>
+            <a:r>
+              <a:rPr lang="en-US" dirty="0"/>
+              <a:t>Product listing</a:t>
+            </a:r>
+          </a:p>
+          <a:p>
+            <a:pPr lvl="2"/>
+            <a:endParaRPr lang="en-US" dirty="0"/>
+          </a:p>
+          <a:p>
+            <a:pPr lvl="1"/>
+            <a:r>
+              <a:rPr lang="en-US" dirty="0"/>
+              <a:t>Store frequently-accessed data</a:t>
+            </a:r>
+          </a:p>
+          <a:p>
+            <a:pPr lvl="2"/>
+            <a:r>
+              <a:rPr lang="en-US" dirty="0"/>
+              <a:t>Web sessions</a:t>
+            </a:r>
+          </a:p>
+          <a:p>
+            <a:endParaRPr lang="en-US" dirty="0"/>
+          </a:p>
+          <a:p>
+            <a:endParaRPr lang="en-US" dirty="0"/>
+          </a:p>
+        </p:txBody>
+      </p:sp>
+      <p:pic>
+        <p:nvPicPr>
+          <p:cNvPr id="4" name="Graphic 3">
+            <a:extLst>
+              <a:ext uri="{FF2B5EF4-FFF2-40B4-BE49-F238E27FC236}">
+                <a16:creationId xmlns:a16="http://schemas.microsoft.com/office/drawing/2014/main" id="{FB9798D9-76AE-5746-89E0-F432BEB95A52}"/>
+              </a:ext>
+            </a:extLst>
+          </p:cNvPr>
+          <p:cNvPicPr>
+            <a:picLocks noChangeAspect="1"/>
+          </p:cNvPicPr>
+          <p:nvPr/>
+        </p:nvPicPr>
+        <p:blipFill>
+          <a:blip r:embed="rId2">
+            <a:extLst>
+              <a:ext uri="{96DAC541-7B7A-43D3-8B79-37D633B846F1}">
+                <asvg:svgBlip xmlns:asvg="http://schemas.microsoft.com/office/drawing/2016/SVG/main" r:embed="rId3"/>
+              </a:ext>
+            </a:extLst>
+          </a:blip>
+          <a:stretch>
+            <a:fillRect/>
+          </a:stretch>
+        </p:blipFill>
+        <p:spPr>
+          <a:xfrm>
+            <a:off x="7150909" y="248985"/>
+            <a:ext cx="1194305" cy="1194305"/>
+          </a:xfrm>
+          <a:prstGeom prst="rect">
+            <a:avLst/>
+          </a:prstGeom>
+        </p:spPr>
+      </p:pic>
+    </p:spTree>
+    <p:extLst>
+      <p:ext uri="{BB962C8B-B14F-4D97-AF65-F5344CB8AC3E}">
+        <p14:creationId xmlns:p14="http://schemas.microsoft.com/office/powerpoint/2010/main" val="24433906"/>
+      </p:ext>
+    </p:extLst>
+  </p:cSld>
+  <p:clrMapOvr>
+    <a:masterClrMapping/>
+  </p:clrMapOvr>
+</p:sld>
+</file>
+
+<file path=ppt/slides/slide36.xml><?xml version="1.0" encoding="utf-8"?>
+<p:sld xmlns:a="http://schemas.openxmlformats.org/drawingml/2006/main" xmlns:r="http://schemas.openxmlformats.org/officeDocument/2006/relationships" xmlns:p="http://schemas.openxmlformats.org/presentationml/2006/main">
+  <p:cSld>
+    <p:spTree>
+      <p:nvGrpSpPr>
+        <p:cNvPr id="1" name=""/>
+        <p:cNvGrpSpPr/>
+        <p:nvPr/>
+      </p:nvGrpSpPr>
+      <p:grpSpPr>
+        <a:xfrm>
+          <a:off x="0" y="0"/>
+          <a:ext cx="0" cy="0"/>
+          <a:chOff x="0" y="0"/>
+          <a:chExt cx="0" cy="0"/>
+        </a:xfrm>
+      </p:grpSpPr>
+      <p:sp>
+        <p:nvSpPr>
+          <p:cNvPr id="2" name="Title 1"/>
+          <p:cNvSpPr>
+            <a:spLocks noGrp="1"/>
+          </p:cNvSpPr>
+          <p:nvPr>
+            <p:ph type="title"/>
+          </p:nvPr>
+        </p:nvSpPr>
+        <p:spPr/>
+        <p:txBody>
+          <a:bodyPr/>
+          <a:lstStyle/>
+          <a:p>
+            <a:r>
+              <a:rPr lang="en-US" dirty="0" err="1"/>
+              <a:t>ElastiCache</a:t>
+            </a:r>
+            <a:endParaRPr lang="en-US" dirty="0"/>
+          </a:p>
+        </p:txBody>
+      </p:sp>
+      <p:sp>
+        <p:nvSpPr>
+          <p:cNvPr id="3" name="Content Placeholder 2"/>
+          <p:cNvSpPr>
+            <a:spLocks noGrp="1"/>
+          </p:cNvSpPr>
+          <p:nvPr>
+            <p:ph idx="1"/>
+          </p:nvPr>
+        </p:nvSpPr>
+        <p:spPr>
+          <a:xfrm>
+            <a:off x="457200" y="1600200"/>
+            <a:ext cx="8229600" cy="4951564"/>
+          </a:xfrm>
+        </p:spPr>
+        <p:txBody>
+          <a:bodyPr>
+            <a:normAutofit fontScale="77500" lnSpcReduction="20000"/>
+          </a:bodyPr>
+          <a:lstStyle/>
+          <a:p>
+            <a:r>
+              <a:rPr lang="en-US" dirty="0"/>
+              <a:t>Supports two types of cache systems:</a:t>
+            </a:r>
+          </a:p>
+          <a:p>
+            <a:pPr lvl="1"/>
+            <a:r>
+              <a:rPr lang="en-US" dirty="0" err="1"/>
+              <a:t>Memcached</a:t>
+            </a:r>
+            <a:endParaRPr lang="en-US" dirty="0"/>
+          </a:p>
+          <a:p>
+            <a:pPr lvl="1"/>
+            <a:r>
+              <a:rPr lang="en-US" dirty="0" err="1"/>
+              <a:t>Redis</a:t>
+            </a:r>
+            <a:endParaRPr lang="en-US" dirty="0"/>
+          </a:p>
+          <a:p>
+            <a:pPr lvl="1"/>
+            <a:endParaRPr lang="en-US" dirty="0"/>
+          </a:p>
+          <a:p>
+            <a:r>
+              <a:rPr lang="en-US" b="1" dirty="0" err="1"/>
+              <a:t>Memcached</a:t>
+            </a:r>
+            <a:endParaRPr lang="en-US" b="1" dirty="0"/>
+          </a:p>
+          <a:p>
+            <a:pPr lvl="1"/>
+            <a:r>
+              <a:rPr lang="en-US" dirty="0"/>
+              <a:t>Very reliable key/value store</a:t>
+            </a:r>
+          </a:p>
+          <a:p>
+            <a:pPr lvl="1"/>
+            <a:r>
+              <a:rPr lang="en-US" dirty="0"/>
+              <a:t>Simple to operate and use</a:t>
+            </a:r>
+          </a:p>
+          <a:p>
+            <a:pPr lvl="1"/>
+            <a:endParaRPr lang="en-US" dirty="0"/>
+          </a:p>
+          <a:p>
+            <a:r>
+              <a:rPr lang="en-US" b="1" dirty="0" err="1"/>
+              <a:t>Redis</a:t>
+            </a:r>
+            <a:r>
+              <a:rPr lang="en-US" dirty="0"/>
+              <a:t> has more features today </a:t>
+            </a:r>
+          </a:p>
+          <a:p>
+            <a:pPr lvl="1"/>
+            <a:r>
+              <a:rPr lang="en-US" dirty="0"/>
+              <a:t>Storing data in a variety of formats beyond key/value: list, array, sets, and sorted sets</a:t>
+            </a:r>
+          </a:p>
+          <a:p>
+            <a:pPr lvl="1"/>
+            <a:r>
+              <a:rPr lang="en-US" dirty="0"/>
+              <a:t>More complex to operate</a:t>
+            </a:r>
+          </a:p>
+          <a:p>
+            <a:pPr lvl="1"/>
+            <a:r>
+              <a:rPr lang="en-US" dirty="0"/>
+              <a:t>AWS supports master/slave replication and cross AZ redundancy</a:t>
+            </a:r>
+          </a:p>
+        </p:txBody>
+      </p:sp>
+    </p:spTree>
+    <p:extLst>
+      <p:ext uri="{BB962C8B-B14F-4D97-AF65-F5344CB8AC3E}">
+        <p14:creationId xmlns:p14="http://schemas.microsoft.com/office/powerpoint/2010/main" val="1846538328"/>
+      </p:ext>
+    </p:extLst>
+  </p:cSld>
+  <p:clrMapOvr>
+    <a:masterClrMapping/>
+  </p:clrMapOvr>
+</p:sld>
+</file>
+
+<file path=ppt/slides/slide37.xml><?xml version="1.0" encoding="utf-8"?>
+<p:sld xmlns:a="http://schemas.openxmlformats.org/drawingml/2006/main" xmlns:r="http://schemas.openxmlformats.org/officeDocument/2006/relationships" xmlns:p="http://schemas.openxmlformats.org/presentationml/2006/main">
+  <p:cSld>
+    <p:spTree>
+      <p:nvGrpSpPr>
+        <p:cNvPr id="1" name=""/>
+        <p:cNvGrpSpPr/>
+        <p:nvPr/>
+      </p:nvGrpSpPr>
+      <p:grpSpPr>
+        <a:xfrm>
+          <a:off x="0" y="0"/>
+          <a:ext cx="0" cy="0"/>
+          <a:chOff x="0" y="0"/>
+          <a:chExt cx="0" cy="0"/>
+        </a:xfrm>
+      </p:grpSpPr>
+      <p:sp>
+        <p:nvSpPr>
+          <p:cNvPr id="2" name="Title 1"/>
+          <p:cNvSpPr>
+            <a:spLocks noGrp="1"/>
+          </p:cNvSpPr>
+          <p:nvPr>
+            <p:ph type="title"/>
+          </p:nvPr>
+        </p:nvSpPr>
+        <p:spPr/>
+        <p:txBody>
+          <a:bodyPr/>
+          <a:lstStyle/>
+          <a:p>
+            <a:r>
+              <a:rPr lang="en-US" dirty="0" err="1"/>
+              <a:t>Redis</a:t>
+            </a:r>
+            <a:r>
+              <a:rPr lang="en-US" dirty="0"/>
+              <a:t> example</a:t>
+            </a:r>
+          </a:p>
+        </p:txBody>
+      </p:sp>
+      <p:sp>
+        <p:nvSpPr>
+          <p:cNvPr id="3" name="Content Placeholder 2"/>
+          <p:cNvSpPr>
+            <a:spLocks noGrp="1"/>
+          </p:cNvSpPr>
+          <p:nvPr>
+            <p:ph idx="1"/>
+          </p:nvPr>
+        </p:nvSpPr>
+        <p:spPr/>
+        <p:txBody>
+          <a:bodyPr>
+            <a:normAutofit/>
+          </a:bodyPr>
+          <a:lstStyle/>
+          <a:p>
+            <a:pPr marL="0" indent="0">
+              <a:buNone/>
+            </a:pPr>
+            <a:r>
+              <a:rPr lang="en-US" sz="1800" b="1" dirty="0" err="1"/>
+              <a:t>redis</a:t>
+            </a:r>
+            <a:r>
+              <a:rPr lang="en-US" sz="1800" b="1" dirty="0"/>
+              <a:t>-cli -h mycachecluster.eaogs8.0001.usw2.cache.amazonaws.com -p 6379</a:t>
+            </a:r>
+          </a:p>
+          <a:p>
+            <a:pPr marL="0" indent="0">
+              <a:buNone/>
+            </a:pPr>
+            <a:endParaRPr lang="en-US" sz="1800" dirty="0"/>
+          </a:p>
+          <a:p>
+            <a:pPr marL="0" indent="0">
+              <a:buNone/>
+            </a:pPr>
+            <a:r>
+              <a:rPr lang="en-US" sz="1800" dirty="0"/>
+              <a:t>set a "hello"     // Set key "a" with a string value and no expiration</a:t>
+            </a:r>
+          </a:p>
+          <a:p>
+            <a:pPr marL="0" indent="0">
+              <a:buNone/>
+            </a:pPr>
+            <a:r>
+              <a:rPr lang="en-US" sz="1800" dirty="0"/>
+              <a:t>OK</a:t>
+            </a:r>
+          </a:p>
+          <a:p>
+            <a:pPr marL="0" indent="0">
+              <a:buNone/>
+            </a:pPr>
+            <a:r>
+              <a:rPr lang="en-US" sz="1800" dirty="0"/>
+              <a:t>get a              // Get value for key "a"</a:t>
+            </a:r>
+          </a:p>
+          <a:p>
+            <a:pPr marL="0" indent="0">
+              <a:buNone/>
+            </a:pPr>
+            <a:r>
+              <a:rPr lang="en-US" sz="1800" dirty="0"/>
+              <a:t>"hello"</a:t>
+            </a:r>
+          </a:p>
+          <a:p>
+            <a:pPr marL="0" indent="0">
+              <a:buNone/>
+            </a:pPr>
+            <a:r>
+              <a:rPr lang="en-US" sz="1800" dirty="0"/>
+              <a:t>get b              // Get value for key "b" results in miss</a:t>
+            </a:r>
+          </a:p>
+          <a:p>
+            <a:pPr marL="0" indent="0">
+              <a:buNone/>
+            </a:pPr>
+            <a:r>
+              <a:rPr lang="is-IS" sz="1800" dirty="0"/>
+              <a:t>(nil)				</a:t>
+            </a:r>
+          </a:p>
+          <a:p>
+            <a:pPr marL="0" indent="0">
+              <a:buNone/>
+            </a:pPr>
+            <a:r>
+              <a:rPr lang="en-US" sz="1800" dirty="0"/>
+              <a:t>quit               // Exit from </a:t>
+            </a:r>
+            <a:r>
+              <a:rPr lang="en-US" sz="1800" dirty="0" err="1"/>
+              <a:t>redis</a:t>
+            </a:r>
+            <a:r>
+              <a:rPr lang="en-US" sz="1800" dirty="0"/>
+              <a:t>-cli</a:t>
+            </a:r>
+          </a:p>
+        </p:txBody>
+      </p:sp>
+    </p:spTree>
+    <p:extLst>
+      <p:ext uri="{BB962C8B-B14F-4D97-AF65-F5344CB8AC3E}">
+        <p14:creationId xmlns:p14="http://schemas.microsoft.com/office/powerpoint/2010/main" val="3284498097"/>
+      </p:ext>
+    </p:extLst>
+  </p:cSld>
+  <p:clrMapOvr>
+    <a:masterClrMapping/>
+  </p:clrMapOvr>
+</p:sld>
+</file>
+
+<file path=ppt/slides/slide38.xml><?xml version="1.0" encoding="utf-8"?>
+<p:sld xmlns:a="http://schemas.openxmlformats.org/drawingml/2006/main" xmlns:r="http://schemas.openxmlformats.org/officeDocument/2006/relationships" xmlns:p="http://schemas.openxmlformats.org/presentationml/2006/main">
+  <p:cSld>
+    <p:spTree>
+      <p:nvGrpSpPr>
+        <p:cNvPr id="1" name=""/>
+        <p:cNvGrpSpPr/>
+        <p:nvPr/>
+      </p:nvGrpSpPr>
+      <p:grpSpPr>
+        <a:xfrm>
+          <a:off x="0" y="0"/>
+          <a:ext cx="0" cy="0"/>
+          <a:chOff x="0" y="0"/>
+          <a:chExt cx="0" cy="0"/>
+        </a:xfrm>
+      </p:grpSpPr>
+      <p:sp>
+        <p:nvSpPr>
+          <p:cNvPr id="2" name="Title 1"/>
+          <p:cNvSpPr>
+            <a:spLocks noGrp="1"/>
+          </p:cNvSpPr>
+          <p:nvPr>
+            <p:ph type="title"/>
+          </p:nvPr>
+        </p:nvSpPr>
+        <p:spPr/>
+        <p:txBody>
+          <a:bodyPr/>
+          <a:lstStyle/>
+          <a:p>
+            <a:r>
+              <a:rPr lang="en-US" dirty="0" err="1"/>
               <a:t>DynamoDB</a:t>
             </a:r>
             <a:endParaRPr lang="en-US" dirty="0"/>
@@ -6781,21 +7481,13 @@
         </p:spPr>
         <p:txBody>
           <a:bodyPr>
-            <a:normAutofit fontScale="85000" lnSpcReduction="20000"/>
+            <a:normAutofit fontScale="77500" lnSpcReduction="20000"/>
           </a:bodyPr>
           <a:lstStyle/>
           <a:p>
             <a:r>
               <a:rPr lang="en-US" dirty="0"/>
-              <a:t>AWS </a:t>
-            </a:r>
-            <a:r>
-              <a:rPr lang="en-US" dirty="0" err="1"/>
-              <a:t>NoSQL</a:t>
-            </a:r>
-            <a:r>
-              <a:rPr lang="en-US" dirty="0"/>
-              <a:t> database utilizing a document processing architecture.</a:t>
+              <a:t>AWS NoSQL database utilizing a key/value and document processing architecture.</a:t>
             </a:r>
           </a:p>
           <a:p>
@@ -6809,7 +7501,14 @@
             <a:pPr lvl="1"/>
             <a:r>
               <a:rPr lang="en-US" dirty="0"/>
-              <a:t>Each document is comprised of key/value pairs stored in JavaScript Object Notation (JSON).</a:t>
+              <a:t>Each table is comprised of items stored in JavaScript Object Notation (JSON).</a:t>
+            </a:r>
+          </a:p>
+          <a:p>
+            <a:pPr lvl="1"/>
+            <a:r>
+              <a:rPr lang="en-US" dirty="0"/>
+              <a:t>Anti-pattern: table is a namespace, not a relational table!</a:t>
             </a:r>
           </a:p>
           <a:p>
@@ -6847,22 +7546,34 @@
       </p:sp>
       <p:pic>
         <p:nvPicPr>
-          <p:cNvPr id="4" name="Picture 3"/>
+          <p:cNvPr id="5" name="Graphic 4">
+            <a:extLst>
+              <a:ext uri="{FF2B5EF4-FFF2-40B4-BE49-F238E27FC236}">
+                <a16:creationId xmlns:a16="http://schemas.microsoft.com/office/drawing/2014/main" id="{A95FD01A-A132-D144-958C-1DAD31B96930}"/>
+              </a:ext>
+            </a:extLst>
+          </p:cNvPr>
           <p:cNvPicPr>
             <a:picLocks noChangeAspect="1"/>
           </p:cNvPicPr>
           <p:nvPr/>
         </p:nvPicPr>
         <p:blipFill>
-          <a:blip r:embed="rId2"/>
+          <a:blip r:embed="rId2">
+            <a:extLst>
+              <a:ext uri="{96DAC541-7B7A-43D3-8B79-37D633B846F1}">
+                <asvg:svgBlip xmlns:asvg="http://schemas.microsoft.com/office/drawing/2016/SVG/main" r:embed="rId3"/>
+              </a:ext>
+            </a:extLst>
+          </a:blip>
           <a:stretch>
             <a:fillRect/>
           </a:stretch>
         </p:blipFill>
         <p:spPr>
           <a:xfrm>
-            <a:off x="7297059" y="401695"/>
-            <a:ext cx="1389741" cy="1389741"/>
+            <a:off x="7178081" y="192895"/>
+            <a:ext cx="1146111" cy="1146111"/>
           </a:xfrm>
           <a:prstGeom prst="rect">
             <a:avLst/>
@@ -6882,7 +7593,7 @@
 </p:sld>
 </file>
 
-<file path=ppt/slides/slide35.xml><?xml version="1.0" encoding="utf-8"?>
+<file path=ppt/slides/slide39.xml><?xml version="1.0" encoding="utf-8"?>
 <p:sld xmlns:a="http://schemas.openxmlformats.org/drawingml/2006/main" xmlns:r="http://schemas.openxmlformats.org/officeDocument/2006/relationships" xmlns:p="http://schemas.openxmlformats.org/presentationml/2006/main">
   <p:cSld>
     <p:spTree>
@@ -6959,160 +7670,6 @@
 </p:sld>
 </file>
 
-<file path=ppt/slides/slide36.xml><?xml version="1.0" encoding="utf-8"?>
-<p:sld xmlns:a="http://schemas.openxmlformats.org/drawingml/2006/main" xmlns:r="http://schemas.openxmlformats.org/officeDocument/2006/relationships" xmlns:p="http://schemas.openxmlformats.org/presentationml/2006/main">
-  <p:cSld>
-    <p:spTree>
-      <p:nvGrpSpPr>
-        <p:cNvPr id="1" name=""/>
-        <p:cNvGrpSpPr/>
-        <p:nvPr/>
-      </p:nvGrpSpPr>
-      <p:grpSpPr>
-        <a:xfrm>
-          <a:off x="0" y="0"/>
-          <a:ext cx="0" cy="0"/>
-          <a:chOff x="0" y="0"/>
-          <a:chExt cx="0" cy="0"/>
-        </a:xfrm>
-      </p:grpSpPr>
-      <p:sp>
-        <p:nvSpPr>
-          <p:cNvPr id="2" name="Title 1"/>
-          <p:cNvSpPr>
-            <a:spLocks noGrp="1"/>
-          </p:cNvSpPr>
-          <p:nvPr>
-            <p:ph type="title"/>
-          </p:nvPr>
-        </p:nvSpPr>
-        <p:spPr/>
-        <p:txBody>
-          <a:bodyPr/>
-          <a:lstStyle/>
-          <a:p>
-            <a:r>
-              <a:rPr lang="en-US" dirty="0"/>
-              <a:t>Redshift</a:t>
-            </a:r>
-          </a:p>
-        </p:txBody>
-      </p:sp>
-      <p:sp>
-        <p:nvSpPr>
-          <p:cNvPr id="3" name="Content Placeholder 2"/>
-          <p:cNvSpPr>
-            <a:spLocks noGrp="1"/>
-          </p:cNvSpPr>
-          <p:nvPr>
-            <p:ph idx="1"/>
-          </p:nvPr>
-        </p:nvSpPr>
-        <p:spPr>
-          <a:xfrm>
-            <a:off x="457200" y="1600200"/>
-            <a:ext cx="8229600" cy="5012450"/>
-          </a:xfrm>
-        </p:spPr>
-        <p:txBody>
-          <a:bodyPr>
-            <a:normAutofit fontScale="85000" lnSpcReduction="20000"/>
-          </a:bodyPr>
-          <a:lstStyle/>
-          <a:p>
-            <a:r>
-              <a:rPr lang="en-US" dirty="0"/>
-              <a:t>Managed data warehousing and analytics database (OLAP).</a:t>
-            </a:r>
-          </a:p>
-          <a:p>
-            <a:pPr lvl="1"/>
-            <a:r>
-              <a:rPr lang="en-US" dirty="0"/>
-              <a:t>Online Transaction Processing (OLTP) focuses on querying and maintaining individual transactions.</a:t>
-            </a:r>
-          </a:p>
-          <a:p>
-            <a:pPr lvl="2"/>
-            <a:r>
-              <a:rPr lang="en-US" dirty="0"/>
-              <a:t>Products purchased in a specific order</a:t>
-            </a:r>
-          </a:p>
-          <a:p>
-            <a:pPr lvl="2"/>
-            <a:endParaRPr lang="en-US" dirty="0"/>
-          </a:p>
-          <a:p>
-            <a:pPr lvl="1"/>
-            <a:r>
-              <a:rPr lang="en-US" dirty="0"/>
-              <a:t>Online Analytical Processing (OLAP) focuses on the analysis of aggregate sets of data.</a:t>
-            </a:r>
-          </a:p>
-          <a:p>
-            <a:pPr lvl="2"/>
-            <a:r>
-              <a:rPr lang="en-US" dirty="0"/>
-              <a:t>Total store sales across North America </a:t>
-            </a:r>
-          </a:p>
-          <a:p>
-            <a:pPr lvl="2"/>
-            <a:endParaRPr lang="en-US" dirty="0"/>
-          </a:p>
-          <a:p>
-            <a:r>
-              <a:rPr lang="en-US" dirty="0"/>
-              <a:t>Uses columnar storage to improve performance.</a:t>
-            </a:r>
-          </a:p>
-          <a:p>
-            <a:pPr lvl="1"/>
-            <a:r>
-              <a:rPr lang="en-US" dirty="0"/>
-              <a:t>Generally computation is performed on values within a column, so store them in the same page to improve query performance (reduce I/O).</a:t>
-            </a:r>
-          </a:p>
-        </p:txBody>
-      </p:sp>
-      <p:pic>
-        <p:nvPicPr>
-          <p:cNvPr id="4" name="Picture 3"/>
-          <p:cNvPicPr>
-            <a:picLocks noChangeAspect="1"/>
-          </p:cNvPicPr>
-          <p:nvPr/>
-        </p:nvPicPr>
-        <p:blipFill>
-          <a:blip r:embed="rId2"/>
-          <a:stretch>
-            <a:fillRect/>
-          </a:stretch>
-        </p:blipFill>
-        <p:spPr>
-          <a:xfrm>
-            <a:off x="7401745" y="274638"/>
-            <a:ext cx="1480447" cy="1480447"/>
-          </a:xfrm>
-          <a:prstGeom prst="rect">
-            <a:avLst/>
-          </a:prstGeom>
-        </p:spPr>
-      </p:pic>
-    </p:spTree>
-    <p:extLst>
-      <p:ext uri="{BB962C8B-B14F-4D97-AF65-F5344CB8AC3E}">
-        <p14:creationId xmlns:p14="http://schemas.microsoft.com/office/powerpoint/2010/main" val="3850342652"/>
-      </p:ext>
-    </p:extLst>
-  </p:cSld>
-  <p:clrMapOvr>
-    <a:masterClrMapping/>
-  </p:clrMapOvr>
-</p:sld>
-</file>
-
 <file path=ppt/slides/slide4.xml><?xml version="1.0" encoding="utf-8"?>
 <p:sld xmlns:a="http://schemas.openxmlformats.org/drawingml/2006/main" xmlns:r="http://schemas.openxmlformats.org/officeDocument/2006/relationships" xmlns:p="http://schemas.openxmlformats.org/presentationml/2006/main">
   <p:cSld>
@@ -7247,6 +7804,626 @@
 </p:sld>
 </file>
 
+<file path=ppt/slides/slide40.xml><?xml version="1.0" encoding="utf-8"?>
+<p:sld xmlns:a="http://schemas.openxmlformats.org/drawingml/2006/main" xmlns:r="http://schemas.openxmlformats.org/officeDocument/2006/relationships" xmlns:p="http://schemas.openxmlformats.org/presentationml/2006/main">
+  <p:cSld>
+    <p:spTree>
+      <p:nvGrpSpPr>
+        <p:cNvPr id="1" name=""/>
+        <p:cNvGrpSpPr/>
+        <p:nvPr/>
+      </p:nvGrpSpPr>
+      <p:grpSpPr>
+        <a:xfrm>
+          <a:off x="0" y="0"/>
+          <a:ext cx="0" cy="0"/>
+          <a:chOff x="0" y="0"/>
+          <a:chExt cx="0" cy="0"/>
+        </a:xfrm>
+      </p:grpSpPr>
+      <p:sp>
+        <p:nvSpPr>
+          <p:cNvPr id="2" name="Title 1"/>
+          <p:cNvSpPr>
+            <a:spLocks noGrp="1"/>
+          </p:cNvSpPr>
+          <p:nvPr>
+            <p:ph type="title"/>
+          </p:nvPr>
+        </p:nvSpPr>
+        <p:spPr/>
+        <p:txBody>
+          <a:bodyPr/>
+          <a:lstStyle/>
+          <a:p>
+            <a:r>
+              <a:rPr lang="en-US" dirty="0"/>
+              <a:t>DynamoDB Hands-on</a:t>
+            </a:r>
+          </a:p>
+        </p:txBody>
+      </p:sp>
+      <p:sp>
+        <p:nvSpPr>
+          <p:cNvPr id="3" name="Content Placeholder 2"/>
+          <p:cNvSpPr>
+            <a:spLocks noGrp="1"/>
+          </p:cNvSpPr>
+          <p:nvPr>
+            <p:ph idx="1"/>
+          </p:nvPr>
+        </p:nvSpPr>
+        <p:spPr/>
+        <p:txBody>
+          <a:bodyPr>
+            <a:normAutofit/>
+          </a:bodyPr>
+          <a:lstStyle/>
+          <a:p>
+            <a:r>
+              <a:rPr lang="en-US" dirty="0"/>
+              <a:t>Create a DynamoDB table.</a:t>
+            </a:r>
+          </a:p>
+          <a:p>
+            <a:endParaRPr lang="en-US" dirty="0"/>
+          </a:p>
+          <a:p>
+            <a:r>
+              <a:rPr lang="en-US" dirty="0"/>
+              <a:t>Add an item to the table.</a:t>
+            </a:r>
+          </a:p>
+          <a:p>
+            <a:endParaRPr lang="en-US" dirty="0"/>
+          </a:p>
+        </p:txBody>
+      </p:sp>
+      <p:pic>
+        <p:nvPicPr>
+          <p:cNvPr id="4" name="Picture 3"/>
+          <p:cNvPicPr>
+            <a:picLocks noChangeAspect="1"/>
+          </p:cNvPicPr>
+          <p:nvPr/>
+        </p:nvPicPr>
+        <p:blipFill>
+          <a:blip r:embed="rId2"/>
+          <a:stretch>
+            <a:fillRect/>
+          </a:stretch>
+        </p:blipFill>
+        <p:spPr>
+          <a:xfrm>
+            <a:off x="7268698" y="403586"/>
+            <a:ext cx="1014052" cy="1014052"/>
+          </a:xfrm>
+          <a:prstGeom prst="rect">
+            <a:avLst/>
+          </a:prstGeom>
+        </p:spPr>
+      </p:pic>
+    </p:spTree>
+    <p:extLst>
+      <p:ext uri="{BB962C8B-B14F-4D97-AF65-F5344CB8AC3E}">
+        <p14:creationId xmlns:p14="http://schemas.microsoft.com/office/powerpoint/2010/main" val="1032704479"/>
+      </p:ext>
+    </p:extLst>
+  </p:cSld>
+  <p:clrMapOvr>
+    <a:masterClrMapping/>
+  </p:clrMapOvr>
+</p:sld>
+</file>
+
+<file path=ppt/slides/slide41.xml><?xml version="1.0" encoding="utf-8"?>
+<p:sld xmlns:a="http://schemas.openxmlformats.org/drawingml/2006/main" xmlns:r="http://schemas.openxmlformats.org/officeDocument/2006/relationships" xmlns:p="http://schemas.openxmlformats.org/presentationml/2006/main">
+  <p:cSld>
+    <p:spTree>
+      <p:nvGrpSpPr>
+        <p:cNvPr id="1" name=""/>
+        <p:cNvGrpSpPr/>
+        <p:nvPr/>
+      </p:nvGrpSpPr>
+      <p:grpSpPr>
+        <a:xfrm>
+          <a:off x="0" y="0"/>
+          <a:ext cx="0" cy="0"/>
+          <a:chOff x="0" y="0"/>
+          <a:chExt cx="0" cy="0"/>
+        </a:xfrm>
+      </p:grpSpPr>
+      <p:sp>
+        <p:nvSpPr>
+          <p:cNvPr id="2" name="Title 1"/>
+          <p:cNvSpPr>
+            <a:spLocks noGrp="1"/>
+          </p:cNvSpPr>
+          <p:nvPr>
+            <p:ph type="title"/>
+          </p:nvPr>
+        </p:nvSpPr>
+        <p:spPr/>
+        <p:txBody>
+          <a:bodyPr/>
+          <a:lstStyle/>
+          <a:p>
+            <a:r>
+              <a:rPr lang="en-US" dirty="0"/>
+              <a:t>Redshift</a:t>
+            </a:r>
+          </a:p>
+        </p:txBody>
+      </p:sp>
+      <p:sp>
+        <p:nvSpPr>
+          <p:cNvPr id="3" name="Content Placeholder 2"/>
+          <p:cNvSpPr>
+            <a:spLocks noGrp="1"/>
+          </p:cNvSpPr>
+          <p:nvPr>
+            <p:ph idx="1"/>
+          </p:nvPr>
+        </p:nvSpPr>
+        <p:spPr>
+          <a:xfrm>
+            <a:off x="457200" y="1600200"/>
+            <a:ext cx="8229600" cy="5012450"/>
+          </a:xfrm>
+        </p:spPr>
+        <p:txBody>
+          <a:bodyPr>
+            <a:normAutofit fontScale="85000" lnSpcReduction="20000"/>
+          </a:bodyPr>
+          <a:lstStyle/>
+          <a:p>
+            <a:r>
+              <a:rPr lang="en-US" dirty="0"/>
+              <a:t>Managed data warehousing and analytics database (OLAP).</a:t>
+            </a:r>
+          </a:p>
+          <a:p>
+            <a:pPr lvl="1"/>
+            <a:r>
+              <a:rPr lang="en-US" dirty="0"/>
+              <a:t>Online Transaction Processing (OLTP) focuses on querying and maintaining individual transactions.</a:t>
+            </a:r>
+          </a:p>
+          <a:p>
+            <a:pPr lvl="2"/>
+            <a:r>
+              <a:rPr lang="en-US" dirty="0"/>
+              <a:t>Products purchased in a specific order</a:t>
+            </a:r>
+          </a:p>
+          <a:p>
+            <a:pPr lvl="2"/>
+            <a:endParaRPr lang="en-US" dirty="0"/>
+          </a:p>
+          <a:p>
+            <a:pPr lvl="1"/>
+            <a:r>
+              <a:rPr lang="en-US" dirty="0"/>
+              <a:t>Online Analytical Processing (OLAP) focuses on the analysis of aggregate sets of data.</a:t>
+            </a:r>
+          </a:p>
+          <a:p>
+            <a:pPr lvl="2"/>
+            <a:r>
+              <a:rPr lang="en-US" dirty="0"/>
+              <a:t>Total store sales across North America </a:t>
+            </a:r>
+          </a:p>
+          <a:p>
+            <a:pPr lvl="2"/>
+            <a:endParaRPr lang="en-US" dirty="0"/>
+          </a:p>
+          <a:p>
+            <a:r>
+              <a:rPr lang="en-US" dirty="0"/>
+              <a:t>Uses columnar storage to improve performance.</a:t>
+            </a:r>
+          </a:p>
+          <a:p>
+            <a:pPr lvl="1"/>
+            <a:r>
+              <a:rPr lang="en-US" dirty="0"/>
+              <a:t>Generally computation is performed on values within a column, so store them in the same page to improve query performance (reduce I/O).</a:t>
+            </a:r>
+          </a:p>
+        </p:txBody>
+      </p:sp>
+      <p:pic>
+        <p:nvPicPr>
+          <p:cNvPr id="5" name="Graphic 4">
+            <a:extLst>
+              <a:ext uri="{FF2B5EF4-FFF2-40B4-BE49-F238E27FC236}">
+                <a16:creationId xmlns:a16="http://schemas.microsoft.com/office/drawing/2014/main" id="{E48C071D-F015-0043-A9A7-CE487603DD8B}"/>
+              </a:ext>
+            </a:extLst>
+          </p:cNvPr>
+          <p:cNvPicPr>
+            <a:picLocks noChangeAspect="1"/>
+          </p:cNvPicPr>
+          <p:nvPr/>
+        </p:nvPicPr>
+        <p:blipFill>
+          <a:blip r:embed="rId2">
+            <a:extLst>
+              <a:ext uri="{96DAC541-7B7A-43D3-8B79-37D633B846F1}">
+                <asvg:svgBlip xmlns:asvg="http://schemas.microsoft.com/office/drawing/2016/SVG/main" r:embed="rId3"/>
+              </a:ext>
+            </a:extLst>
+          </a:blip>
+          <a:stretch>
+            <a:fillRect/>
+          </a:stretch>
+        </p:blipFill>
+        <p:spPr>
+          <a:xfrm>
+            <a:off x="7105252" y="209206"/>
+            <a:ext cx="1208432" cy="1208432"/>
+          </a:xfrm>
+          <a:prstGeom prst="rect">
+            <a:avLst/>
+          </a:prstGeom>
+        </p:spPr>
+      </p:pic>
+    </p:spTree>
+    <p:extLst>
+      <p:ext uri="{BB962C8B-B14F-4D97-AF65-F5344CB8AC3E}">
+        <p14:creationId xmlns:p14="http://schemas.microsoft.com/office/powerpoint/2010/main" val="3850342652"/>
+      </p:ext>
+    </p:extLst>
+  </p:cSld>
+  <p:clrMapOvr>
+    <a:masterClrMapping/>
+  </p:clrMapOvr>
+</p:sld>
+</file>
+
+<file path=ppt/slides/slide42.xml><?xml version="1.0" encoding="utf-8"?>
+<p:sld xmlns:a="http://schemas.openxmlformats.org/drawingml/2006/main" xmlns:r="http://schemas.openxmlformats.org/officeDocument/2006/relationships" xmlns:p="http://schemas.openxmlformats.org/presentationml/2006/main">
+  <p:cSld>
+    <p:spTree>
+      <p:nvGrpSpPr>
+        <p:cNvPr id="1" name=""/>
+        <p:cNvGrpSpPr/>
+        <p:nvPr/>
+      </p:nvGrpSpPr>
+      <p:grpSpPr>
+        <a:xfrm>
+          <a:off x="0" y="0"/>
+          <a:ext cx="0" cy="0"/>
+          <a:chOff x="0" y="0"/>
+          <a:chExt cx="0" cy="0"/>
+        </a:xfrm>
+      </p:grpSpPr>
+      <p:sp>
+        <p:nvSpPr>
+          <p:cNvPr id="2" name="Title 1"/>
+          <p:cNvSpPr>
+            <a:spLocks noGrp="1"/>
+          </p:cNvSpPr>
+          <p:nvPr>
+            <p:ph type="title"/>
+          </p:nvPr>
+        </p:nvSpPr>
+        <p:spPr/>
+        <p:txBody>
+          <a:bodyPr/>
+          <a:lstStyle/>
+          <a:p>
+            <a:r>
+              <a:rPr lang="en-US" dirty="0"/>
+              <a:t>Neptune</a:t>
+            </a:r>
+          </a:p>
+        </p:txBody>
+      </p:sp>
+      <p:sp>
+        <p:nvSpPr>
+          <p:cNvPr id="3" name="Content Placeholder 2"/>
+          <p:cNvSpPr>
+            <a:spLocks noGrp="1"/>
+          </p:cNvSpPr>
+          <p:nvPr>
+            <p:ph idx="1"/>
+          </p:nvPr>
+        </p:nvSpPr>
+        <p:spPr>
+          <a:xfrm>
+            <a:off x="457200" y="1600200"/>
+            <a:ext cx="8229600" cy="5012450"/>
+          </a:xfrm>
+        </p:spPr>
+        <p:txBody>
+          <a:bodyPr>
+            <a:normAutofit/>
+          </a:bodyPr>
+          <a:lstStyle/>
+          <a:p>
+            <a:r>
+              <a:rPr lang="en-US" dirty="0"/>
+              <a:t>Managed graph database service for applications with highly connected datasets.</a:t>
+            </a:r>
+          </a:p>
+          <a:p>
+            <a:pPr lvl="1"/>
+            <a:r>
+              <a:rPr lang="en-US" dirty="0"/>
+              <a:t>Social media applications</a:t>
+            </a:r>
+          </a:p>
+          <a:p>
+            <a:pPr lvl="2"/>
+            <a:endParaRPr lang="en-US" dirty="0"/>
+          </a:p>
+          <a:p>
+            <a:pPr lvl="1"/>
+            <a:r>
+              <a:rPr lang="en-US" dirty="0"/>
+              <a:t>Recommendation engines</a:t>
+            </a:r>
+          </a:p>
+          <a:p>
+            <a:pPr lvl="1"/>
+            <a:endParaRPr lang="en-US" dirty="0"/>
+          </a:p>
+          <a:p>
+            <a:pPr lvl="1"/>
+            <a:r>
+              <a:rPr lang="en-US" dirty="0"/>
+              <a:t>Knowledge graphs</a:t>
+            </a:r>
+          </a:p>
+          <a:p>
+            <a:pPr lvl="1"/>
+            <a:endParaRPr lang="en-US" dirty="0"/>
+          </a:p>
+          <a:p>
+            <a:pPr marL="457200" lvl="1" indent="0">
+              <a:buNone/>
+            </a:pPr>
+            <a:endParaRPr lang="en-US" dirty="0"/>
+          </a:p>
+        </p:txBody>
+      </p:sp>
+      <p:pic>
+        <p:nvPicPr>
+          <p:cNvPr id="5" name="Picture 4">
+            <a:extLst>
+              <a:ext uri="{FF2B5EF4-FFF2-40B4-BE49-F238E27FC236}">
+                <a16:creationId xmlns:a16="http://schemas.microsoft.com/office/drawing/2014/main" id="{E68CC0BC-2D5B-A947-A931-6A8F065154D5}"/>
+              </a:ext>
+            </a:extLst>
+          </p:cNvPr>
+          <p:cNvPicPr>
+            <a:picLocks noChangeAspect="1"/>
+          </p:cNvPicPr>
+          <p:nvPr/>
+        </p:nvPicPr>
+        <p:blipFill>
+          <a:blip r:embed="rId2"/>
+          <a:stretch>
+            <a:fillRect/>
+          </a:stretch>
+        </p:blipFill>
+        <p:spPr>
+          <a:xfrm>
+            <a:off x="4456386" y="4280969"/>
+            <a:ext cx="4230414" cy="2302393"/>
+          </a:xfrm>
+          <a:prstGeom prst="rect">
+            <a:avLst/>
+          </a:prstGeom>
+        </p:spPr>
+      </p:pic>
+      <p:pic>
+        <p:nvPicPr>
+          <p:cNvPr id="6" name="Graphic 5">
+            <a:extLst>
+              <a:ext uri="{FF2B5EF4-FFF2-40B4-BE49-F238E27FC236}">
+                <a16:creationId xmlns:a16="http://schemas.microsoft.com/office/drawing/2014/main" id="{471D560B-39CE-E645-B13B-40649F40880B}"/>
+              </a:ext>
+            </a:extLst>
+          </p:cNvPr>
+          <p:cNvPicPr>
+            <a:picLocks noChangeAspect="1"/>
+          </p:cNvPicPr>
+          <p:nvPr/>
+        </p:nvPicPr>
+        <p:blipFill>
+          <a:blip r:embed="rId3">
+            <a:extLst>
+              <a:ext uri="{96DAC541-7B7A-43D3-8B79-37D633B846F1}">
+                <asvg:svgBlip xmlns:asvg="http://schemas.microsoft.com/office/drawing/2016/SVG/main" r:embed="rId4"/>
+              </a:ext>
+            </a:extLst>
+          </a:blip>
+          <a:stretch>
+            <a:fillRect/>
+          </a:stretch>
+        </p:blipFill>
+        <p:spPr>
+          <a:xfrm>
+            <a:off x="7096562" y="225290"/>
+            <a:ext cx="1241696" cy="1241696"/>
+          </a:xfrm>
+          <a:prstGeom prst="rect">
+            <a:avLst/>
+          </a:prstGeom>
+        </p:spPr>
+      </p:pic>
+    </p:spTree>
+    <p:extLst>
+      <p:ext uri="{BB962C8B-B14F-4D97-AF65-F5344CB8AC3E}">
+        <p14:creationId xmlns:p14="http://schemas.microsoft.com/office/powerpoint/2010/main" val="475056508"/>
+      </p:ext>
+    </p:extLst>
+  </p:cSld>
+  <p:clrMapOvr>
+    <a:masterClrMapping/>
+  </p:clrMapOvr>
+</p:sld>
+</file>
+
+<file path=ppt/slides/slide43.xml><?xml version="1.0" encoding="utf-8"?>
+<p:sld xmlns:a="http://schemas.openxmlformats.org/drawingml/2006/main" xmlns:r="http://schemas.openxmlformats.org/officeDocument/2006/relationships" xmlns:p="http://schemas.openxmlformats.org/presentationml/2006/main">
+  <p:cSld>
+    <p:spTree>
+      <p:nvGrpSpPr>
+        <p:cNvPr id="1" name=""/>
+        <p:cNvGrpSpPr/>
+        <p:nvPr/>
+      </p:nvGrpSpPr>
+      <p:grpSpPr>
+        <a:xfrm>
+          <a:off x="0" y="0"/>
+          <a:ext cx="0" cy="0"/>
+          <a:chOff x="0" y="0"/>
+          <a:chExt cx="0" cy="0"/>
+        </a:xfrm>
+      </p:grpSpPr>
+      <p:sp>
+        <p:nvSpPr>
+          <p:cNvPr id="2" name="Title 1">
+            <a:extLst>
+              <a:ext uri="{FF2B5EF4-FFF2-40B4-BE49-F238E27FC236}">
+                <a16:creationId xmlns:a16="http://schemas.microsoft.com/office/drawing/2014/main" id="{E201E142-3130-CB43-AA77-AA5ED0BA0BCF}"/>
+              </a:ext>
+            </a:extLst>
+          </p:cNvPr>
+          <p:cNvSpPr>
+            <a:spLocks noGrp="1"/>
+          </p:cNvSpPr>
+          <p:nvPr>
+            <p:ph type="title"/>
+          </p:nvPr>
+        </p:nvSpPr>
+        <p:spPr/>
+        <p:txBody>
+          <a:bodyPr/>
+          <a:lstStyle/>
+          <a:p>
+            <a:r>
+              <a:rPr lang="en-US" dirty="0"/>
+              <a:t>Elasticsearch</a:t>
+            </a:r>
+          </a:p>
+        </p:txBody>
+      </p:sp>
+      <p:sp>
+        <p:nvSpPr>
+          <p:cNvPr id="3" name="Content Placeholder 2">
+            <a:extLst>
+              <a:ext uri="{FF2B5EF4-FFF2-40B4-BE49-F238E27FC236}">
+                <a16:creationId xmlns:a16="http://schemas.microsoft.com/office/drawing/2014/main" id="{C8F5AA40-B4B4-854A-A31D-50E25B2680A8}"/>
+              </a:ext>
+            </a:extLst>
+          </p:cNvPr>
+          <p:cNvSpPr>
+            <a:spLocks noGrp="1"/>
+          </p:cNvSpPr>
+          <p:nvPr>
+            <p:ph idx="1"/>
+          </p:nvPr>
+        </p:nvSpPr>
+        <p:spPr/>
+        <p:txBody>
+          <a:bodyPr>
+            <a:normAutofit lnSpcReduction="10000"/>
+          </a:bodyPr>
+          <a:lstStyle/>
+          <a:p>
+            <a:r>
+              <a:rPr lang="en-US" dirty="0"/>
+              <a:t>Managed Elasticsearch service</a:t>
+            </a:r>
+          </a:p>
+          <a:p>
+            <a:pPr lvl="1"/>
+            <a:r>
+              <a:rPr lang="en-US" dirty="0"/>
+              <a:t>Fast indexing and search across massive amounts of data</a:t>
+            </a:r>
+          </a:p>
+          <a:p>
+            <a:endParaRPr lang="en-US" dirty="0"/>
+          </a:p>
+          <a:p>
+            <a:r>
+              <a:rPr lang="en-US" dirty="0"/>
+              <a:t>Ingest data and analyze, report, and visualize in real time.</a:t>
+            </a:r>
+          </a:p>
+          <a:p>
+            <a:pPr lvl="1"/>
+            <a:r>
+              <a:rPr lang="en-US" dirty="0"/>
+              <a:t>Includes Kibana web console</a:t>
+            </a:r>
+          </a:p>
+          <a:p>
+            <a:endParaRPr lang="en-US" dirty="0"/>
+          </a:p>
+          <a:p>
+            <a:r>
+              <a:rPr lang="en-US" dirty="0"/>
+              <a:t>Integrated with AWS security and services</a:t>
+            </a:r>
+          </a:p>
+        </p:txBody>
+      </p:sp>
+      <p:pic>
+        <p:nvPicPr>
+          <p:cNvPr id="4" name="Graphic 3">
+            <a:extLst>
+              <a:ext uri="{FF2B5EF4-FFF2-40B4-BE49-F238E27FC236}">
+                <a16:creationId xmlns:a16="http://schemas.microsoft.com/office/drawing/2014/main" id="{EFCFA516-EB47-3244-8B73-A0C3B74EF24A}"/>
+              </a:ext>
+            </a:extLst>
+          </p:cNvPr>
+          <p:cNvPicPr>
+            <a:picLocks noChangeAspect="1"/>
+          </p:cNvPicPr>
+          <p:nvPr/>
+        </p:nvPicPr>
+        <p:blipFill>
+          <a:blip r:embed="rId2">
+            <a:extLst>
+              <a:ext uri="{96DAC541-7B7A-43D3-8B79-37D633B846F1}">
+                <asvg:svgBlip xmlns:asvg="http://schemas.microsoft.com/office/drawing/2016/SVG/main" r:embed="rId3"/>
+              </a:ext>
+            </a:extLst>
+          </a:blip>
+          <a:stretch>
+            <a:fillRect/>
+          </a:stretch>
+        </p:blipFill>
+        <p:spPr>
+          <a:xfrm>
+            <a:off x="7704181" y="151241"/>
+            <a:ext cx="1266397" cy="1266397"/>
+          </a:xfrm>
+          <a:prstGeom prst="rect">
+            <a:avLst/>
+          </a:prstGeom>
+        </p:spPr>
+      </p:pic>
+    </p:spTree>
+    <p:extLst>
+      <p:ext uri="{BB962C8B-B14F-4D97-AF65-F5344CB8AC3E}">
+        <p14:creationId xmlns:p14="http://schemas.microsoft.com/office/powerpoint/2010/main" val="1382178176"/>
+      </p:ext>
+    </p:extLst>
+  </p:cSld>
+  <p:clrMapOvr>
+    <a:masterClrMapping/>
+  </p:clrMapOvr>
+</p:sld>
+</file>
+
 <file path=ppt/slides/slide5.xml><?xml version="1.0" encoding="utf-8"?>
 <p:sld xmlns:a="http://schemas.openxmlformats.org/drawingml/2006/main" xmlns:r="http://schemas.openxmlformats.org/officeDocument/2006/relationships" xmlns:p="http://schemas.openxmlformats.org/presentationml/2006/main">
   <p:cSld>
@@ -7296,36 +8473,63 @@
             <p:ph idx="1"/>
           </p:nvPr>
         </p:nvSpPr>
-        <p:spPr/>
+        <p:spPr>
+          <a:xfrm>
+            <a:off x="457200" y="1600200"/>
+            <a:ext cx="8229600" cy="4884683"/>
+          </a:xfrm>
+        </p:spPr>
         <p:txBody>
           <a:bodyPr>
-            <a:normAutofit fontScale="85000" lnSpcReduction="10000"/>
+            <a:normAutofit fontScale="77500" lnSpcReduction="20000"/>
           </a:bodyPr>
           <a:lstStyle/>
           <a:p>
             <a:r>
               <a:rPr lang="en-US" dirty="0"/>
-              <a:t>ELB is priced on a per second basis like EC2 instances.</a:t>
-            </a:r>
-          </a:p>
-          <a:p>
-            <a:endParaRPr lang="en-US" dirty="0"/>
-          </a:p>
-          <a:p>
-            <a:r>
-              <a:rPr lang="en-US" dirty="0"/>
-              <a:t>Additional features:</a:t>
+              <a:t>Three different types:</a:t>
+            </a:r>
+          </a:p>
+          <a:p>
+            <a:pPr lvl="1"/>
+            <a:r>
+              <a:rPr lang="en-US" dirty="0"/>
+              <a:t>Application load balancer (we will use this one)</a:t>
+            </a:r>
+          </a:p>
+          <a:p>
+            <a:pPr lvl="1"/>
+            <a:r>
+              <a:rPr lang="en-US" dirty="0"/>
+              <a:t>Network load balancer</a:t>
+            </a:r>
+          </a:p>
+          <a:p>
+            <a:pPr lvl="1"/>
+            <a:r>
+              <a:rPr lang="en-US" dirty="0"/>
+              <a:t>Classic load balancer</a:t>
+            </a:r>
+          </a:p>
+          <a:p>
+            <a:pPr lvl="1"/>
+            <a:endParaRPr lang="en-US" dirty="0"/>
+          </a:p>
+          <a:p>
+            <a:r>
+              <a:rPr lang="en-US" dirty="0"/>
+              <a:t>Components:</a:t>
             </a:r>
           </a:p>
           <a:p>
             <a:pPr lvl="1"/>
             <a:r>
               <a:rPr lang="en-US" b="1" dirty="0"/>
-              <a:t>Sticky sessions</a:t>
-            </a:r>
-            <a:r>
-              <a:rPr lang="en-US" dirty="0"/>
-              <a:t>: bind a user’s session to a specific instance instead of randomly redirecting (session affinity).</a:t>
+              <a:t>Listener</a:t>
+            </a:r>
+            <a:r>
+              <a:rPr lang="en-US" dirty="0"/>
+              <a:t>: handles requests from clients on a specified protocol and port then forwards to a target group</a:t>
             </a:r>
           </a:p>
           <a:p>
@@ -7336,27 +8540,34 @@
             <a:pPr lvl="1"/>
             <a:r>
               <a:rPr lang="en-US" b="1" dirty="0"/>
-              <a:t>SSL termination</a:t>
-            </a:r>
-            <a:r>
-              <a:rPr lang="en-US" dirty="0"/>
-              <a:t>: install an SSL/TLS certificate directly on the ELB versus on individual instances.</a:t>
-            </a:r>
-          </a:p>
-          <a:p>
-            <a:pPr lvl="1"/>
-            <a:endParaRPr lang="en-US" dirty="0"/>
-          </a:p>
-          <a:p>
-            <a:pPr lvl="1"/>
-            <a:r>
-              <a:rPr lang="en-US" b="1" dirty="0"/>
-              <a:t>Internal load-balancing</a:t>
-            </a:r>
-            <a:r>
-              <a:rPr lang="en-US" dirty="0"/>
-              <a:t>: can also use to load balance internal traffic such as database connections.</a:t>
-            </a:r>
+              <a:t>Target group</a:t>
+            </a:r>
+            <a:r>
+              <a:rPr lang="en-US" dirty="0"/>
+              <a:t>: a set of registered targets (like EC2 instances) that the ELB can route requests to</a:t>
+            </a:r>
+          </a:p>
+          <a:p>
+            <a:pPr lvl="1"/>
+            <a:endParaRPr lang="en-US" dirty="0"/>
+          </a:p>
+          <a:p>
+            <a:pPr lvl="1"/>
+            <a:r>
+              <a:rPr lang="en-US" b="1" dirty="0" err="1"/>
+              <a:t>Healthcheck</a:t>
+            </a:r>
+            <a:r>
+              <a:rPr lang="en-US" dirty="0"/>
+              <a:t>: a periodic check which determines the availability of registered targets</a:t>
+            </a:r>
+          </a:p>
+          <a:p>
+            <a:pPr lvl="1"/>
+            <a:endParaRPr lang="en-US" dirty="0"/>
+          </a:p>
+          <a:p>
+            <a:endParaRPr lang="en-US" dirty="0"/>
           </a:p>
         </p:txBody>
       </p:sp>
@@ -7374,6 +8585,214 @@
 </file>
 
 <file path=ppt/slides/slide6.xml><?xml version="1.0" encoding="utf-8"?>
+<p:sld xmlns:a="http://schemas.openxmlformats.org/drawingml/2006/main" xmlns:r="http://schemas.openxmlformats.org/officeDocument/2006/relationships" xmlns:p="http://schemas.openxmlformats.org/presentationml/2006/main">
+  <p:cSld>
+    <p:spTree>
+      <p:nvGrpSpPr>
+        <p:cNvPr id="1" name=""/>
+        <p:cNvGrpSpPr/>
+        <p:nvPr/>
+      </p:nvGrpSpPr>
+      <p:grpSpPr>
+        <a:xfrm>
+          <a:off x="0" y="0"/>
+          <a:ext cx="0" cy="0"/>
+          <a:chOff x="0" y="0"/>
+          <a:chExt cx="0" cy="0"/>
+        </a:xfrm>
+      </p:grpSpPr>
+      <p:sp>
+        <p:nvSpPr>
+          <p:cNvPr id="2" name="Title 1"/>
+          <p:cNvSpPr>
+            <a:spLocks noGrp="1"/>
+          </p:cNvSpPr>
+          <p:nvPr>
+            <p:ph type="title"/>
+          </p:nvPr>
+        </p:nvSpPr>
+        <p:spPr/>
+        <p:txBody>
+          <a:bodyPr/>
+          <a:lstStyle/>
+          <a:p>
+            <a:r>
+              <a:rPr lang="en-US" dirty="0"/>
+              <a:t>ELB</a:t>
+            </a:r>
+          </a:p>
+        </p:txBody>
+      </p:sp>
+      <p:pic>
+        <p:nvPicPr>
+          <p:cNvPr id="6" name="Picture 5">
+            <a:extLst>
+              <a:ext uri="{FF2B5EF4-FFF2-40B4-BE49-F238E27FC236}">
+                <a16:creationId xmlns:a16="http://schemas.microsoft.com/office/drawing/2014/main" id="{F7D710B1-FDF9-374E-8129-CB09809D5E6E}"/>
+              </a:ext>
+            </a:extLst>
+          </p:cNvPr>
+          <p:cNvPicPr>
+            <a:picLocks noChangeAspect="1"/>
+          </p:cNvPicPr>
+          <p:nvPr/>
+        </p:nvPicPr>
+        <p:blipFill>
+          <a:blip r:embed="rId2"/>
+          <a:stretch>
+            <a:fillRect/>
+          </a:stretch>
+        </p:blipFill>
+        <p:spPr>
+          <a:xfrm>
+            <a:off x="1177159" y="1946055"/>
+            <a:ext cx="7070139" cy="3088400"/>
+          </a:xfrm>
+          <a:prstGeom prst="rect">
+            <a:avLst/>
+          </a:prstGeom>
+        </p:spPr>
+      </p:pic>
+    </p:spTree>
+    <p:extLst>
+      <p:ext uri="{BB962C8B-B14F-4D97-AF65-F5344CB8AC3E}">
+        <p14:creationId xmlns:p14="http://schemas.microsoft.com/office/powerpoint/2010/main" val="46314170"/>
+      </p:ext>
+    </p:extLst>
+  </p:cSld>
+  <p:clrMapOvr>
+    <a:masterClrMapping/>
+  </p:clrMapOvr>
+</p:sld>
+</file>
+
+<file path=ppt/slides/slide7.xml><?xml version="1.0" encoding="utf-8"?>
+<p:sld xmlns:a="http://schemas.openxmlformats.org/drawingml/2006/main" xmlns:r="http://schemas.openxmlformats.org/officeDocument/2006/relationships" xmlns:p="http://schemas.openxmlformats.org/presentationml/2006/main">
+  <p:cSld>
+    <p:spTree>
+      <p:nvGrpSpPr>
+        <p:cNvPr id="1" name=""/>
+        <p:cNvGrpSpPr/>
+        <p:nvPr/>
+      </p:nvGrpSpPr>
+      <p:grpSpPr>
+        <a:xfrm>
+          <a:off x="0" y="0"/>
+          <a:ext cx="0" cy="0"/>
+          <a:chOff x="0" y="0"/>
+          <a:chExt cx="0" cy="0"/>
+        </a:xfrm>
+      </p:grpSpPr>
+      <p:sp>
+        <p:nvSpPr>
+          <p:cNvPr id="2" name="Title 1"/>
+          <p:cNvSpPr>
+            <a:spLocks noGrp="1"/>
+          </p:cNvSpPr>
+          <p:nvPr>
+            <p:ph type="title"/>
+          </p:nvPr>
+        </p:nvSpPr>
+        <p:spPr/>
+        <p:txBody>
+          <a:bodyPr/>
+          <a:lstStyle/>
+          <a:p>
+            <a:r>
+              <a:rPr lang="en-US" dirty="0"/>
+              <a:t>ELB</a:t>
+            </a:r>
+          </a:p>
+        </p:txBody>
+      </p:sp>
+      <p:sp>
+        <p:nvSpPr>
+          <p:cNvPr id="3" name="Content Placeholder 2"/>
+          <p:cNvSpPr>
+            <a:spLocks noGrp="1"/>
+          </p:cNvSpPr>
+          <p:nvPr>
+            <p:ph idx="1"/>
+          </p:nvPr>
+        </p:nvSpPr>
+        <p:spPr/>
+        <p:txBody>
+          <a:bodyPr>
+            <a:normAutofit fontScale="85000" lnSpcReduction="10000"/>
+          </a:bodyPr>
+          <a:lstStyle/>
+          <a:p>
+            <a:r>
+              <a:rPr lang="en-US" dirty="0"/>
+              <a:t>ELB is priced on a per second basis like EC2 instances.</a:t>
+            </a:r>
+          </a:p>
+          <a:p>
+            <a:endParaRPr lang="en-US" dirty="0"/>
+          </a:p>
+          <a:p>
+            <a:r>
+              <a:rPr lang="en-US" dirty="0"/>
+              <a:t>Additional features:</a:t>
+            </a:r>
+          </a:p>
+          <a:p>
+            <a:pPr lvl="1"/>
+            <a:r>
+              <a:rPr lang="en-US" b="1" dirty="0"/>
+              <a:t>Sticky sessions</a:t>
+            </a:r>
+            <a:r>
+              <a:rPr lang="en-US" dirty="0"/>
+              <a:t>: bind a user’s session to a specific instance instead of randomly redirecting (session affinity).</a:t>
+            </a:r>
+          </a:p>
+          <a:p>
+            <a:pPr lvl="1"/>
+            <a:endParaRPr lang="en-US" dirty="0"/>
+          </a:p>
+          <a:p>
+            <a:pPr lvl="1"/>
+            <a:r>
+              <a:rPr lang="en-US" b="1" dirty="0"/>
+              <a:t>SSL termination</a:t>
+            </a:r>
+            <a:r>
+              <a:rPr lang="en-US" dirty="0"/>
+              <a:t>: install an SSL/TLS certificate directly on the ELB versus on individual instances.</a:t>
+            </a:r>
+          </a:p>
+          <a:p>
+            <a:pPr lvl="1"/>
+            <a:endParaRPr lang="en-US" dirty="0"/>
+          </a:p>
+          <a:p>
+            <a:pPr lvl="1"/>
+            <a:r>
+              <a:rPr lang="en-US" b="1" dirty="0"/>
+              <a:t>Internal load-balancing</a:t>
+            </a:r>
+            <a:r>
+              <a:rPr lang="en-US" dirty="0"/>
+              <a:t>: can also use to load balance internal traffic such as database connections.</a:t>
+            </a:r>
+          </a:p>
+        </p:txBody>
+      </p:sp>
+    </p:spTree>
+    <p:extLst>
+      <p:ext uri="{BB962C8B-B14F-4D97-AF65-F5344CB8AC3E}">
+        <p14:creationId xmlns:p14="http://schemas.microsoft.com/office/powerpoint/2010/main" val="3129425486"/>
+      </p:ext>
+    </p:extLst>
+  </p:cSld>
+  <p:clrMapOvr>
+    <a:masterClrMapping/>
+  </p:clrMapOvr>
+</p:sld>
+</file>
+
+<file path=ppt/slides/slide8.xml><?xml version="1.0" encoding="utf-8"?>
 <p:sld xmlns:a="http://schemas.openxmlformats.org/drawingml/2006/main" xmlns:r="http://schemas.openxmlformats.org/officeDocument/2006/relationships" xmlns:p="http://schemas.openxmlformats.org/presentationml/2006/main">
   <p:cSld>
     <p:spTree>
@@ -7544,7 +8963,7 @@
 </p:sld>
 </file>
 
-<file path=ppt/slides/slide7.xml><?xml version="1.0" encoding="utf-8"?>
+<file path=ppt/slides/slide9.xml><?xml version="1.0" encoding="utf-8"?>
 <p:sld xmlns:a="http://schemas.openxmlformats.org/drawingml/2006/main" xmlns:r="http://schemas.openxmlformats.org/officeDocument/2006/relationships" xmlns:p="http://schemas.openxmlformats.org/presentationml/2006/main">
   <p:cSld>
     <p:spTree>
@@ -7578,166 +8997,6 @@
           <a:p>
             <a:r>
               <a:rPr lang="en-US" dirty="0"/>
-              <a:t>EC2 Placement Groups</a:t>
-            </a:r>
-          </a:p>
-        </p:txBody>
-      </p:sp>
-      <p:sp>
-        <p:nvSpPr>
-          <p:cNvPr id="3" name="Content Placeholder 2"/>
-          <p:cNvSpPr>
-            <a:spLocks noGrp="1"/>
-          </p:cNvSpPr>
-          <p:nvPr>
-            <p:ph idx="1"/>
-          </p:nvPr>
-        </p:nvSpPr>
-        <p:spPr>
-          <a:xfrm>
-            <a:off x="457200" y="1600200"/>
-            <a:ext cx="8229600" cy="4938976"/>
-          </a:xfrm>
-        </p:spPr>
-        <p:txBody>
-          <a:bodyPr>
-            <a:normAutofit fontScale="85000" lnSpcReduction="20000"/>
-          </a:bodyPr>
-          <a:lstStyle/>
-          <a:p>
-            <a:r>
-              <a:rPr lang="en-US" dirty="0"/>
-              <a:t>A set of EC2 instances placed together in a single AZ to improve network performance.</a:t>
-            </a:r>
-          </a:p>
-          <a:p>
-            <a:endParaRPr lang="en-US" dirty="0"/>
-          </a:p>
-          <a:p>
-            <a:pPr lvl="1"/>
-            <a:r>
-              <a:rPr lang="en-US" dirty="0"/>
-              <a:t>Very low latency 10Gbps network access.</a:t>
-            </a:r>
-          </a:p>
-          <a:p>
-            <a:pPr lvl="1"/>
-            <a:r>
-              <a:rPr lang="en-US" dirty="0"/>
-              <a:t>Only supports certain types of instances.</a:t>
-            </a:r>
-          </a:p>
-          <a:p>
-            <a:pPr lvl="1"/>
-            <a:r>
-              <a:rPr lang="en-US" dirty="0"/>
-              <a:t>Instances in a placement group should be similar type.</a:t>
-            </a:r>
-          </a:p>
-          <a:p>
-            <a:pPr lvl="1"/>
-            <a:endParaRPr lang="en-US" dirty="0"/>
-          </a:p>
-          <a:p>
-            <a:r>
-              <a:rPr lang="en-US" dirty="0"/>
-              <a:t>Need to define a placement group before launching instances into it.</a:t>
-            </a:r>
-          </a:p>
-          <a:p>
-            <a:pPr lvl="1"/>
-            <a:r>
-              <a:rPr lang="en-US" dirty="0"/>
-              <a:t>Cannot move existing instances into group.</a:t>
-            </a:r>
-          </a:p>
-          <a:p>
-            <a:pPr lvl="1"/>
-            <a:r>
-              <a:rPr lang="en-US" dirty="0"/>
-              <a:t>Cannot merge placement groups.</a:t>
-            </a:r>
-          </a:p>
-          <a:p>
-            <a:pPr lvl="1"/>
-            <a:endParaRPr lang="en-US" dirty="0"/>
-          </a:p>
-          <a:p>
-            <a:r>
-              <a:rPr lang="en-US" dirty="0"/>
-              <a:t>Use-cases: </a:t>
-            </a:r>
-            <a:r>
-              <a:rPr lang="en-US" dirty="0" err="1"/>
-              <a:t>Sharded</a:t>
-            </a:r>
-            <a:r>
-              <a:rPr lang="en-US" dirty="0"/>
-              <a:t> </a:t>
-            </a:r>
-            <a:r>
-              <a:rPr lang="en-US" dirty="0" err="1"/>
-              <a:t>NoSQL</a:t>
-            </a:r>
-            <a:r>
-              <a:rPr lang="en-US" dirty="0"/>
-              <a:t> databases, </a:t>
-            </a:r>
-            <a:r>
-              <a:rPr lang="en-US" dirty="0" err="1"/>
-              <a:t>Hadoop</a:t>
-            </a:r>
-            <a:endParaRPr lang="en-US" dirty="0"/>
-          </a:p>
-        </p:txBody>
-      </p:sp>
-    </p:spTree>
-    <p:extLst>
-      <p:ext uri="{BB962C8B-B14F-4D97-AF65-F5344CB8AC3E}">
-        <p14:creationId xmlns:p14="http://schemas.microsoft.com/office/powerpoint/2010/main" val="1754256957"/>
-      </p:ext>
-    </p:extLst>
-  </p:cSld>
-  <p:clrMapOvr>
-    <a:masterClrMapping/>
-  </p:clrMapOvr>
-</p:sld>
-</file>
-
-<file path=ppt/slides/slide8.xml><?xml version="1.0" encoding="utf-8"?>
-<p:sld xmlns:a="http://schemas.openxmlformats.org/drawingml/2006/main" xmlns:r="http://schemas.openxmlformats.org/officeDocument/2006/relationships" xmlns:p="http://schemas.openxmlformats.org/presentationml/2006/main">
-  <p:cSld>
-    <p:spTree>
-      <p:nvGrpSpPr>
-        <p:cNvPr id="1" name=""/>
-        <p:cNvGrpSpPr/>
-        <p:nvPr/>
-      </p:nvGrpSpPr>
-      <p:grpSpPr>
-        <a:xfrm>
-          <a:off x="0" y="0"/>
-          <a:ext cx="0" cy="0"/>
-          <a:chOff x="0" y="0"/>
-          <a:chExt cx="0" cy="0"/>
-        </a:xfrm>
-      </p:grpSpPr>
-      <p:sp>
-        <p:nvSpPr>
-          <p:cNvPr id="2" name="Title 1"/>
-          <p:cNvSpPr>
-            <a:spLocks noGrp="1"/>
-          </p:cNvSpPr>
-          <p:nvPr>
-            <p:ph type="title"/>
-          </p:nvPr>
-        </p:nvSpPr>
-        <p:spPr/>
-        <p:txBody>
-          <a:bodyPr/>
-          <a:lstStyle/>
-          <a:p>
-            <a:r>
-              <a:rPr lang="en-US" dirty="0"/>
               <a:t>Elastic File System (EFS)</a:t>
             </a:r>
           </a:p>
@@ -7783,30 +9042,6 @@
           </a:p>
         </p:txBody>
       </p:sp>
-      <p:pic>
-        <p:nvPicPr>
-          <p:cNvPr id="4" name="Picture 3"/>
-          <p:cNvPicPr>
-            <a:picLocks noChangeAspect="1"/>
-          </p:cNvPicPr>
-          <p:nvPr/>
-        </p:nvPicPr>
-        <p:blipFill>
-          <a:blip r:embed="rId2"/>
-          <a:stretch>
-            <a:fillRect/>
-          </a:stretch>
-        </p:blipFill>
-        <p:spPr>
-          <a:xfrm>
-            <a:off x="7678194" y="625497"/>
-            <a:ext cx="1008606" cy="974703"/>
-          </a:xfrm>
-          <a:prstGeom prst="rect">
-            <a:avLst/>
-          </a:prstGeom>
-        </p:spPr>
-      </p:pic>
       <p:graphicFrame>
         <p:nvGraphicFramePr>
           <p:cNvPr id="5" name="Table 4"/>
@@ -8011,129 +9246,46 @@
           </a:graphicData>
         </a:graphic>
       </p:graphicFrame>
+      <p:pic>
+        <p:nvPicPr>
+          <p:cNvPr id="6" name="Graphic 5">
+            <a:extLst>
+              <a:ext uri="{FF2B5EF4-FFF2-40B4-BE49-F238E27FC236}">
+                <a16:creationId xmlns:a16="http://schemas.microsoft.com/office/drawing/2014/main" id="{943CC62D-02BB-BA40-934A-1FDAF5FC557C}"/>
+              </a:ext>
+            </a:extLst>
+          </p:cNvPr>
+          <p:cNvPicPr>
+            <a:picLocks noChangeAspect="1"/>
+          </p:cNvPicPr>
+          <p:nvPr/>
+        </p:nvPicPr>
+        <p:blipFill>
+          <a:blip r:embed="rId2">
+            <a:extLst>
+              <a:ext uri="{96DAC541-7B7A-43D3-8B79-37D633B846F1}">
+                <asvg:svgBlip xmlns:asvg="http://schemas.microsoft.com/office/drawing/2016/SVG/main" r:embed="rId3"/>
+              </a:ext>
+            </a:extLst>
+          </a:blip>
+          <a:stretch>
+            <a:fillRect/>
+          </a:stretch>
+        </p:blipFill>
+        <p:spPr>
+          <a:xfrm>
+            <a:off x="7508003" y="277990"/>
+            <a:ext cx="1178797" cy="1178797"/>
+          </a:xfrm>
+          <a:prstGeom prst="rect">
+            <a:avLst/>
+          </a:prstGeom>
+        </p:spPr>
+      </p:pic>
     </p:spTree>
     <p:extLst>
       <p:ext uri="{BB962C8B-B14F-4D97-AF65-F5344CB8AC3E}">
         <p14:creationId xmlns:p14="http://schemas.microsoft.com/office/powerpoint/2010/main" val="3220653576"/>
-      </p:ext>
-    </p:extLst>
-  </p:cSld>
-  <p:clrMapOvr>
-    <a:masterClrMapping/>
-  </p:clrMapOvr>
-</p:sld>
-</file>
-
-<file path=ppt/slides/slide9.xml><?xml version="1.0" encoding="utf-8"?>
-<p:sld xmlns:a="http://schemas.openxmlformats.org/drawingml/2006/main" xmlns:r="http://schemas.openxmlformats.org/officeDocument/2006/relationships" xmlns:p="http://schemas.openxmlformats.org/presentationml/2006/main">
-  <p:cSld>
-    <p:spTree>
-      <p:nvGrpSpPr>
-        <p:cNvPr id="1" name=""/>
-        <p:cNvGrpSpPr/>
-        <p:nvPr/>
-      </p:nvGrpSpPr>
-      <p:grpSpPr>
-        <a:xfrm>
-          <a:off x="0" y="0"/>
-          <a:ext cx="0" cy="0"/>
-          <a:chOff x="0" y="0"/>
-          <a:chExt cx="0" cy="0"/>
-        </a:xfrm>
-      </p:grpSpPr>
-      <p:sp>
-        <p:nvSpPr>
-          <p:cNvPr id="2" name="Title 1"/>
-          <p:cNvSpPr>
-            <a:spLocks noGrp="1"/>
-          </p:cNvSpPr>
-          <p:nvPr>
-            <p:ph type="title"/>
-          </p:nvPr>
-        </p:nvSpPr>
-        <p:spPr/>
-        <p:txBody>
-          <a:bodyPr/>
-          <a:lstStyle/>
-          <a:p>
-            <a:r>
-              <a:rPr lang="en-US" dirty="0"/>
-              <a:t>EFS</a:t>
-            </a:r>
-          </a:p>
-        </p:txBody>
-      </p:sp>
-      <p:sp>
-        <p:nvSpPr>
-          <p:cNvPr id="3" name="Content Placeholder 2"/>
-          <p:cNvSpPr>
-            <a:spLocks noGrp="1"/>
-          </p:cNvSpPr>
-          <p:nvPr>
-            <p:ph idx="1"/>
-          </p:nvPr>
-        </p:nvSpPr>
-        <p:spPr/>
-        <p:txBody>
-          <a:bodyPr>
-            <a:normAutofit lnSpcReduction="10000"/>
-          </a:bodyPr>
-          <a:lstStyle/>
-          <a:p>
-            <a:r>
-              <a:rPr lang="en-US" dirty="0"/>
-              <a:t>A fully managed file system for EC2 instances.</a:t>
-            </a:r>
-          </a:p>
-          <a:p>
-            <a:pPr lvl="1"/>
-            <a:r>
-              <a:rPr lang="en-US" dirty="0"/>
-              <a:t>Shareable across thousands of instances</a:t>
-            </a:r>
-          </a:p>
-          <a:p>
-            <a:pPr lvl="1"/>
-            <a:r>
-              <a:rPr lang="en-US" dirty="0"/>
-              <a:t>Scalable to petabytes</a:t>
-            </a:r>
-          </a:p>
-          <a:p>
-            <a:pPr lvl="1"/>
-            <a:r>
-              <a:rPr lang="en-US" dirty="0"/>
-              <a:t>Works with standard operating system APIs</a:t>
-            </a:r>
-          </a:p>
-          <a:p>
-            <a:pPr lvl="1"/>
-            <a:endParaRPr lang="en-US" dirty="0"/>
-          </a:p>
-          <a:p>
-            <a:r>
-              <a:rPr lang="en-US" dirty="0"/>
-              <a:t>Based on Network File System version 4 (NFSv4).</a:t>
-            </a:r>
-          </a:p>
-          <a:p>
-            <a:endParaRPr lang="en-US" dirty="0"/>
-          </a:p>
-          <a:p>
-            <a:r>
-              <a:rPr lang="en-US" dirty="0"/>
-              <a:t>Files redundantly stored across multiple AZs.</a:t>
-            </a:r>
-          </a:p>
-          <a:p>
-            <a:endParaRPr lang="en-US" dirty="0"/>
-          </a:p>
-        </p:txBody>
-      </p:sp>
-    </p:spTree>
-    <p:extLst>
-      <p:ext uri="{BB962C8B-B14F-4D97-AF65-F5344CB8AC3E}">
-        <p14:creationId xmlns:p14="http://schemas.microsoft.com/office/powerpoint/2010/main" val="2891050390"/>
       </p:ext>
     </p:extLst>
   </p:cSld>

</xml_diff>

<commit_message>
minor updates in lectures
</commit_message>
<xml_diff>
--- a/lectures/infrastructure-week-4.pptx
+++ b/lectures/infrastructure-week-4.pptx
@@ -44,10 +44,9 @@
     <p:sldId id="301" r:id="rId38"/>
     <p:sldId id="288" r:id="rId39"/>
     <p:sldId id="289" r:id="rId40"/>
-    <p:sldId id="296" r:id="rId41"/>
-    <p:sldId id="290" r:id="rId42"/>
-    <p:sldId id="297" r:id="rId43"/>
-    <p:sldId id="304" r:id="rId44"/>
+    <p:sldId id="290" r:id="rId41"/>
+    <p:sldId id="297" r:id="rId42"/>
+    <p:sldId id="304" r:id="rId43"/>
   </p:sldIdLst>
   <p:sldSz cx="9144000" cy="6858000" type="screen4x3"/>
   <p:notesSz cx="6858000" cy="9144000"/>
@@ -344,7 +343,7 @@
           <a:p>
             <a:fld id="{5C992B2E-871F-DF41-938B-F17F540EA4B5}" type="datetimeFigureOut">
               <a:rPr lang="en-US" smtClean="0"/>
-              <a:t>7/5/19</a:t>
+              <a:t>7/6/19</a:t>
             </a:fld>
             <a:endParaRPr lang="en-US"/>
           </a:p>
@@ -512,7 +511,7 @@
           <a:p>
             <a:fld id="{5C992B2E-871F-DF41-938B-F17F540EA4B5}" type="datetimeFigureOut">
               <a:rPr lang="en-US" smtClean="0"/>
-              <a:t>7/5/19</a:t>
+              <a:t>7/6/19</a:t>
             </a:fld>
             <a:endParaRPr lang="en-US"/>
           </a:p>
@@ -690,7 +689,7 @@
           <a:p>
             <a:fld id="{5C992B2E-871F-DF41-938B-F17F540EA4B5}" type="datetimeFigureOut">
               <a:rPr lang="en-US" smtClean="0"/>
-              <a:t>7/5/19</a:t>
+              <a:t>7/6/19</a:t>
             </a:fld>
             <a:endParaRPr lang="en-US"/>
           </a:p>
@@ -858,7 +857,7 @@
           <a:p>
             <a:fld id="{5C992B2E-871F-DF41-938B-F17F540EA4B5}" type="datetimeFigureOut">
               <a:rPr lang="en-US" smtClean="0"/>
-              <a:t>7/5/19</a:t>
+              <a:t>7/6/19</a:t>
             </a:fld>
             <a:endParaRPr lang="en-US"/>
           </a:p>
@@ -1103,7 +1102,7 @@
           <a:p>
             <a:fld id="{5C992B2E-871F-DF41-938B-F17F540EA4B5}" type="datetimeFigureOut">
               <a:rPr lang="en-US" smtClean="0"/>
-              <a:t>7/5/19</a:t>
+              <a:t>7/6/19</a:t>
             </a:fld>
             <a:endParaRPr lang="en-US"/>
           </a:p>
@@ -1388,7 +1387,7 @@
           <a:p>
             <a:fld id="{5C992B2E-871F-DF41-938B-F17F540EA4B5}" type="datetimeFigureOut">
               <a:rPr lang="en-US" smtClean="0"/>
-              <a:t>7/5/19</a:t>
+              <a:t>7/6/19</a:t>
             </a:fld>
             <a:endParaRPr lang="en-US"/>
           </a:p>
@@ -1807,7 +1806,7 @@
           <a:p>
             <a:fld id="{5C992B2E-871F-DF41-938B-F17F540EA4B5}" type="datetimeFigureOut">
               <a:rPr lang="en-US" smtClean="0"/>
-              <a:t>7/5/19</a:t>
+              <a:t>7/6/19</a:t>
             </a:fld>
             <a:endParaRPr lang="en-US"/>
           </a:p>
@@ -1924,7 +1923,7 @@
           <a:p>
             <a:fld id="{5C992B2E-871F-DF41-938B-F17F540EA4B5}" type="datetimeFigureOut">
               <a:rPr lang="en-US" smtClean="0"/>
-              <a:t>7/5/19</a:t>
+              <a:t>7/6/19</a:t>
             </a:fld>
             <a:endParaRPr lang="en-US"/>
           </a:p>
@@ -2019,7 +2018,7 @@
           <a:p>
             <a:fld id="{5C992B2E-871F-DF41-938B-F17F540EA4B5}" type="datetimeFigureOut">
               <a:rPr lang="en-US" smtClean="0"/>
-              <a:t>7/5/19</a:t>
+              <a:t>7/6/19</a:t>
             </a:fld>
             <a:endParaRPr lang="en-US"/>
           </a:p>
@@ -2294,7 +2293,7 @@
           <a:p>
             <a:fld id="{5C992B2E-871F-DF41-938B-F17F540EA4B5}" type="datetimeFigureOut">
               <a:rPr lang="en-US" smtClean="0"/>
-              <a:t>7/5/19</a:t>
+              <a:t>7/6/19</a:t>
             </a:fld>
             <a:endParaRPr lang="en-US"/>
           </a:p>
@@ -2546,7 +2545,7 @@
           <a:p>
             <a:fld id="{5C992B2E-871F-DF41-938B-F17F540EA4B5}" type="datetimeFigureOut">
               <a:rPr lang="en-US" smtClean="0"/>
-              <a:t>7/5/19</a:t>
+              <a:t>7/6/19</a:t>
             </a:fld>
             <a:endParaRPr lang="en-US"/>
           </a:p>
@@ -2757,7 +2756,7 @@
           <a:p>
             <a:fld id="{5C992B2E-871F-DF41-938B-F17F540EA4B5}" type="datetimeFigureOut">
               <a:rPr lang="en-US" smtClean="0"/>
-              <a:t>7/5/19</a:t>
+              <a:t>7/6/19</a:t>
             </a:fld>
             <a:endParaRPr lang="en-US"/>
           </a:p>
@@ -7838,118 +7837,6 @@
           <a:p>
             <a:r>
               <a:rPr lang="en-US" dirty="0"/>
-              <a:t>DynamoDB Hands-on</a:t>
-            </a:r>
-          </a:p>
-        </p:txBody>
-      </p:sp>
-      <p:sp>
-        <p:nvSpPr>
-          <p:cNvPr id="3" name="Content Placeholder 2"/>
-          <p:cNvSpPr>
-            <a:spLocks noGrp="1"/>
-          </p:cNvSpPr>
-          <p:nvPr>
-            <p:ph idx="1"/>
-          </p:nvPr>
-        </p:nvSpPr>
-        <p:spPr/>
-        <p:txBody>
-          <a:bodyPr>
-            <a:normAutofit/>
-          </a:bodyPr>
-          <a:lstStyle/>
-          <a:p>
-            <a:r>
-              <a:rPr lang="en-US" dirty="0"/>
-              <a:t>Create a DynamoDB table.</a:t>
-            </a:r>
-          </a:p>
-          <a:p>
-            <a:endParaRPr lang="en-US" dirty="0"/>
-          </a:p>
-          <a:p>
-            <a:r>
-              <a:rPr lang="en-US" dirty="0"/>
-              <a:t>Add an item to the table.</a:t>
-            </a:r>
-          </a:p>
-          <a:p>
-            <a:endParaRPr lang="en-US" dirty="0"/>
-          </a:p>
-        </p:txBody>
-      </p:sp>
-      <p:pic>
-        <p:nvPicPr>
-          <p:cNvPr id="4" name="Picture 3"/>
-          <p:cNvPicPr>
-            <a:picLocks noChangeAspect="1"/>
-          </p:cNvPicPr>
-          <p:nvPr/>
-        </p:nvPicPr>
-        <p:blipFill>
-          <a:blip r:embed="rId2"/>
-          <a:stretch>
-            <a:fillRect/>
-          </a:stretch>
-        </p:blipFill>
-        <p:spPr>
-          <a:xfrm>
-            <a:off x="7268698" y="403586"/>
-            <a:ext cx="1014052" cy="1014052"/>
-          </a:xfrm>
-          <a:prstGeom prst="rect">
-            <a:avLst/>
-          </a:prstGeom>
-        </p:spPr>
-      </p:pic>
-    </p:spTree>
-    <p:extLst>
-      <p:ext uri="{BB962C8B-B14F-4D97-AF65-F5344CB8AC3E}">
-        <p14:creationId xmlns:p14="http://schemas.microsoft.com/office/powerpoint/2010/main" val="1032704479"/>
-      </p:ext>
-    </p:extLst>
-  </p:cSld>
-  <p:clrMapOvr>
-    <a:masterClrMapping/>
-  </p:clrMapOvr>
-</p:sld>
-</file>
-
-<file path=ppt/slides/slide41.xml><?xml version="1.0" encoding="utf-8"?>
-<p:sld xmlns:a="http://schemas.openxmlformats.org/drawingml/2006/main" xmlns:r="http://schemas.openxmlformats.org/officeDocument/2006/relationships" xmlns:p="http://schemas.openxmlformats.org/presentationml/2006/main">
-  <p:cSld>
-    <p:spTree>
-      <p:nvGrpSpPr>
-        <p:cNvPr id="1" name=""/>
-        <p:cNvGrpSpPr/>
-        <p:nvPr/>
-      </p:nvGrpSpPr>
-      <p:grpSpPr>
-        <a:xfrm>
-          <a:off x="0" y="0"/>
-          <a:ext cx="0" cy="0"/>
-          <a:chOff x="0" y="0"/>
-          <a:chExt cx="0" cy="0"/>
-        </a:xfrm>
-      </p:grpSpPr>
-      <p:sp>
-        <p:nvSpPr>
-          <p:cNvPr id="2" name="Title 1"/>
-          <p:cNvSpPr>
-            <a:spLocks noGrp="1"/>
-          </p:cNvSpPr>
-          <p:nvPr>
-            <p:ph type="title"/>
-          </p:nvPr>
-        </p:nvSpPr>
-        <p:spPr/>
-        <p:txBody>
-          <a:bodyPr/>
-          <a:lstStyle/>
-          <a:p>
-            <a:r>
-              <a:rPr lang="en-US" dirty="0"/>
               <a:t>Redshift</a:t>
             </a:r>
           </a:p>
@@ -8082,7 +7969,7 @@
 </p:sld>
 </file>
 
-<file path=ppt/slides/slide42.xml><?xml version="1.0" encoding="utf-8"?>
+<file path=ppt/slides/slide41.xml><?xml version="1.0" encoding="utf-8"?>
 <p:sld xmlns:a="http://schemas.openxmlformats.org/drawingml/2006/main" xmlns:r="http://schemas.openxmlformats.org/officeDocument/2006/relationships" xmlns:p="http://schemas.openxmlformats.org/presentationml/2006/main">
   <p:cSld>
     <p:spTree>
@@ -8268,7 +8155,7 @@
 </p:sld>
 </file>
 
-<file path=ppt/slides/slide43.xml><?xml version="1.0" encoding="utf-8"?>
+<file path=ppt/slides/slide42.xml><?xml version="1.0" encoding="utf-8"?>
 <p:sld xmlns:a="http://schemas.openxmlformats.org/drawingml/2006/main" xmlns:r="http://schemas.openxmlformats.org/officeDocument/2006/relationships" xmlns:p="http://schemas.openxmlformats.org/presentationml/2006/main">
   <p:cSld>
     <p:spTree>

</xml_diff>

<commit_message>
move security content and add saga pattern
</commit_message>
<xml_diff>
--- a/lectures/infrastructure-week-4.pptx
+++ b/lectures/infrastructure-week-4.pptx
@@ -47,6 +47,15 @@
     <p:sldId id="290" r:id="rId41"/>
     <p:sldId id="297" r:id="rId42"/>
     <p:sldId id="304" r:id="rId43"/>
+    <p:sldId id="305" r:id="rId44"/>
+    <p:sldId id="306" r:id="rId45"/>
+    <p:sldId id="307" r:id="rId46"/>
+    <p:sldId id="309" r:id="rId47"/>
+    <p:sldId id="310" r:id="rId48"/>
+    <p:sldId id="311" r:id="rId49"/>
+    <p:sldId id="312" r:id="rId50"/>
+    <p:sldId id="308" r:id="rId51"/>
+    <p:sldId id="313" r:id="rId52"/>
   </p:sldIdLst>
   <p:sldSz cx="9144000" cy="6858000" type="screen4x3"/>
   <p:notesSz cx="6858000" cy="9144000"/>
@@ -343,7 +352,7 @@
           <a:p>
             <a:fld id="{5C992B2E-871F-DF41-938B-F17F540EA4B5}" type="datetimeFigureOut">
               <a:rPr lang="en-US" smtClean="0"/>
-              <a:t>7/30/19</a:t>
+              <a:t>8/6/19</a:t>
             </a:fld>
             <a:endParaRPr lang="en-US"/>
           </a:p>
@@ -511,7 +520,7 @@
           <a:p>
             <a:fld id="{5C992B2E-871F-DF41-938B-F17F540EA4B5}" type="datetimeFigureOut">
               <a:rPr lang="en-US" smtClean="0"/>
-              <a:t>7/30/19</a:t>
+              <a:t>8/6/19</a:t>
             </a:fld>
             <a:endParaRPr lang="en-US"/>
           </a:p>
@@ -689,7 +698,7 @@
           <a:p>
             <a:fld id="{5C992B2E-871F-DF41-938B-F17F540EA4B5}" type="datetimeFigureOut">
               <a:rPr lang="en-US" smtClean="0"/>
-              <a:t>7/30/19</a:t>
+              <a:t>8/6/19</a:t>
             </a:fld>
             <a:endParaRPr lang="en-US"/>
           </a:p>
@@ -857,7 +866,7 @@
           <a:p>
             <a:fld id="{5C992B2E-871F-DF41-938B-F17F540EA4B5}" type="datetimeFigureOut">
               <a:rPr lang="en-US" smtClean="0"/>
-              <a:t>7/30/19</a:t>
+              <a:t>8/6/19</a:t>
             </a:fld>
             <a:endParaRPr lang="en-US"/>
           </a:p>
@@ -1102,7 +1111,7 @@
           <a:p>
             <a:fld id="{5C992B2E-871F-DF41-938B-F17F540EA4B5}" type="datetimeFigureOut">
               <a:rPr lang="en-US" smtClean="0"/>
-              <a:t>7/30/19</a:t>
+              <a:t>8/6/19</a:t>
             </a:fld>
             <a:endParaRPr lang="en-US"/>
           </a:p>
@@ -1387,7 +1396,7 @@
           <a:p>
             <a:fld id="{5C992B2E-871F-DF41-938B-F17F540EA4B5}" type="datetimeFigureOut">
               <a:rPr lang="en-US" smtClean="0"/>
-              <a:t>7/30/19</a:t>
+              <a:t>8/6/19</a:t>
             </a:fld>
             <a:endParaRPr lang="en-US"/>
           </a:p>
@@ -1806,7 +1815,7 @@
           <a:p>
             <a:fld id="{5C992B2E-871F-DF41-938B-F17F540EA4B5}" type="datetimeFigureOut">
               <a:rPr lang="en-US" smtClean="0"/>
-              <a:t>7/30/19</a:t>
+              <a:t>8/6/19</a:t>
             </a:fld>
             <a:endParaRPr lang="en-US"/>
           </a:p>
@@ -1923,7 +1932,7 @@
           <a:p>
             <a:fld id="{5C992B2E-871F-DF41-938B-F17F540EA4B5}" type="datetimeFigureOut">
               <a:rPr lang="en-US" smtClean="0"/>
-              <a:t>7/30/19</a:t>
+              <a:t>8/6/19</a:t>
             </a:fld>
             <a:endParaRPr lang="en-US"/>
           </a:p>
@@ -2018,7 +2027,7 @@
           <a:p>
             <a:fld id="{5C992B2E-871F-DF41-938B-F17F540EA4B5}" type="datetimeFigureOut">
               <a:rPr lang="en-US" smtClean="0"/>
-              <a:t>7/30/19</a:t>
+              <a:t>8/6/19</a:t>
             </a:fld>
             <a:endParaRPr lang="en-US"/>
           </a:p>
@@ -2293,7 +2302,7 @@
           <a:p>
             <a:fld id="{5C992B2E-871F-DF41-938B-F17F540EA4B5}" type="datetimeFigureOut">
               <a:rPr lang="en-US" smtClean="0"/>
-              <a:t>7/30/19</a:t>
+              <a:t>8/6/19</a:t>
             </a:fld>
             <a:endParaRPr lang="en-US"/>
           </a:p>
@@ -2545,7 +2554,7 @@
           <a:p>
             <a:fld id="{5C992B2E-871F-DF41-938B-F17F540EA4B5}" type="datetimeFigureOut">
               <a:rPr lang="en-US" smtClean="0"/>
-              <a:t>7/30/19</a:t>
+              <a:t>8/6/19</a:t>
             </a:fld>
             <a:endParaRPr lang="en-US"/>
           </a:p>
@@ -2756,7 +2765,7 @@
           <a:p>
             <a:fld id="{5C992B2E-871F-DF41-938B-F17F540EA4B5}" type="datetimeFigureOut">
               <a:rPr lang="en-US" smtClean="0"/>
-              <a:t>7/30/19</a:t>
+              <a:t>8/6/19</a:t>
             </a:fld>
             <a:endParaRPr lang="en-US"/>
           </a:p>
@@ -4563,7 +4572,7 @@
         <p:spPr/>
         <p:txBody>
           <a:bodyPr>
-            <a:normAutofit fontScale="77500" lnSpcReduction="20000"/>
+            <a:normAutofit fontScale="47500" lnSpcReduction="20000"/>
           </a:bodyPr>
           <a:lstStyle/>
           <a:p>
@@ -4585,6 +4594,10 @@
               <a:rPr lang="en-US" dirty="0"/>
               <a:t>EFS</a:t>
             </a:r>
+          </a:p>
+          <a:p>
+            <a:pPr lvl="1"/>
+            <a:endParaRPr lang="en-US" dirty="0"/>
           </a:p>
           <a:p>
             <a:r>
@@ -4608,6 +4621,10 @@
             <a:endParaRPr lang="en-US" dirty="0"/>
           </a:p>
           <a:p>
+            <a:pPr lvl="1"/>
+            <a:endParaRPr lang="en-US" dirty="0"/>
+          </a:p>
+          <a:p>
             <a:r>
               <a:rPr lang="en-US" dirty="0"/>
               <a:t>Databases</a:t>
@@ -4655,6 +4672,47 @@
               <a:rPr lang="en-US" dirty="0"/>
               <a:t>Neptune</a:t>
             </a:r>
+          </a:p>
+          <a:p>
+            <a:pPr lvl="1"/>
+            <a:endParaRPr lang="en-US" dirty="0"/>
+          </a:p>
+          <a:p>
+            <a:r>
+              <a:rPr lang="en-US" dirty="0"/>
+              <a:t>AWS Security</a:t>
+            </a:r>
+          </a:p>
+          <a:p>
+            <a:pPr lvl="1"/>
+            <a:r>
+              <a:rPr lang="en-US" dirty="0"/>
+              <a:t>Shield</a:t>
+            </a:r>
+          </a:p>
+          <a:p>
+            <a:pPr lvl="1"/>
+            <a:r>
+              <a:rPr lang="en-US" dirty="0"/>
+              <a:t>WAF</a:t>
+            </a:r>
+          </a:p>
+          <a:p>
+            <a:pPr lvl="1"/>
+            <a:r>
+              <a:rPr lang="en-US" dirty="0"/>
+              <a:t>Guard Duty</a:t>
+            </a:r>
+          </a:p>
+          <a:p>
+            <a:pPr lvl="1"/>
+            <a:r>
+              <a:rPr lang="en-US" dirty="0"/>
+              <a:t>KMS</a:t>
+            </a:r>
+          </a:p>
+          <a:p>
+            <a:endParaRPr lang="en-US" dirty="0"/>
           </a:p>
           <a:p>
             <a:pPr lvl="1"/>
@@ -8358,6 +8416,951 @@
 </p:sld>
 </file>
 
+<file path=ppt/slides/slide43.xml><?xml version="1.0" encoding="utf-8"?>
+<p:sld xmlns:a="http://schemas.openxmlformats.org/drawingml/2006/main" xmlns:r="http://schemas.openxmlformats.org/officeDocument/2006/relationships" xmlns:p="http://schemas.openxmlformats.org/presentationml/2006/main">
+  <p:cSld>
+    <p:spTree>
+      <p:nvGrpSpPr>
+        <p:cNvPr id="1" name=""/>
+        <p:cNvGrpSpPr/>
+        <p:nvPr/>
+      </p:nvGrpSpPr>
+      <p:grpSpPr>
+        <a:xfrm>
+          <a:off x="0" y="0"/>
+          <a:ext cx="0" cy="0"/>
+          <a:chOff x="0" y="0"/>
+          <a:chExt cx="0" cy="0"/>
+        </a:xfrm>
+      </p:grpSpPr>
+      <p:sp>
+        <p:nvSpPr>
+          <p:cNvPr id="2" name="Title 1"/>
+          <p:cNvSpPr>
+            <a:spLocks noGrp="1"/>
+          </p:cNvSpPr>
+          <p:nvPr>
+            <p:ph type="title"/>
+          </p:nvPr>
+        </p:nvSpPr>
+        <p:spPr/>
+        <p:txBody>
+          <a:bodyPr/>
+          <a:lstStyle/>
+          <a:p>
+            <a:r>
+              <a:rPr lang="en-US" dirty="0"/>
+              <a:t>AWS Shared Security Model</a:t>
+            </a:r>
+          </a:p>
+        </p:txBody>
+      </p:sp>
+      <p:pic>
+        <p:nvPicPr>
+          <p:cNvPr id="4" name="Picture 3"/>
+          <p:cNvPicPr>
+            <a:picLocks noChangeAspect="1"/>
+          </p:cNvPicPr>
+          <p:nvPr/>
+        </p:nvPicPr>
+        <p:blipFill>
+          <a:blip r:embed="rId2"/>
+          <a:stretch>
+            <a:fillRect/>
+          </a:stretch>
+        </p:blipFill>
+        <p:spPr>
+          <a:xfrm>
+            <a:off x="11545" y="1341298"/>
+            <a:ext cx="9144000" cy="5505157"/>
+          </a:xfrm>
+          <a:prstGeom prst="rect">
+            <a:avLst/>
+          </a:prstGeom>
+        </p:spPr>
+      </p:pic>
+    </p:spTree>
+    <p:extLst>
+      <p:ext uri="{BB962C8B-B14F-4D97-AF65-F5344CB8AC3E}">
+        <p14:creationId xmlns:p14="http://schemas.microsoft.com/office/powerpoint/2010/main" val="70611406"/>
+      </p:ext>
+    </p:extLst>
+  </p:cSld>
+  <p:clrMapOvr>
+    <a:masterClrMapping/>
+  </p:clrMapOvr>
+</p:sld>
+</file>
+
+<file path=ppt/slides/slide44.xml><?xml version="1.0" encoding="utf-8"?>
+<p:sld xmlns:a="http://schemas.openxmlformats.org/drawingml/2006/main" xmlns:r="http://schemas.openxmlformats.org/officeDocument/2006/relationships" xmlns:p="http://schemas.openxmlformats.org/presentationml/2006/main">
+  <p:cSld>
+    <p:spTree>
+      <p:nvGrpSpPr>
+        <p:cNvPr id="1" name=""/>
+        <p:cNvGrpSpPr/>
+        <p:nvPr/>
+      </p:nvGrpSpPr>
+      <p:grpSpPr>
+        <a:xfrm>
+          <a:off x="0" y="0"/>
+          <a:ext cx="0" cy="0"/>
+          <a:chOff x="0" y="0"/>
+          <a:chExt cx="0" cy="0"/>
+        </a:xfrm>
+      </p:grpSpPr>
+      <p:sp>
+        <p:nvSpPr>
+          <p:cNvPr id="2" name="Title 1"/>
+          <p:cNvSpPr>
+            <a:spLocks noGrp="1"/>
+          </p:cNvSpPr>
+          <p:nvPr>
+            <p:ph type="title"/>
+          </p:nvPr>
+        </p:nvSpPr>
+        <p:spPr/>
+        <p:txBody>
+          <a:bodyPr/>
+          <a:lstStyle/>
+          <a:p>
+            <a:r>
+              <a:rPr lang="en-US" dirty="0"/>
+              <a:t>AWS Network Security</a:t>
+            </a:r>
+          </a:p>
+        </p:txBody>
+      </p:sp>
+      <p:sp>
+        <p:nvSpPr>
+          <p:cNvPr id="3" name="Content Placeholder 2"/>
+          <p:cNvSpPr>
+            <a:spLocks noGrp="1"/>
+          </p:cNvSpPr>
+          <p:nvPr>
+            <p:ph idx="1"/>
+          </p:nvPr>
+        </p:nvSpPr>
+        <p:spPr/>
+        <p:txBody>
+          <a:bodyPr>
+            <a:normAutofit fontScale="92500" lnSpcReduction="10000"/>
+          </a:bodyPr>
+          <a:lstStyle/>
+          <a:p>
+            <a:r>
+              <a:rPr lang="en-US" dirty="0"/>
+              <a:t>AWS network and Amazon network use similar infrastructure, but are logically separated from one another.</a:t>
+            </a:r>
+          </a:p>
+          <a:p>
+            <a:endParaRPr lang="en-US" dirty="0"/>
+          </a:p>
+          <a:p>
+            <a:r>
+              <a:rPr lang="en-US" dirty="0"/>
+              <a:t>AWS prevents IP spoofing: instance sending data with an IP or MAC address that’s not it’s own.</a:t>
+            </a:r>
+          </a:p>
+          <a:p>
+            <a:endParaRPr lang="en-US" dirty="0"/>
+          </a:p>
+          <a:p>
+            <a:r>
+              <a:rPr lang="en-US" dirty="0"/>
+              <a:t>Network port scans must be approved by AWS in advance.</a:t>
+            </a:r>
+          </a:p>
+          <a:p>
+            <a:endParaRPr lang="en-US" dirty="0"/>
+          </a:p>
+        </p:txBody>
+      </p:sp>
+    </p:spTree>
+    <p:extLst>
+      <p:ext uri="{BB962C8B-B14F-4D97-AF65-F5344CB8AC3E}">
+        <p14:creationId xmlns:p14="http://schemas.microsoft.com/office/powerpoint/2010/main" val="3030920753"/>
+      </p:ext>
+    </p:extLst>
+  </p:cSld>
+  <p:clrMapOvr>
+    <a:masterClrMapping/>
+  </p:clrMapOvr>
+</p:sld>
+</file>
+
+<file path=ppt/slides/slide45.xml><?xml version="1.0" encoding="utf-8"?>
+<p:sld xmlns:a="http://schemas.openxmlformats.org/drawingml/2006/main" xmlns:r="http://schemas.openxmlformats.org/officeDocument/2006/relationships" xmlns:p="http://schemas.openxmlformats.org/presentationml/2006/main">
+  <p:cSld>
+    <p:spTree>
+      <p:nvGrpSpPr>
+        <p:cNvPr id="1" name=""/>
+        <p:cNvGrpSpPr/>
+        <p:nvPr/>
+      </p:nvGrpSpPr>
+      <p:grpSpPr>
+        <a:xfrm>
+          <a:off x="0" y="0"/>
+          <a:ext cx="0" cy="0"/>
+          <a:chOff x="0" y="0"/>
+          <a:chExt cx="0" cy="0"/>
+        </a:xfrm>
+      </p:grpSpPr>
+      <p:sp>
+        <p:nvSpPr>
+          <p:cNvPr id="2" name="Title 1">
+            <a:extLst>
+              <a:ext uri="{FF2B5EF4-FFF2-40B4-BE49-F238E27FC236}">
+                <a16:creationId xmlns:a16="http://schemas.microsoft.com/office/drawing/2014/main" id="{084D90D8-2609-4E45-AD2A-B5F273033010}"/>
+              </a:ext>
+            </a:extLst>
+          </p:cNvPr>
+          <p:cNvSpPr>
+            <a:spLocks noGrp="1"/>
+          </p:cNvSpPr>
+          <p:nvPr>
+            <p:ph type="title"/>
+          </p:nvPr>
+        </p:nvSpPr>
+        <p:spPr/>
+        <p:txBody>
+          <a:bodyPr/>
+          <a:lstStyle/>
+          <a:p>
+            <a:r>
+              <a:rPr lang="en-US" dirty="0"/>
+              <a:t>Web Application Firewall (WAF)</a:t>
+            </a:r>
+          </a:p>
+        </p:txBody>
+      </p:sp>
+      <p:sp>
+        <p:nvSpPr>
+          <p:cNvPr id="3" name="Content Placeholder 2">
+            <a:extLst>
+              <a:ext uri="{FF2B5EF4-FFF2-40B4-BE49-F238E27FC236}">
+                <a16:creationId xmlns:a16="http://schemas.microsoft.com/office/drawing/2014/main" id="{0CD8C1F6-B9FC-ED48-AD9A-2C954E092EA0}"/>
+              </a:ext>
+            </a:extLst>
+          </p:cNvPr>
+          <p:cNvSpPr>
+            <a:spLocks noGrp="1"/>
+          </p:cNvSpPr>
+          <p:nvPr>
+            <p:ph idx="1"/>
+          </p:nvPr>
+        </p:nvSpPr>
+        <p:spPr/>
+        <p:txBody>
+          <a:bodyPr>
+            <a:normAutofit fontScale="92500" lnSpcReduction="20000"/>
+          </a:bodyPr>
+          <a:lstStyle/>
+          <a:p>
+            <a:r>
+              <a:rPr lang="en-US" dirty="0"/>
+              <a:t>Managed service which protects your</a:t>
+            </a:r>
+            <a:br>
+              <a:rPr lang="en-US" dirty="0"/>
+            </a:br>
+            <a:r>
+              <a:rPr lang="en-US" dirty="0"/>
+              <a:t>web applications from common attacks.</a:t>
+            </a:r>
+          </a:p>
+          <a:p>
+            <a:pPr lvl="1"/>
+            <a:r>
+              <a:rPr lang="en-US" dirty="0"/>
+              <a:t>SQL injection</a:t>
+            </a:r>
+          </a:p>
+          <a:p>
+            <a:pPr lvl="1"/>
+            <a:r>
+              <a:rPr lang="en-US" dirty="0"/>
+              <a:t>Cross-site scripting</a:t>
+            </a:r>
+          </a:p>
+          <a:p>
+            <a:pPr lvl="1"/>
+            <a:endParaRPr lang="en-US" dirty="0"/>
+          </a:p>
+          <a:p>
+            <a:r>
+              <a:rPr lang="en-US" dirty="0"/>
+              <a:t>Create custom security rules using web console or API</a:t>
+            </a:r>
+          </a:p>
+          <a:p>
+            <a:endParaRPr lang="en-US" dirty="0"/>
+          </a:p>
+          <a:p>
+            <a:r>
+              <a:rPr lang="en-US" dirty="0"/>
+              <a:t>Deploy as part of CloudFront, ALB, or API Gateway</a:t>
+            </a:r>
+          </a:p>
+        </p:txBody>
+      </p:sp>
+      <p:pic>
+        <p:nvPicPr>
+          <p:cNvPr id="4" name="Graphic 3">
+            <a:extLst>
+              <a:ext uri="{FF2B5EF4-FFF2-40B4-BE49-F238E27FC236}">
+                <a16:creationId xmlns:a16="http://schemas.microsoft.com/office/drawing/2014/main" id="{93216B10-3417-FC4B-948B-B9FD94B3723C}"/>
+              </a:ext>
+            </a:extLst>
+          </p:cNvPr>
+          <p:cNvPicPr>
+            <a:picLocks noChangeAspect="1"/>
+          </p:cNvPicPr>
+          <p:nvPr/>
+        </p:nvPicPr>
+        <p:blipFill>
+          <a:blip r:embed="rId2">
+            <a:extLst>
+              <a:ext uri="{96DAC541-7B7A-43D3-8B79-37D633B846F1}">
+                <asvg:svgBlip xmlns:asvg="http://schemas.microsoft.com/office/drawing/2016/SVG/main" r:embed="rId3"/>
+              </a:ext>
+            </a:extLst>
+          </a:blip>
+          <a:stretch>
+            <a:fillRect/>
+          </a:stretch>
+        </p:blipFill>
+        <p:spPr>
+          <a:xfrm>
+            <a:off x="7590896" y="1417639"/>
+            <a:ext cx="1143000" cy="1143000"/>
+          </a:xfrm>
+          <a:prstGeom prst="rect">
+            <a:avLst/>
+          </a:prstGeom>
+        </p:spPr>
+      </p:pic>
+    </p:spTree>
+    <p:extLst>
+      <p:ext uri="{BB962C8B-B14F-4D97-AF65-F5344CB8AC3E}">
+        <p14:creationId xmlns:p14="http://schemas.microsoft.com/office/powerpoint/2010/main" val="610466490"/>
+      </p:ext>
+    </p:extLst>
+  </p:cSld>
+  <p:clrMapOvr>
+    <a:masterClrMapping/>
+  </p:clrMapOvr>
+</p:sld>
+</file>
+
+<file path=ppt/slides/slide46.xml><?xml version="1.0" encoding="utf-8"?>
+<p:sld xmlns:a="http://schemas.openxmlformats.org/drawingml/2006/main" xmlns:r="http://schemas.openxmlformats.org/officeDocument/2006/relationships" xmlns:p="http://schemas.openxmlformats.org/presentationml/2006/main">
+  <p:cSld>
+    <p:spTree>
+      <p:nvGrpSpPr>
+        <p:cNvPr id="1" name=""/>
+        <p:cNvGrpSpPr/>
+        <p:nvPr/>
+      </p:nvGrpSpPr>
+      <p:grpSpPr>
+        <a:xfrm>
+          <a:off x="0" y="0"/>
+          <a:ext cx="0" cy="0"/>
+          <a:chOff x="0" y="0"/>
+          <a:chExt cx="0" cy="0"/>
+        </a:xfrm>
+      </p:grpSpPr>
+      <p:sp>
+        <p:nvSpPr>
+          <p:cNvPr id="2" name="Title 1">
+            <a:extLst>
+              <a:ext uri="{FF2B5EF4-FFF2-40B4-BE49-F238E27FC236}">
+                <a16:creationId xmlns:a16="http://schemas.microsoft.com/office/drawing/2014/main" id="{A5897A05-B8D9-004A-9D7B-A7F06EF7C9EE}"/>
+              </a:ext>
+            </a:extLst>
+          </p:cNvPr>
+          <p:cNvSpPr>
+            <a:spLocks noGrp="1"/>
+          </p:cNvSpPr>
+          <p:nvPr>
+            <p:ph type="title"/>
+          </p:nvPr>
+        </p:nvSpPr>
+        <p:spPr/>
+        <p:txBody>
+          <a:bodyPr/>
+          <a:lstStyle/>
+          <a:p>
+            <a:r>
+              <a:rPr lang="en-US" dirty="0"/>
+              <a:t>Shield</a:t>
+            </a:r>
+          </a:p>
+        </p:txBody>
+      </p:sp>
+      <p:sp>
+        <p:nvSpPr>
+          <p:cNvPr id="3" name="Content Placeholder 2">
+            <a:extLst>
+              <a:ext uri="{FF2B5EF4-FFF2-40B4-BE49-F238E27FC236}">
+                <a16:creationId xmlns:a16="http://schemas.microsoft.com/office/drawing/2014/main" id="{E1A9ABA0-6D9D-254B-BD4D-4CF8250158F7}"/>
+              </a:ext>
+            </a:extLst>
+          </p:cNvPr>
+          <p:cNvSpPr>
+            <a:spLocks noGrp="1"/>
+          </p:cNvSpPr>
+          <p:nvPr>
+            <p:ph idx="1"/>
+          </p:nvPr>
+        </p:nvSpPr>
+        <p:spPr/>
+        <p:txBody>
+          <a:bodyPr/>
+          <a:lstStyle/>
+          <a:p>
+            <a:r>
+              <a:rPr lang="en-US" dirty="0"/>
+              <a:t>Managed service which protects your application from Distributed Denial of Service (</a:t>
+            </a:r>
+            <a:r>
+              <a:rPr lang="en-US" dirty="0" err="1"/>
+              <a:t>DDos</a:t>
+            </a:r>
+            <a:r>
+              <a:rPr lang="en-US" dirty="0"/>
+              <a:t>) attacks.</a:t>
+            </a:r>
+          </a:p>
+          <a:p>
+            <a:pPr lvl="1"/>
+            <a:r>
+              <a:rPr lang="en-US" dirty="0"/>
+              <a:t>Network layer 3 and 4 attacks</a:t>
+            </a:r>
+          </a:p>
+          <a:p>
+            <a:pPr lvl="1"/>
+            <a:endParaRPr lang="en-US" dirty="0"/>
+          </a:p>
+          <a:p>
+            <a:r>
+              <a:rPr lang="en-US" dirty="0"/>
+              <a:t>Available in either standard or advanced tier depending on resources being protected.</a:t>
+            </a:r>
+          </a:p>
+          <a:p>
+            <a:endParaRPr lang="en-US" dirty="0"/>
+          </a:p>
+          <a:p>
+            <a:endParaRPr lang="en-US" dirty="0"/>
+          </a:p>
+        </p:txBody>
+      </p:sp>
+      <p:pic>
+        <p:nvPicPr>
+          <p:cNvPr id="4" name="Graphic 3">
+            <a:extLst>
+              <a:ext uri="{FF2B5EF4-FFF2-40B4-BE49-F238E27FC236}">
+                <a16:creationId xmlns:a16="http://schemas.microsoft.com/office/drawing/2014/main" id="{5DBAF099-B0D7-FB4C-A26E-FE4467B51DC4}"/>
+              </a:ext>
+            </a:extLst>
+          </p:cNvPr>
+          <p:cNvPicPr>
+            <a:picLocks noChangeAspect="1"/>
+          </p:cNvPicPr>
+          <p:nvPr/>
+        </p:nvPicPr>
+        <p:blipFill>
+          <a:blip r:embed="rId2">
+            <a:extLst>
+              <a:ext uri="{96DAC541-7B7A-43D3-8B79-37D633B846F1}">
+                <asvg:svgBlip xmlns:asvg="http://schemas.microsoft.com/office/drawing/2016/SVG/main" r:embed="rId3"/>
+              </a:ext>
+            </a:extLst>
+          </a:blip>
+          <a:stretch>
+            <a:fillRect/>
+          </a:stretch>
+        </p:blipFill>
+        <p:spPr>
+          <a:xfrm>
+            <a:off x="7658934" y="389772"/>
+            <a:ext cx="1027866" cy="1027866"/>
+          </a:xfrm>
+          <a:prstGeom prst="rect">
+            <a:avLst/>
+          </a:prstGeom>
+        </p:spPr>
+      </p:pic>
+    </p:spTree>
+    <p:extLst>
+      <p:ext uri="{BB962C8B-B14F-4D97-AF65-F5344CB8AC3E}">
+        <p14:creationId xmlns:p14="http://schemas.microsoft.com/office/powerpoint/2010/main" val="3910212128"/>
+      </p:ext>
+    </p:extLst>
+  </p:cSld>
+  <p:clrMapOvr>
+    <a:masterClrMapping/>
+  </p:clrMapOvr>
+</p:sld>
+</file>
+
+<file path=ppt/slides/slide47.xml><?xml version="1.0" encoding="utf-8"?>
+<p:sld xmlns:a="http://schemas.openxmlformats.org/drawingml/2006/main" xmlns:r="http://schemas.openxmlformats.org/officeDocument/2006/relationships" xmlns:p="http://schemas.openxmlformats.org/presentationml/2006/main">
+  <p:cSld>
+    <p:spTree>
+      <p:nvGrpSpPr>
+        <p:cNvPr id="1" name=""/>
+        <p:cNvGrpSpPr/>
+        <p:nvPr/>
+      </p:nvGrpSpPr>
+      <p:grpSpPr>
+        <a:xfrm>
+          <a:off x="0" y="0"/>
+          <a:ext cx="0" cy="0"/>
+          <a:chOff x="0" y="0"/>
+          <a:chExt cx="0" cy="0"/>
+        </a:xfrm>
+      </p:grpSpPr>
+      <p:sp>
+        <p:nvSpPr>
+          <p:cNvPr id="2" name="Title 1">
+            <a:extLst>
+              <a:ext uri="{FF2B5EF4-FFF2-40B4-BE49-F238E27FC236}">
+                <a16:creationId xmlns:a16="http://schemas.microsoft.com/office/drawing/2014/main" id="{2B9219DD-CA43-224C-942B-C2C0336AAFAC}"/>
+              </a:ext>
+            </a:extLst>
+          </p:cNvPr>
+          <p:cNvSpPr>
+            <a:spLocks noGrp="1"/>
+          </p:cNvSpPr>
+          <p:nvPr>
+            <p:ph type="title"/>
+          </p:nvPr>
+        </p:nvSpPr>
+        <p:spPr/>
+        <p:txBody>
+          <a:bodyPr/>
+          <a:lstStyle/>
+          <a:p>
+            <a:r>
+              <a:rPr lang="en-US" dirty="0" err="1"/>
+              <a:t>GuardDuty</a:t>
+            </a:r>
+            <a:endParaRPr lang="en-US" dirty="0"/>
+          </a:p>
+        </p:txBody>
+      </p:sp>
+      <p:sp>
+        <p:nvSpPr>
+          <p:cNvPr id="3" name="Content Placeholder 2">
+            <a:extLst>
+              <a:ext uri="{FF2B5EF4-FFF2-40B4-BE49-F238E27FC236}">
+                <a16:creationId xmlns:a16="http://schemas.microsoft.com/office/drawing/2014/main" id="{F41CD105-B949-CC43-A5AC-829687060C8B}"/>
+              </a:ext>
+            </a:extLst>
+          </p:cNvPr>
+          <p:cNvSpPr>
+            <a:spLocks noGrp="1"/>
+          </p:cNvSpPr>
+          <p:nvPr>
+            <p:ph idx="1"/>
+          </p:nvPr>
+        </p:nvSpPr>
+        <p:spPr/>
+        <p:txBody>
+          <a:bodyPr/>
+          <a:lstStyle/>
+          <a:p>
+            <a:r>
+              <a:rPr lang="en-US" dirty="0"/>
+              <a:t>Threat detection service which continuously analyzes logs from CloudTrail, VPC network traffic (Flow Logs), and DNS logs.</a:t>
+            </a:r>
+          </a:p>
+          <a:p>
+            <a:endParaRPr lang="en-US" dirty="0"/>
+          </a:p>
+          <a:p>
+            <a:r>
+              <a:rPr lang="en-US" dirty="0"/>
+              <a:t>Trigger alerts to notify staff about </a:t>
+            </a:r>
+            <a:r>
+              <a:rPr lang="en-US" dirty="0" err="1"/>
+              <a:t>anomolies</a:t>
+            </a:r>
+            <a:r>
+              <a:rPr lang="en-US" dirty="0"/>
+              <a:t> or automatically remediate issues. </a:t>
+            </a:r>
+          </a:p>
+        </p:txBody>
+      </p:sp>
+      <p:pic>
+        <p:nvPicPr>
+          <p:cNvPr id="4" name="Graphic 3">
+            <a:extLst>
+              <a:ext uri="{FF2B5EF4-FFF2-40B4-BE49-F238E27FC236}">
+                <a16:creationId xmlns:a16="http://schemas.microsoft.com/office/drawing/2014/main" id="{B169F529-8CB2-BF47-8C6F-46FFD56A2304}"/>
+              </a:ext>
+            </a:extLst>
+          </p:cNvPr>
+          <p:cNvPicPr>
+            <a:picLocks noChangeAspect="1"/>
+          </p:cNvPicPr>
+          <p:nvPr/>
+        </p:nvPicPr>
+        <p:blipFill>
+          <a:blip r:embed="rId2">
+            <a:extLst>
+              <a:ext uri="{96DAC541-7B7A-43D3-8B79-37D633B846F1}">
+                <asvg:svgBlip xmlns:asvg="http://schemas.microsoft.com/office/drawing/2016/SVG/main" r:embed="rId3"/>
+              </a:ext>
+            </a:extLst>
+          </a:blip>
+          <a:stretch>
+            <a:fillRect/>
+          </a:stretch>
+        </p:blipFill>
+        <p:spPr>
+          <a:xfrm>
+            <a:off x="7616370" y="274638"/>
+            <a:ext cx="1180389" cy="1180389"/>
+          </a:xfrm>
+          <a:prstGeom prst="rect">
+            <a:avLst/>
+          </a:prstGeom>
+        </p:spPr>
+      </p:pic>
+    </p:spTree>
+    <p:extLst>
+      <p:ext uri="{BB962C8B-B14F-4D97-AF65-F5344CB8AC3E}">
+        <p14:creationId xmlns:p14="http://schemas.microsoft.com/office/powerpoint/2010/main" val="922718002"/>
+      </p:ext>
+    </p:extLst>
+  </p:cSld>
+  <p:clrMapOvr>
+    <a:masterClrMapping/>
+  </p:clrMapOvr>
+</p:sld>
+</file>
+
+<file path=ppt/slides/slide48.xml><?xml version="1.0" encoding="utf-8"?>
+<p:sld xmlns:a="http://schemas.openxmlformats.org/drawingml/2006/main" xmlns:r="http://schemas.openxmlformats.org/officeDocument/2006/relationships" xmlns:p="http://schemas.openxmlformats.org/presentationml/2006/main">
+  <p:cSld>
+    <p:spTree>
+      <p:nvGrpSpPr>
+        <p:cNvPr id="1" name=""/>
+        <p:cNvGrpSpPr/>
+        <p:nvPr/>
+      </p:nvGrpSpPr>
+      <p:grpSpPr>
+        <a:xfrm>
+          <a:off x="0" y="0"/>
+          <a:ext cx="0" cy="0"/>
+          <a:chOff x="0" y="0"/>
+          <a:chExt cx="0" cy="0"/>
+        </a:xfrm>
+      </p:grpSpPr>
+      <p:sp>
+        <p:nvSpPr>
+          <p:cNvPr id="2" name="Title 1">
+            <a:extLst>
+              <a:ext uri="{FF2B5EF4-FFF2-40B4-BE49-F238E27FC236}">
+                <a16:creationId xmlns:a16="http://schemas.microsoft.com/office/drawing/2014/main" id="{94BCD4B4-C6C4-7540-AF96-329DB12BF4AC}"/>
+              </a:ext>
+            </a:extLst>
+          </p:cNvPr>
+          <p:cNvSpPr>
+            <a:spLocks noGrp="1"/>
+          </p:cNvSpPr>
+          <p:nvPr>
+            <p:ph type="title"/>
+          </p:nvPr>
+        </p:nvSpPr>
+        <p:spPr/>
+        <p:txBody>
+          <a:bodyPr/>
+          <a:lstStyle/>
+          <a:p>
+            <a:r>
+              <a:rPr lang="en-US" dirty="0"/>
+              <a:t>Certificate Manager</a:t>
+            </a:r>
+          </a:p>
+        </p:txBody>
+      </p:sp>
+      <p:sp>
+        <p:nvSpPr>
+          <p:cNvPr id="3" name="Content Placeholder 2">
+            <a:extLst>
+              <a:ext uri="{FF2B5EF4-FFF2-40B4-BE49-F238E27FC236}">
+                <a16:creationId xmlns:a16="http://schemas.microsoft.com/office/drawing/2014/main" id="{F14F09FA-5D2E-9147-89C6-1C5342486CF1}"/>
+              </a:ext>
+            </a:extLst>
+          </p:cNvPr>
+          <p:cNvSpPr>
+            <a:spLocks noGrp="1"/>
+          </p:cNvSpPr>
+          <p:nvPr>
+            <p:ph idx="1"/>
+          </p:nvPr>
+        </p:nvSpPr>
+        <p:spPr/>
+        <p:txBody>
+          <a:bodyPr>
+            <a:normAutofit lnSpcReduction="10000"/>
+          </a:bodyPr>
+          <a:lstStyle/>
+          <a:p>
+            <a:r>
+              <a:rPr lang="en-US" dirty="0"/>
+              <a:t>Service which allows you to generate and deploy SSL/TLS certificates for use with AWS services.</a:t>
+            </a:r>
+          </a:p>
+          <a:p>
+            <a:pPr lvl="1"/>
+            <a:r>
+              <a:rPr lang="en-US" dirty="0"/>
+              <a:t>ELB</a:t>
+            </a:r>
+          </a:p>
+          <a:p>
+            <a:pPr lvl="1"/>
+            <a:r>
+              <a:rPr lang="en-US" dirty="0"/>
+              <a:t>CloudFront</a:t>
+            </a:r>
+          </a:p>
+          <a:p>
+            <a:pPr lvl="1"/>
+            <a:r>
+              <a:rPr lang="en-US" dirty="0"/>
+              <a:t>API Gateway</a:t>
+            </a:r>
+          </a:p>
+          <a:p>
+            <a:pPr lvl="1"/>
+            <a:endParaRPr lang="en-US" dirty="0"/>
+          </a:p>
+          <a:p>
+            <a:r>
+              <a:rPr lang="en-US" dirty="0"/>
+              <a:t>Certificates are available for free, but only work with AWS resources.</a:t>
+            </a:r>
+          </a:p>
+        </p:txBody>
+      </p:sp>
+      <p:pic>
+        <p:nvPicPr>
+          <p:cNvPr id="4" name="Graphic 3">
+            <a:extLst>
+              <a:ext uri="{FF2B5EF4-FFF2-40B4-BE49-F238E27FC236}">
+                <a16:creationId xmlns:a16="http://schemas.microsoft.com/office/drawing/2014/main" id="{4D46A8B0-61AD-3545-B6F3-B9C525A80F86}"/>
+              </a:ext>
+            </a:extLst>
+          </p:cNvPr>
+          <p:cNvPicPr>
+            <a:picLocks noChangeAspect="1"/>
+          </p:cNvPicPr>
+          <p:nvPr/>
+        </p:nvPicPr>
+        <p:blipFill>
+          <a:blip r:embed="rId2">
+            <a:extLst>
+              <a:ext uri="{96DAC541-7B7A-43D3-8B79-37D633B846F1}">
+                <asvg:svgBlip xmlns:asvg="http://schemas.microsoft.com/office/drawing/2016/SVG/main" r:embed="rId3"/>
+              </a:ext>
+            </a:extLst>
+          </a:blip>
+          <a:stretch>
+            <a:fillRect/>
+          </a:stretch>
+        </p:blipFill>
+        <p:spPr>
+          <a:xfrm>
+            <a:off x="7662670" y="248824"/>
+            <a:ext cx="1168814" cy="1168814"/>
+          </a:xfrm>
+          <a:prstGeom prst="rect">
+            <a:avLst/>
+          </a:prstGeom>
+        </p:spPr>
+      </p:pic>
+    </p:spTree>
+    <p:extLst>
+      <p:ext uri="{BB962C8B-B14F-4D97-AF65-F5344CB8AC3E}">
+        <p14:creationId xmlns:p14="http://schemas.microsoft.com/office/powerpoint/2010/main" val="2364887966"/>
+      </p:ext>
+    </p:extLst>
+  </p:cSld>
+  <p:clrMapOvr>
+    <a:masterClrMapping/>
+  </p:clrMapOvr>
+</p:sld>
+</file>
+
+<file path=ppt/slides/slide49.xml><?xml version="1.0" encoding="utf-8"?>
+<p:sld xmlns:a="http://schemas.openxmlformats.org/drawingml/2006/main" xmlns:r="http://schemas.openxmlformats.org/officeDocument/2006/relationships" xmlns:p="http://schemas.openxmlformats.org/presentationml/2006/main">
+  <p:cSld>
+    <p:spTree>
+      <p:nvGrpSpPr>
+        <p:cNvPr id="1" name=""/>
+        <p:cNvGrpSpPr/>
+        <p:nvPr/>
+      </p:nvGrpSpPr>
+      <p:grpSpPr>
+        <a:xfrm>
+          <a:off x="0" y="0"/>
+          <a:ext cx="0" cy="0"/>
+          <a:chOff x="0" y="0"/>
+          <a:chExt cx="0" cy="0"/>
+        </a:xfrm>
+      </p:grpSpPr>
+      <p:sp>
+        <p:nvSpPr>
+          <p:cNvPr id="2" name="Title 1">
+            <a:extLst>
+              <a:ext uri="{FF2B5EF4-FFF2-40B4-BE49-F238E27FC236}">
+                <a16:creationId xmlns:a16="http://schemas.microsoft.com/office/drawing/2014/main" id="{638FDBF5-8AFF-EE42-A0B0-427FB366E223}"/>
+              </a:ext>
+            </a:extLst>
+          </p:cNvPr>
+          <p:cNvSpPr>
+            <a:spLocks noGrp="1"/>
+          </p:cNvSpPr>
+          <p:nvPr>
+            <p:ph type="title"/>
+          </p:nvPr>
+        </p:nvSpPr>
+        <p:spPr/>
+        <p:txBody>
+          <a:bodyPr/>
+          <a:lstStyle/>
+          <a:p>
+            <a:r>
+              <a:rPr lang="en-US" dirty="0"/>
+              <a:t>Key Management Service (KMS)</a:t>
+            </a:r>
+          </a:p>
+        </p:txBody>
+      </p:sp>
+      <p:sp>
+        <p:nvSpPr>
+          <p:cNvPr id="3" name="Content Placeholder 2">
+            <a:extLst>
+              <a:ext uri="{FF2B5EF4-FFF2-40B4-BE49-F238E27FC236}">
+                <a16:creationId xmlns:a16="http://schemas.microsoft.com/office/drawing/2014/main" id="{DF820030-27F8-4D4A-AF0B-27BAD4AF2697}"/>
+              </a:ext>
+            </a:extLst>
+          </p:cNvPr>
+          <p:cNvSpPr>
+            <a:spLocks noGrp="1"/>
+          </p:cNvSpPr>
+          <p:nvPr>
+            <p:ph idx="1"/>
+          </p:nvPr>
+        </p:nvSpPr>
+        <p:spPr/>
+        <p:txBody>
+          <a:bodyPr/>
+          <a:lstStyle/>
+          <a:p>
+            <a:r>
+              <a:rPr lang="en-US" dirty="0"/>
+              <a:t>A service which allows you to create</a:t>
+            </a:r>
+            <a:br>
+              <a:rPr lang="en-US" dirty="0"/>
+            </a:br>
+            <a:r>
+              <a:rPr lang="en-US" dirty="0"/>
+              <a:t>encryption keys for use across a variety</a:t>
+            </a:r>
+            <a:br>
+              <a:rPr lang="en-US" dirty="0"/>
+            </a:br>
+            <a:r>
+              <a:rPr lang="en-US" dirty="0"/>
+              <a:t>of AWS services.</a:t>
+            </a:r>
+          </a:p>
+          <a:p>
+            <a:pPr lvl="1"/>
+            <a:r>
+              <a:rPr lang="en-US" dirty="0"/>
+              <a:t>Keys for encrypting S3 buckets</a:t>
+            </a:r>
+          </a:p>
+          <a:p>
+            <a:pPr lvl="1"/>
+            <a:r>
+              <a:rPr lang="en-US" dirty="0"/>
+              <a:t>Keys for encrypting AMIs</a:t>
+            </a:r>
+          </a:p>
+          <a:p>
+            <a:pPr lvl="1"/>
+            <a:endParaRPr lang="en-US" dirty="0"/>
+          </a:p>
+          <a:p>
+            <a:r>
+              <a:rPr lang="en-US" dirty="0"/>
+              <a:t>Control access to encryption keys using policies and audit access to keys.</a:t>
+            </a:r>
+          </a:p>
+        </p:txBody>
+      </p:sp>
+      <p:pic>
+        <p:nvPicPr>
+          <p:cNvPr id="4" name="Graphic 3">
+            <a:extLst>
+              <a:ext uri="{FF2B5EF4-FFF2-40B4-BE49-F238E27FC236}">
+                <a16:creationId xmlns:a16="http://schemas.microsoft.com/office/drawing/2014/main" id="{3688FAA0-512E-ED4B-B900-01806144D30D}"/>
+              </a:ext>
+            </a:extLst>
+          </p:cNvPr>
+          <p:cNvPicPr>
+            <a:picLocks noChangeAspect="1"/>
+          </p:cNvPicPr>
+          <p:nvPr/>
+        </p:nvPicPr>
+        <p:blipFill>
+          <a:blip r:embed="rId2">
+            <a:extLst>
+              <a:ext uri="{96DAC541-7B7A-43D3-8B79-37D633B846F1}">
+                <asvg:svgBlip xmlns:asvg="http://schemas.microsoft.com/office/drawing/2016/SVG/main" r:embed="rId3"/>
+              </a:ext>
+            </a:extLst>
+          </a:blip>
+          <a:stretch>
+            <a:fillRect/>
+          </a:stretch>
+        </p:blipFill>
+        <p:spPr>
+          <a:xfrm>
+            <a:off x="7506133" y="1417638"/>
+            <a:ext cx="1143000" cy="1143000"/>
+          </a:xfrm>
+          <a:prstGeom prst="rect">
+            <a:avLst/>
+          </a:prstGeom>
+        </p:spPr>
+      </p:pic>
+    </p:spTree>
+    <p:extLst>
+      <p:ext uri="{BB962C8B-B14F-4D97-AF65-F5344CB8AC3E}">
+        <p14:creationId xmlns:p14="http://schemas.microsoft.com/office/powerpoint/2010/main" val="1149755908"/>
+      </p:ext>
+    </p:extLst>
+  </p:cSld>
+  <p:clrMapOvr>
+    <a:masterClrMapping/>
+  </p:clrMapOvr>
+</p:sld>
+</file>
+
 <file path=ppt/slides/slide5.xml><?xml version="1.0" encoding="utf-8"?>
 <p:sld xmlns:a="http://schemas.openxmlformats.org/drawingml/2006/main" xmlns:r="http://schemas.openxmlformats.org/officeDocument/2006/relationships" xmlns:p="http://schemas.openxmlformats.org/presentationml/2006/main">
   <p:cSld>
@@ -8509,6 +9512,365 @@
     <p:extLst>
       <p:ext uri="{BB962C8B-B14F-4D97-AF65-F5344CB8AC3E}">
         <p14:creationId xmlns:p14="http://schemas.microsoft.com/office/powerpoint/2010/main" val="2090627441"/>
+      </p:ext>
+    </p:extLst>
+  </p:cSld>
+  <p:clrMapOvr>
+    <a:masterClrMapping/>
+  </p:clrMapOvr>
+</p:sld>
+</file>
+
+<file path=ppt/slides/slide50.xml><?xml version="1.0" encoding="utf-8"?>
+<p:sld xmlns:a="http://schemas.openxmlformats.org/drawingml/2006/main" xmlns:r="http://schemas.openxmlformats.org/officeDocument/2006/relationships" xmlns:p="http://schemas.openxmlformats.org/presentationml/2006/main">
+  <p:cSld>
+    <p:spTree>
+      <p:nvGrpSpPr>
+        <p:cNvPr id="1" name=""/>
+        <p:cNvGrpSpPr/>
+        <p:nvPr/>
+      </p:nvGrpSpPr>
+      <p:grpSpPr>
+        <a:xfrm>
+          <a:off x="0" y="0"/>
+          <a:ext cx="0" cy="0"/>
+          <a:chOff x="0" y="0"/>
+          <a:chExt cx="0" cy="0"/>
+        </a:xfrm>
+      </p:grpSpPr>
+      <p:sp>
+        <p:nvSpPr>
+          <p:cNvPr id="2" name="Title 1">
+            <a:extLst>
+              <a:ext uri="{FF2B5EF4-FFF2-40B4-BE49-F238E27FC236}">
+                <a16:creationId xmlns:a16="http://schemas.microsoft.com/office/drawing/2014/main" id="{2367A90C-4B4C-884E-8AA4-2F553BD6D874}"/>
+              </a:ext>
+            </a:extLst>
+          </p:cNvPr>
+          <p:cNvSpPr>
+            <a:spLocks noGrp="1"/>
+          </p:cNvSpPr>
+          <p:nvPr>
+            <p:ph type="title"/>
+          </p:nvPr>
+        </p:nvSpPr>
+        <p:spPr/>
+        <p:txBody>
+          <a:bodyPr/>
+          <a:lstStyle/>
+          <a:p>
+            <a:r>
+              <a:rPr lang="en-US" dirty="0"/>
+              <a:t>Security Hub</a:t>
+            </a:r>
+          </a:p>
+        </p:txBody>
+      </p:sp>
+      <p:sp>
+        <p:nvSpPr>
+          <p:cNvPr id="3" name="Content Placeholder 2">
+            <a:extLst>
+              <a:ext uri="{FF2B5EF4-FFF2-40B4-BE49-F238E27FC236}">
+                <a16:creationId xmlns:a16="http://schemas.microsoft.com/office/drawing/2014/main" id="{72D946C9-9040-8A4C-A50F-ADC13795869E}"/>
+              </a:ext>
+            </a:extLst>
+          </p:cNvPr>
+          <p:cNvSpPr>
+            <a:spLocks noGrp="1"/>
+          </p:cNvSpPr>
+          <p:nvPr>
+            <p:ph idx="1"/>
+          </p:nvPr>
+        </p:nvSpPr>
+        <p:spPr/>
+        <p:txBody>
+          <a:bodyPr>
+            <a:normAutofit fontScale="92500" lnSpcReduction="10000"/>
+          </a:bodyPr>
+          <a:lstStyle/>
+          <a:p>
+            <a:r>
+              <a:rPr lang="en-US" dirty="0"/>
+              <a:t>Provides a comprehensive view of high-priority alerts and compliance issues across accounts.</a:t>
+            </a:r>
+          </a:p>
+          <a:p>
+            <a:pPr lvl="1"/>
+            <a:r>
+              <a:rPr lang="en-US" dirty="0"/>
+              <a:t>Security Information and Event Management (SIEM)</a:t>
+            </a:r>
+          </a:p>
+          <a:p>
+            <a:pPr lvl="1"/>
+            <a:endParaRPr lang="en-US" dirty="0"/>
+          </a:p>
+          <a:p>
+            <a:r>
+              <a:rPr lang="en-US" dirty="0"/>
+              <a:t>Single site which integrates alerts from various AWS services</a:t>
+            </a:r>
+          </a:p>
+          <a:p>
+            <a:pPr lvl="1"/>
+            <a:r>
+              <a:rPr lang="en-US" dirty="0" err="1"/>
+              <a:t>GuardDuty</a:t>
+            </a:r>
+            <a:endParaRPr lang="en-US" dirty="0"/>
+          </a:p>
+          <a:p>
+            <a:pPr lvl="1"/>
+            <a:r>
+              <a:rPr lang="en-US" dirty="0"/>
+              <a:t>Inspector</a:t>
+            </a:r>
+          </a:p>
+          <a:p>
+            <a:pPr lvl="1"/>
+            <a:r>
+              <a:rPr lang="en-US" dirty="0"/>
+              <a:t>Macie</a:t>
+            </a:r>
+          </a:p>
+          <a:p>
+            <a:pPr lvl="1"/>
+            <a:r>
+              <a:rPr lang="en-US" dirty="0"/>
+              <a:t>Third-party AWS partners</a:t>
+            </a:r>
+          </a:p>
+        </p:txBody>
+      </p:sp>
+      <p:pic>
+        <p:nvPicPr>
+          <p:cNvPr id="4" name="Graphic 3">
+            <a:extLst>
+              <a:ext uri="{FF2B5EF4-FFF2-40B4-BE49-F238E27FC236}">
+                <a16:creationId xmlns:a16="http://schemas.microsoft.com/office/drawing/2014/main" id="{9032A71E-A085-DD45-B910-293A146E5FD4}"/>
+              </a:ext>
+            </a:extLst>
+          </p:cNvPr>
+          <p:cNvPicPr>
+            <a:picLocks noChangeAspect="1"/>
+          </p:cNvPicPr>
+          <p:nvPr/>
+        </p:nvPicPr>
+        <p:blipFill>
+          <a:blip r:embed="rId2">
+            <a:extLst>
+              <a:ext uri="{96DAC541-7B7A-43D3-8B79-37D633B846F1}">
+                <asvg:svgBlip xmlns:asvg="http://schemas.microsoft.com/office/drawing/2016/SVG/main" r:embed="rId3"/>
+              </a:ext>
+            </a:extLst>
+          </a:blip>
+          <a:stretch>
+            <a:fillRect/>
+          </a:stretch>
+        </p:blipFill>
+        <p:spPr>
+          <a:xfrm>
+            <a:off x="7696552" y="274639"/>
+            <a:ext cx="1143000" cy="1143000"/>
+          </a:xfrm>
+          <a:prstGeom prst="rect">
+            <a:avLst/>
+          </a:prstGeom>
+        </p:spPr>
+      </p:pic>
+    </p:spTree>
+    <p:extLst>
+      <p:ext uri="{BB962C8B-B14F-4D97-AF65-F5344CB8AC3E}">
+        <p14:creationId xmlns:p14="http://schemas.microsoft.com/office/powerpoint/2010/main" val="2840350133"/>
+      </p:ext>
+    </p:extLst>
+  </p:cSld>
+  <p:clrMapOvr>
+    <a:masterClrMapping/>
+  </p:clrMapOvr>
+</p:sld>
+</file>
+
+<file path=ppt/slides/slide51.xml><?xml version="1.0" encoding="utf-8"?>
+<p:sld xmlns:a="http://schemas.openxmlformats.org/drawingml/2006/main" xmlns:r="http://schemas.openxmlformats.org/officeDocument/2006/relationships" xmlns:p="http://schemas.openxmlformats.org/presentationml/2006/main">
+  <p:cSld>
+    <p:spTree>
+      <p:nvGrpSpPr>
+        <p:cNvPr id="1" name=""/>
+        <p:cNvGrpSpPr/>
+        <p:nvPr/>
+      </p:nvGrpSpPr>
+      <p:grpSpPr>
+        <a:xfrm>
+          <a:off x="0" y="0"/>
+          <a:ext cx="0" cy="0"/>
+          <a:chOff x="0" y="0"/>
+          <a:chExt cx="0" cy="0"/>
+        </a:xfrm>
+      </p:grpSpPr>
+      <p:sp>
+        <p:nvSpPr>
+          <p:cNvPr id="2" name="Title 1">
+            <a:extLst>
+              <a:ext uri="{FF2B5EF4-FFF2-40B4-BE49-F238E27FC236}">
+                <a16:creationId xmlns:a16="http://schemas.microsoft.com/office/drawing/2014/main" id="{E7EF2A4F-C408-5C4D-BF05-FC7FAFB3712F}"/>
+              </a:ext>
+            </a:extLst>
+          </p:cNvPr>
+          <p:cNvSpPr>
+            <a:spLocks noGrp="1"/>
+          </p:cNvSpPr>
+          <p:nvPr>
+            <p:ph type="title"/>
+          </p:nvPr>
+        </p:nvSpPr>
+        <p:spPr/>
+        <p:txBody>
+          <a:bodyPr/>
+          <a:lstStyle/>
+          <a:p>
+            <a:r>
+              <a:rPr lang="en-US" dirty="0"/>
+              <a:t>Top 5 Cloud Security Issues</a:t>
+            </a:r>
+          </a:p>
+        </p:txBody>
+      </p:sp>
+      <p:sp>
+        <p:nvSpPr>
+          <p:cNvPr id="3" name="Content Placeholder 2">
+            <a:extLst>
+              <a:ext uri="{FF2B5EF4-FFF2-40B4-BE49-F238E27FC236}">
+                <a16:creationId xmlns:a16="http://schemas.microsoft.com/office/drawing/2014/main" id="{53FE1F9A-309E-9844-AB85-21A1AA1B4AA2}"/>
+              </a:ext>
+            </a:extLst>
+          </p:cNvPr>
+          <p:cNvSpPr>
+            <a:spLocks noGrp="1"/>
+          </p:cNvSpPr>
+          <p:nvPr>
+            <p:ph idx="1"/>
+          </p:nvPr>
+        </p:nvSpPr>
+        <p:spPr>
+          <a:xfrm>
+            <a:off x="457200" y="1600200"/>
+            <a:ext cx="8229600" cy="4983162"/>
+          </a:xfrm>
+        </p:spPr>
+        <p:txBody>
+          <a:bodyPr>
+            <a:normAutofit fontScale="62500" lnSpcReduction="20000"/>
+          </a:bodyPr>
+          <a:lstStyle/>
+          <a:p>
+            <a:r>
+              <a:rPr lang="en-US" dirty="0"/>
+              <a:t>Stolen access credentials</a:t>
+            </a:r>
+          </a:p>
+          <a:p>
+            <a:pPr lvl="1"/>
+            <a:r>
+              <a:rPr lang="en-US" dirty="0"/>
+              <a:t>Use multi-factor authentication to mitigate</a:t>
+            </a:r>
+          </a:p>
+          <a:p>
+            <a:endParaRPr lang="en-US" dirty="0"/>
+          </a:p>
+          <a:p>
+            <a:r>
+              <a:rPr lang="en-US" dirty="0"/>
+              <a:t>Compromised access keys</a:t>
+            </a:r>
+          </a:p>
+          <a:p>
+            <a:pPr lvl="1"/>
+            <a:r>
+              <a:rPr lang="en-US" dirty="0"/>
+              <a:t>Never publish keys on Internet in source code</a:t>
+            </a:r>
+          </a:p>
+          <a:p>
+            <a:pPr lvl="1"/>
+            <a:r>
+              <a:rPr lang="en-US" dirty="0"/>
+              <a:t>Rotate keys daily</a:t>
+            </a:r>
+          </a:p>
+          <a:p>
+            <a:endParaRPr lang="en-US" dirty="0"/>
+          </a:p>
+          <a:p>
+            <a:r>
+              <a:rPr lang="en-US" dirty="0"/>
+              <a:t>S3 bucket is publicly available</a:t>
+            </a:r>
+          </a:p>
+          <a:p>
+            <a:pPr lvl="1"/>
+            <a:r>
+              <a:rPr lang="en-US" dirty="0"/>
+              <a:t>Use AWS Config to monitor account for public buckets</a:t>
+            </a:r>
+          </a:p>
+          <a:p>
+            <a:pPr lvl="1"/>
+            <a:r>
+              <a:rPr lang="en-US" dirty="0"/>
+              <a:t>Third-party tools like Threat Stack</a:t>
+            </a:r>
+          </a:p>
+          <a:p>
+            <a:endParaRPr lang="en-US" dirty="0"/>
+          </a:p>
+          <a:p>
+            <a:r>
+              <a:rPr lang="en-US" dirty="0"/>
+              <a:t>Permissive security group rules</a:t>
+            </a:r>
+          </a:p>
+          <a:p>
+            <a:pPr lvl="1"/>
+            <a:r>
+              <a:rPr lang="en-US" dirty="0"/>
+              <a:t>Review and test all rules to make sure only required ports are accessible</a:t>
+            </a:r>
+          </a:p>
+          <a:p>
+            <a:pPr lvl="1"/>
+            <a:r>
+              <a:rPr lang="en-US" dirty="0"/>
+              <a:t>Set both ingress and egress rules</a:t>
+            </a:r>
+          </a:p>
+          <a:p>
+            <a:endParaRPr lang="en-US" dirty="0"/>
+          </a:p>
+          <a:p>
+            <a:r>
+              <a:rPr lang="en-US" dirty="0"/>
+              <a:t>Improperly scoped role/policy associated with resource</a:t>
+            </a:r>
+          </a:p>
+          <a:p>
+            <a:pPr lvl="1"/>
+            <a:r>
+              <a:rPr lang="en-US" dirty="0"/>
+              <a:t>Only give resources the minimal amount of access needed to complete work</a:t>
+            </a:r>
+          </a:p>
+          <a:p>
+            <a:pPr lvl="1"/>
+            <a:endParaRPr lang="en-US" dirty="0"/>
+          </a:p>
+        </p:txBody>
+      </p:sp>
+    </p:spTree>
+    <p:extLst>
+      <p:ext uri="{BB962C8B-B14F-4D97-AF65-F5344CB8AC3E}">
+        <p14:creationId xmlns:p14="http://schemas.microsoft.com/office/powerpoint/2010/main" val="3530417935"/>
       </p:ext>
     </p:extLst>
   </p:cSld>

</xml_diff>

<commit_message>
small changes to descriptions
</commit_message>
<xml_diff>
--- a/lectures/infrastructure-week-4.pptx
+++ b/lectures/infrastructure-week-4.pptx
@@ -352,7 +352,7 @@
           <a:p>
             <a:fld id="{5C992B2E-871F-DF41-938B-F17F540EA4B5}" type="datetimeFigureOut">
               <a:rPr lang="en-US" smtClean="0"/>
-              <a:t>8/6/19</a:t>
+              <a:t>8/9/19</a:t>
             </a:fld>
             <a:endParaRPr lang="en-US"/>
           </a:p>
@@ -520,7 +520,7 @@
           <a:p>
             <a:fld id="{5C992B2E-871F-DF41-938B-F17F540EA4B5}" type="datetimeFigureOut">
               <a:rPr lang="en-US" smtClean="0"/>
-              <a:t>8/6/19</a:t>
+              <a:t>8/9/19</a:t>
             </a:fld>
             <a:endParaRPr lang="en-US"/>
           </a:p>
@@ -698,7 +698,7 @@
           <a:p>
             <a:fld id="{5C992B2E-871F-DF41-938B-F17F540EA4B5}" type="datetimeFigureOut">
               <a:rPr lang="en-US" smtClean="0"/>
-              <a:t>8/6/19</a:t>
+              <a:t>8/9/19</a:t>
             </a:fld>
             <a:endParaRPr lang="en-US"/>
           </a:p>
@@ -866,7 +866,7 @@
           <a:p>
             <a:fld id="{5C992B2E-871F-DF41-938B-F17F540EA4B5}" type="datetimeFigureOut">
               <a:rPr lang="en-US" smtClean="0"/>
-              <a:t>8/6/19</a:t>
+              <a:t>8/9/19</a:t>
             </a:fld>
             <a:endParaRPr lang="en-US"/>
           </a:p>
@@ -1111,7 +1111,7 @@
           <a:p>
             <a:fld id="{5C992B2E-871F-DF41-938B-F17F540EA4B5}" type="datetimeFigureOut">
               <a:rPr lang="en-US" smtClean="0"/>
-              <a:t>8/6/19</a:t>
+              <a:t>8/9/19</a:t>
             </a:fld>
             <a:endParaRPr lang="en-US"/>
           </a:p>
@@ -1396,7 +1396,7 @@
           <a:p>
             <a:fld id="{5C992B2E-871F-DF41-938B-F17F540EA4B5}" type="datetimeFigureOut">
               <a:rPr lang="en-US" smtClean="0"/>
-              <a:t>8/6/19</a:t>
+              <a:t>8/9/19</a:t>
             </a:fld>
             <a:endParaRPr lang="en-US"/>
           </a:p>
@@ -1815,7 +1815,7 @@
           <a:p>
             <a:fld id="{5C992B2E-871F-DF41-938B-F17F540EA4B5}" type="datetimeFigureOut">
               <a:rPr lang="en-US" smtClean="0"/>
-              <a:t>8/6/19</a:t>
+              <a:t>8/9/19</a:t>
             </a:fld>
             <a:endParaRPr lang="en-US"/>
           </a:p>
@@ -1932,7 +1932,7 @@
           <a:p>
             <a:fld id="{5C992B2E-871F-DF41-938B-F17F540EA4B5}" type="datetimeFigureOut">
               <a:rPr lang="en-US" smtClean="0"/>
-              <a:t>8/6/19</a:t>
+              <a:t>8/9/19</a:t>
             </a:fld>
             <a:endParaRPr lang="en-US"/>
           </a:p>
@@ -2027,7 +2027,7 @@
           <a:p>
             <a:fld id="{5C992B2E-871F-DF41-938B-F17F540EA4B5}" type="datetimeFigureOut">
               <a:rPr lang="en-US" smtClean="0"/>
-              <a:t>8/6/19</a:t>
+              <a:t>8/9/19</a:t>
             </a:fld>
             <a:endParaRPr lang="en-US"/>
           </a:p>
@@ -2302,7 +2302,7 @@
           <a:p>
             <a:fld id="{5C992B2E-871F-DF41-938B-F17F540EA4B5}" type="datetimeFigureOut">
               <a:rPr lang="en-US" smtClean="0"/>
-              <a:t>8/6/19</a:t>
+              <a:t>8/9/19</a:t>
             </a:fld>
             <a:endParaRPr lang="en-US"/>
           </a:p>
@@ -2554,7 +2554,7 @@
           <a:p>
             <a:fld id="{5C992B2E-871F-DF41-938B-F17F540EA4B5}" type="datetimeFigureOut">
               <a:rPr lang="en-US" smtClean="0"/>
-              <a:t>8/6/19</a:t>
+              <a:t>8/9/19</a:t>
             </a:fld>
             <a:endParaRPr lang="en-US"/>
           </a:p>
@@ -2765,7 +2765,7 @@
           <a:p>
             <a:fld id="{5C992B2E-871F-DF41-938B-F17F540EA4B5}" type="datetimeFigureOut">
               <a:rPr lang="en-US" smtClean="0"/>
-              <a:t>8/6/19</a:t>
+              <a:t>8/9/19</a:t>
             </a:fld>
             <a:endParaRPr lang="en-US"/>
           </a:p>
@@ -3186,19 +3186,27 @@
               <a:t>SEIS 665</a:t>
             </a:r>
             <a:br>
+              <a:rPr lang="en-US" sz="3600" dirty="0">
+                <a:solidFill>
+                  <a:prstClr val="black"/>
+                </a:solidFill>
+              </a:rPr>
+            </a:br>
+            <a:r>
+              <a:rPr lang="en-US" sz="3600" dirty="0">
+                <a:solidFill>
+                  <a:prstClr val="black"/>
+                </a:solidFill>
+              </a:rPr>
+              <a:t>AWS VPC</a:t>
+            </a:r>
+            <a:r>
               <a:rPr lang="en-US" sz="3600">
                 <a:solidFill>
                   <a:prstClr val="black"/>
                 </a:solidFill>
               </a:rPr>
-            </a:br>
-            <a:r>
-              <a:rPr lang="en-US" sz="3600">
-                <a:solidFill>
-                  <a:prstClr val="black"/>
-                </a:solidFill>
-              </a:rPr>
-              <a:t>AWS </a:t>
+              <a:t>, Databases </a:t>
             </a:r>
             <a:r>
               <a:rPr lang="en-US" sz="3600" dirty="0">
@@ -3206,7 +3214,7 @@
                   <a:prstClr val="black"/>
                 </a:solidFill>
               </a:rPr>
-              <a:t>VPC</a:t>
+              <a:t>&amp; Security</a:t>
             </a:r>
             <a:endParaRPr lang="en-US" sz="6000" dirty="0"/>
           </a:p>
@@ -9726,12 +9734,21 @@
         </p:nvSpPr>
         <p:spPr/>
         <p:txBody>
-          <a:bodyPr/>
+          <a:bodyPr>
+            <a:normAutofit/>
+          </a:bodyPr>
           <a:lstStyle/>
           <a:p>
             <a:r>
               <a:rPr lang="en-US" dirty="0"/>
               <a:t>Top 5 Cloud Security Issues</a:t>
+            </a:r>
+            <a:br>
+              <a:rPr lang="en-US" dirty="0"/>
+            </a:br>
+            <a:r>
+              <a:rPr lang="en-US" sz="1400" dirty="0"/>
+              <a:t>(or how to get your CEO fired)</a:t>
             </a:r>
           </a:p>
         </p:txBody>

</xml_diff>

<commit_message>
update lec 3 review
</commit_message>
<xml_diff>
--- a/lectures/infrastructure-week-4.pptx
+++ b/lectures/infrastructure-week-4.pptx
@@ -52,10 +52,11 @@
     <p:sldId id="307" r:id="rId46"/>
     <p:sldId id="309" r:id="rId47"/>
     <p:sldId id="310" r:id="rId48"/>
-    <p:sldId id="311" r:id="rId49"/>
-    <p:sldId id="312" r:id="rId50"/>
-    <p:sldId id="308" r:id="rId51"/>
-    <p:sldId id="313" r:id="rId52"/>
+    <p:sldId id="316" r:id="rId49"/>
+    <p:sldId id="311" r:id="rId50"/>
+    <p:sldId id="312" r:id="rId51"/>
+    <p:sldId id="308" r:id="rId52"/>
+    <p:sldId id="313" r:id="rId53"/>
   </p:sldIdLst>
   <p:sldSz cx="9144000" cy="6858000" type="screen4x3"/>
   <p:notesSz cx="6858000" cy="9144000"/>
@@ -352,7 +353,7 @@
           <a:p>
             <a:fld id="{5C992B2E-871F-DF41-938B-F17F540EA4B5}" type="datetimeFigureOut">
               <a:rPr lang="en-US" smtClean="0"/>
-              <a:t>8/9/19</a:t>
+              <a:t>9/22/19</a:t>
             </a:fld>
             <a:endParaRPr lang="en-US"/>
           </a:p>
@@ -520,7 +521,7 @@
           <a:p>
             <a:fld id="{5C992B2E-871F-DF41-938B-F17F540EA4B5}" type="datetimeFigureOut">
               <a:rPr lang="en-US" smtClean="0"/>
-              <a:t>8/9/19</a:t>
+              <a:t>9/22/19</a:t>
             </a:fld>
             <a:endParaRPr lang="en-US"/>
           </a:p>
@@ -698,7 +699,7 @@
           <a:p>
             <a:fld id="{5C992B2E-871F-DF41-938B-F17F540EA4B5}" type="datetimeFigureOut">
               <a:rPr lang="en-US" smtClean="0"/>
-              <a:t>8/9/19</a:t>
+              <a:t>9/22/19</a:t>
             </a:fld>
             <a:endParaRPr lang="en-US"/>
           </a:p>
@@ -866,7 +867,7 @@
           <a:p>
             <a:fld id="{5C992B2E-871F-DF41-938B-F17F540EA4B5}" type="datetimeFigureOut">
               <a:rPr lang="en-US" smtClean="0"/>
-              <a:t>8/9/19</a:t>
+              <a:t>9/22/19</a:t>
             </a:fld>
             <a:endParaRPr lang="en-US"/>
           </a:p>
@@ -1111,7 +1112,7 @@
           <a:p>
             <a:fld id="{5C992B2E-871F-DF41-938B-F17F540EA4B5}" type="datetimeFigureOut">
               <a:rPr lang="en-US" smtClean="0"/>
-              <a:t>8/9/19</a:t>
+              <a:t>9/22/19</a:t>
             </a:fld>
             <a:endParaRPr lang="en-US"/>
           </a:p>
@@ -1396,7 +1397,7 @@
           <a:p>
             <a:fld id="{5C992B2E-871F-DF41-938B-F17F540EA4B5}" type="datetimeFigureOut">
               <a:rPr lang="en-US" smtClean="0"/>
-              <a:t>8/9/19</a:t>
+              <a:t>9/22/19</a:t>
             </a:fld>
             <a:endParaRPr lang="en-US"/>
           </a:p>
@@ -1815,7 +1816,7 @@
           <a:p>
             <a:fld id="{5C992B2E-871F-DF41-938B-F17F540EA4B5}" type="datetimeFigureOut">
               <a:rPr lang="en-US" smtClean="0"/>
-              <a:t>8/9/19</a:t>
+              <a:t>9/22/19</a:t>
             </a:fld>
             <a:endParaRPr lang="en-US"/>
           </a:p>
@@ -1932,7 +1933,7 @@
           <a:p>
             <a:fld id="{5C992B2E-871F-DF41-938B-F17F540EA4B5}" type="datetimeFigureOut">
               <a:rPr lang="en-US" smtClean="0"/>
-              <a:t>8/9/19</a:t>
+              <a:t>9/22/19</a:t>
             </a:fld>
             <a:endParaRPr lang="en-US"/>
           </a:p>
@@ -2027,7 +2028,7 @@
           <a:p>
             <a:fld id="{5C992B2E-871F-DF41-938B-F17F540EA4B5}" type="datetimeFigureOut">
               <a:rPr lang="en-US" smtClean="0"/>
-              <a:t>8/9/19</a:t>
+              <a:t>9/22/19</a:t>
             </a:fld>
             <a:endParaRPr lang="en-US"/>
           </a:p>
@@ -2302,7 +2303,7 @@
           <a:p>
             <a:fld id="{5C992B2E-871F-DF41-938B-F17F540EA4B5}" type="datetimeFigureOut">
               <a:rPr lang="en-US" smtClean="0"/>
-              <a:t>8/9/19</a:t>
+              <a:t>9/22/19</a:t>
             </a:fld>
             <a:endParaRPr lang="en-US"/>
           </a:p>
@@ -2554,7 +2555,7 @@
           <a:p>
             <a:fld id="{5C992B2E-871F-DF41-938B-F17F540EA4B5}" type="datetimeFigureOut">
               <a:rPr lang="en-US" smtClean="0"/>
-              <a:t>8/9/19</a:t>
+              <a:t>9/22/19</a:t>
             </a:fld>
             <a:endParaRPr lang="en-US"/>
           </a:p>
@@ -2765,7 +2766,7 @@
           <a:p>
             <a:fld id="{5C992B2E-871F-DF41-938B-F17F540EA4B5}" type="datetimeFigureOut">
               <a:rPr lang="en-US" smtClean="0"/>
-              <a:t>8/9/19</a:t>
+              <a:t>9/22/19</a:t>
             </a:fld>
             <a:endParaRPr lang="en-US"/>
           </a:p>
@@ -8992,15 +8993,7 @@
           <a:p>
             <a:r>
               <a:rPr lang="en-US" dirty="0"/>
-              <a:t>Trigger alerts to notify staff about </a:t>
-            </a:r>
-            <a:r>
-              <a:rPr lang="en-US" dirty="0" err="1"/>
-              <a:t>anomolies</a:t>
-            </a:r>
-            <a:r>
-              <a:rPr lang="en-US" dirty="0"/>
-              <a:t> or automatically remediate issues. </a:t>
+              <a:t>Trigger alerts to notify staff about anomalies or automatically remediate issues. </a:t>
             </a:r>
           </a:p>
         </p:txBody>
@@ -9076,6 +9069,211 @@
           <p:cNvPr id="2" name="Title 1">
             <a:extLst>
               <a:ext uri="{FF2B5EF4-FFF2-40B4-BE49-F238E27FC236}">
+                <a16:creationId xmlns:a16="http://schemas.microsoft.com/office/drawing/2014/main" id="{C8D617AD-0A77-E543-9371-D636C089CAFC}"/>
+              </a:ext>
+            </a:extLst>
+          </p:cNvPr>
+          <p:cNvSpPr>
+            <a:spLocks noGrp="1"/>
+          </p:cNvSpPr>
+          <p:nvPr>
+            <p:ph type="title"/>
+          </p:nvPr>
+        </p:nvSpPr>
+        <p:spPr/>
+        <p:txBody>
+          <a:bodyPr/>
+          <a:lstStyle/>
+          <a:p>
+            <a:r>
+              <a:rPr lang="en-US" dirty="0"/>
+              <a:t>Inspector</a:t>
+            </a:r>
+          </a:p>
+        </p:txBody>
+      </p:sp>
+      <p:sp>
+        <p:nvSpPr>
+          <p:cNvPr id="3" name="Content Placeholder 2">
+            <a:extLst>
+              <a:ext uri="{FF2B5EF4-FFF2-40B4-BE49-F238E27FC236}">
+                <a16:creationId xmlns:a16="http://schemas.microsoft.com/office/drawing/2014/main" id="{0F738F66-E1C0-A741-A118-A643551F6977}"/>
+              </a:ext>
+            </a:extLst>
+          </p:cNvPr>
+          <p:cNvSpPr>
+            <a:spLocks noGrp="1"/>
+          </p:cNvSpPr>
+          <p:nvPr>
+            <p:ph idx="1"/>
+          </p:nvPr>
+        </p:nvSpPr>
+        <p:spPr/>
+        <p:txBody>
+          <a:bodyPr>
+            <a:normAutofit fontScale="85000" lnSpcReduction="20000"/>
+          </a:bodyPr>
+          <a:lstStyle/>
+          <a:p>
+            <a:r>
+              <a:rPr lang="en-US" dirty="0"/>
+              <a:t>Security scanning service which assesses application vulnerabilities</a:t>
+            </a:r>
+          </a:p>
+          <a:p>
+            <a:pPr lvl="1"/>
+            <a:r>
+              <a:rPr lang="en-US" dirty="0"/>
+              <a:t>Network: verify open ports</a:t>
+            </a:r>
+          </a:p>
+          <a:p>
+            <a:pPr lvl="1"/>
+            <a:endParaRPr lang="en-US" dirty="0"/>
+          </a:p>
+          <a:p>
+            <a:pPr lvl="1"/>
+            <a:r>
+              <a:rPr lang="en-US" dirty="0"/>
+              <a:t>Host system packages</a:t>
+            </a:r>
+          </a:p>
+          <a:p>
+            <a:pPr lvl="2"/>
+            <a:r>
+              <a:rPr lang="en-US" dirty="0"/>
+              <a:t>CVE: Common Vulnerabilities and Exposures</a:t>
+            </a:r>
+          </a:p>
+          <a:p>
+            <a:pPr lvl="2"/>
+            <a:endParaRPr lang="en-US" dirty="0"/>
+          </a:p>
+          <a:p>
+            <a:pPr lvl="1"/>
+            <a:r>
+              <a:rPr lang="en-US" dirty="0"/>
+              <a:t>OS configuration</a:t>
+            </a:r>
+          </a:p>
+          <a:p>
+            <a:pPr lvl="2"/>
+            <a:r>
+              <a:rPr lang="en-US" dirty="0"/>
+              <a:t>CIS: Center for Internet Security Benchmarks</a:t>
+            </a:r>
+          </a:p>
+          <a:p>
+            <a:pPr lvl="2"/>
+            <a:endParaRPr lang="en-US" dirty="0"/>
+          </a:p>
+          <a:p>
+            <a:pPr lvl="1"/>
+            <a:r>
+              <a:rPr lang="en-US" dirty="0"/>
+              <a:t>General security best practices</a:t>
+            </a:r>
+          </a:p>
+          <a:p>
+            <a:pPr lvl="2"/>
+            <a:r>
+              <a:rPr lang="en-US" dirty="0"/>
+              <a:t>Disable root over </a:t>
+            </a:r>
+            <a:r>
+              <a:rPr lang="en-US" dirty="0" err="1"/>
+              <a:t>ssh</a:t>
+            </a:r>
+            <a:endParaRPr lang="en-US" dirty="0"/>
+          </a:p>
+          <a:p>
+            <a:pPr lvl="2"/>
+            <a:r>
+              <a:rPr lang="en-US" dirty="0"/>
+              <a:t>Configure password complexity</a:t>
+            </a:r>
+          </a:p>
+          <a:p>
+            <a:pPr lvl="2"/>
+            <a:endParaRPr lang="en-US" dirty="0"/>
+          </a:p>
+          <a:p>
+            <a:pPr lvl="1"/>
+            <a:endParaRPr lang="en-US" dirty="0"/>
+          </a:p>
+        </p:txBody>
+      </p:sp>
+      <p:pic>
+        <p:nvPicPr>
+          <p:cNvPr id="4" name="Graphic 3">
+            <a:extLst>
+              <a:ext uri="{FF2B5EF4-FFF2-40B4-BE49-F238E27FC236}">
+                <a16:creationId xmlns:a16="http://schemas.microsoft.com/office/drawing/2014/main" id="{C9213232-FC23-6E4C-BCDD-0E160939CC7D}"/>
+              </a:ext>
+            </a:extLst>
+          </p:cNvPr>
+          <p:cNvPicPr>
+            <a:picLocks noChangeAspect="1"/>
+          </p:cNvPicPr>
+          <p:nvPr/>
+        </p:nvPicPr>
+        <p:blipFill>
+          <a:blip r:embed="rId2">
+            <a:extLst>
+              <a:ext uri="{96DAC541-7B7A-43D3-8B79-37D633B846F1}">
+                <asvg:svgBlip xmlns:asvg="http://schemas.microsoft.com/office/drawing/2016/SVG/main" r:embed="rId3"/>
+              </a:ext>
+            </a:extLst>
+          </a:blip>
+          <a:stretch>
+            <a:fillRect/>
+          </a:stretch>
+        </p:blipFill>
+        <p:spPr>
+          <a:xfrm>
+            <a:off x="7753362" y="318180"/>
+            <a:ext cx="1070429" cy="1070429"/>
+          </a:xfrm>
+          <a:prstGeom prst="rect">
+            <a:avLst/>
+          </a:prstGeom>
+        </p:spPr>
+      </p:pic>
+    </p:spTree>
+    <p:extLst>
+      <p:ext uri="{BB962C8B-B14F-4D97-AF65-F5344CB8AC3E}">
+        <p14:creationId xmlns:p14="http://schemas.microsoft.com/office/powerpoint/2010/main" val="3909084000"/>
+      </p:ext>
+    </p:extLst>
+  </p:cSld>
+  <p:clrMapOvr>
+    <a:masterClrMapping/>
+  </p:clrMapOvr>
+</p:sld>
+</file>
+
+<file path=ppt/slides/slide49.xml><?xml version="1.0" encoding="utf-8"?>
+<p:sld xmlns:a="http://schemas.openxmlformats.org/drawingml/2006/main" xmlns:r="http://schemas.openxmlformats.org/officeDocument/2006/relationships" xmlns:p="http://schemas.openxmlformats.org/presentationml/2006/main">
+  <p:cSld>
+    <p:spTree>
+      <p:nvGrpSpPr>
+        <p:cNvPr id="1" name=""/>
+        <p:cNvGrpSpPr/>
+        <p:nvPr/>
+      </p:nvGrpSpPr>
+      <p:grpSpPr>
+        <a:xfrm>
+          <a:off x="0" y="0"/>
+          <a:ext cx="0" cy="0"/>
+          <a:chOff x="0" y="0"/>
+          <a:chExt cx="0" cy="0"/>
+        </a:xfrm>
+      </p:grpSpPr>
+      <p:sp>
+        <p:nvSpPr>
+          <p:cNvPr id="2" name="Title 1">
+            <a:extLst>
+              <a:ext uri="{FF2B5EF4-FFF2-40B4-BE49-F238E27FC236}">
                 <a16:creationId xmlns:a16="http://schemas.microsoft.com/office/drawing/2014/main" id="{94BCD4B4-C6C4-7540-AF96-329DB12BF4AC}"/>
               </a:ext>
             </a:extLst>
@@ -9209,7 +9407,167 @@
 </p:sld>
 </file>
 
-<file path=ppt/slides/slide49.xml><?xml version="1.0" encoding="utf-8"?>
+<file path=ppt/slides/slide5.xml><?xml version="1.0" encoding="utf-8"?>
+<p:sld xmlns:a="http://schemas.openxmlformats.org/drawingml/2006/main" xmlns:r="http://schemas.openxmlformats.org/officeDocument/2006/relationships" xmlns:p="http://schemas.openxmlformats.org/presentationml/2006/main">
+  <p:cSld>
+    <p:spTree>
+      <p:nvGrpSpPr>
+        <p:cNvPr id="1" name=""/>
+        <p:cNvGrpSpPr/>
+        <p:nvPr/>
+      </p:nvGrpSpPr>
+      <p:grpSpPr>
+        <a:xfrm>
+          <a:off x="0" y="0"/>
+          <a:ext cx="0" cy="0"/>
+          <a:chOff x="0" y="0"/>
+          <a:chExt cx="0" cy="0"/>
+        </a:xfrm>
+      </p:grpSpPr>
+      <p:sp>
+        <p:nvSpPr>
+          <p:cNvPr id="2" name="Title 1"/>
+          <p:cNvSpPr>
+            <a:spLocks noGrp="1"/>
+          </p:cNvSpPr>
+          <p:nvPr>
+            <p:ph type="title"/>
+          </p:nvPr>
+        </p:nvSpPr>
+        <p:spPr/>
+        <p:txBody>
+          <a:bodyPr/>
+          <a:lstStyle/>
+          <a:p>
+            <a:r>
+              <a:rPr lang="en-US" dirty="0"/>
+              <a:t>ELB</a:t>
+            </a:r>
+          </a:p>
+        </p:txBody>
+      </p:sp>
+      <p:sp>
+        <p:nvSpPr>
+          <p:cNvPr id="3" name="Content Placeholder 2"/>
+          <p:cNvSpPr>
+            <a:spLocks noGrp="1"/>
+          </p:cNvSpPr>
+          <p:nvPr>
+            <p:ph idx="1"/>
+          </p:nvPr>
+        </p:nvSpPr>
+        <p:spPr>
+          <a:xfrm>
+            <a:off x="457200" y="1600200"/>
+            <a:ext cx="8229600" cy="4884683"/>
+          </a:xfrm>
+        </p:spPr>
+        <p:txBody>
+          <a:bodyPr>
+            <a:normAutofit fontScale="77500" lnSpcReduction="20000"/>
+          </a:bodyPr>
+          <a:lstStyle/>
+          <a:p>
+            <a:r>
+              <a:rPr lang="en-US" dirty="0"/>
+              <a:t>Three different types:</a:t>
+            </a:r>
+          </a:p>
+          <a:p>
+            <a:pPr lvl="1"/>
+            <a:r>
+              <a:rPr lang="en-US" dirty="0"/>
+              <a:t>Application load balancer (we will use this one)</a:t>
+            </a:r>
+          </a:p>
+          <a:p>
+            <a:pPr lvl="1"/>
+            <a:r>
+              <a:rPr lang="en-US" dirty="0"/>
+              <a:t>Network load balancer</a:t>
+            </a:r>
+          </a:p>
+          <a:p>
+            <a:pPr lvl="1"/>
+            <a:r>
+              <a:rPr lang="en-US" dirty="0"/>
+              <a:t>Classic load balancer</a:t>
+            </a:r>
+          </a:p>
+          <a:p>
+            <a:pPr lvl="1"/>
+            <a:endParaRPr lang="en-US" dirty="0"/>
+          </a:p>
+          <a:p>
+            <a:r>
+              <a:rPr lang="en-US" dirty="0"/>
+              <a:t>Components:</a:t>
+            </a:r>
+          </a:p>
+          <a:p>
+            <a:pPr lvl="1"/>
+            <a:r>
+              <a:rPr lang="en-US" b="1" dirty="0"/>
+              <a:t>Listener</a:t>
+            </a:r>
+            <a:r>
+              <a:rPr lang="en-US" dirty="0"/>
+              <a:t>: handles requests from clients on a specified protocol and port then forwards to a target group</a:t>
+            </a:r>
+          </a:p>
+          <a:p>
+            <a:pPr lvl="1"/>
+            <a:endParaRPr lang="en-US" dirty="0"/>
+          </a:p>
+          <a:p>
+            <a:pPr lvl="1"/>
+            <a:r>
+              <a:rPr lang="en-US" b="1" dirty="0"/>
+              <a:t>Target group</a:t>
+            </a:r>
+            <a:r>
+              <a:rPr lang="en-US" dirty="0"/>
+              <a:t>: a set of registered targets (like EC2 instances) that the ELB can route requests to</a:t>
+            </a:r>
+          </a:p>
+          <a:p>
+            <a:pPr lvl="1"/>
+            <a:endParaRPr lang="en-US" dirty="0"/>
+          </a:p>
+          <a:p>
+            <a:pPr lvl="1"/>
+            <a:r>
+              <a:rPr lang="en-US" b="1" dirty="0" err="1"/>
+              <a:t>Healthcheck</a:t>
+            </a:r>
+            <a:r>
+              <a:rPr lang="en-US" dirty="0"/>
+              <a:t>: a periodic check which determines the availability of registered targets</a:t>
+            </a:r>
+          </a:p>
+          <a:p>
+            <a:pPr lvl="1"/>
+            <a:endParaRPr lang="en-US" dirty="0"/>
+          </a:p>
+          <a:p>
+            <a:endParaRPr lang="en-US" dirty="0"/>
+          </a:p>
+        </p:txBody>
+      </p:sp>
+    </p:spTree>
+    <p:extLst>
+      <p:ext uri="{BB962C8B-B14F-4D97-AF65-F5344CB8AC3E}">
+        <p14:creationId xmlns:p14="http://schemas.microsoft.com/office/powerpoint/2010/main" val="2090627441"/>
+      </p:ext>
+    </p:extLst>
+  </p:cSld>
+  <p:clrMapOvr>
+    <a:masterClrMapping/>
+  </p:clrMapOvr>
+</p:sld>
+</file>
+
+<file path=ppt/slides/slide50.xml><?xml version="1.0" encoding="utf-8"?>
 <p:sld xmlns:a="http://schemas.openxmlformats.org/drawingml/2006/main" xmlns:r="http://schemas.openxmlformats.org/officeDocument/2006/relationships" xmlns:p="http://schemas.openxmlformats.org/presentationml/2006/main">
   <p:cSld>
     <p:spTree>
@@ -9369,167 +9727,7 @@
 </p:sld>
 </file>
 
-<file path=ppt/slides/slide5.xml><?xml version="1.0" encoding="utf-8"?>
-<p:sld xmlns:a="http://schemas.openxmlformats.org/drawingml/2006/main" xmlns:r="http://schemas.openxmlformats.org/officeDocument/2006/relationships" xmlns:p="http://schemas.openxmlformats.org/presentationml/2006/main">
-  <p:cSld>
-    <p:spTree>
-      <p:nvGrpSpPr>
-        <p:cNvPr id="1" name=""/>
-        <p:cNvGrpSpPr/>
-        <p:nvPr/>
-      </p:nvGrpSpPr>
-      <p:grpSpPr>
-        <a:xfrm>
-          <a:off x="0" y="0"/>
-          <a:ext cx="0" cy="0"/>
-          <a:chOff x="0" y="0"/>
-          <a:chExt cx="0" cy="0"/>
-        </a:xfrm>
-      </p:grpSpPr>
-      <p:sp>
-        <p:nvSpPr>
-          <p:cNvPr id="2" name="Title 1"/>
-          <p:cNvSpPr>
-            <a:spLocks noGrp="1"/>
-          </p:cNvSpPr>
-          <p:nvPr>
-            <p:ph type="title"/>
-          </p:nvPr>
-        </p:nvSpPr>
-        <p:spPr/>
-        <p:txBody>
-          <a:bodyPr/>
-          <a:lstStyle/>
-          <a:p>
-            <a:r>
-              <a:rPr lang="en-US" dirty="0"/>
-              <a:t>ELB</a:t>
-            </a:r>
-          </a:p>
-        </p:txBody>
-      </p:sp>
-      <p:sp>
-        <p:nvSpPr>
-          <p:cNvPr id="3" name="Content Placeholder 2"/>
-          <p:cNvSpPr>
-            <a:spLocks noGrp="1"/>
-          </p:cNvSpPr>
-          <p:nvPr>
-            <p:ph idx="1"/>
-          </p:nvPr>
-        </p:nvSpPr>
-        <p:spPr>
-          <a:xfrm>
-            <a:off x="457200" y="1600200"/>
-            <a:ext cx="8229600" cy="4884683"/>
-          </a:xfrm>
-        </p:spPr>
-        <p:txBody>
-          <a:bodyPr>
-            <a:normAutofit fontScale="77500" lnSpcReduction="20000"/>
-          </a:bodyPr>
-          <a:lstStyle/>
-          <a:p>
-            <a:r>
-              <a:rPr lang="en-US" dirty="0"/>
-              <a:t>Three different types:</a:t>
-            </a:r>
-          </a:p>
-          <a:p>
-            <a:pPr lvl="1"/>
-            <a:r>
-              <a:rPr lang="en-US" dirty="0"/>
-              <a:t>Application load balancer (we will use this one)</a:t>
-            </a:r>
-          </a:p>
-          <a:p>
-            <a:pPr lvl="1"/>
-            <a:r>
-              <a:rPr lang="en-US" dirty="0"/>
-              <a:t>Network load balancer</a:t>
-            </a:r>
-          </a:p>
-          <a:p>
-            <a:pPr lvl="1"/>
-            <a:r>
-              <a:rPr lang="en-US" dirty="0"/>
-              <a:t>Classic load balancer</a:t>
-            </a:r>
-          </a:p>
-          <a:p>
-            <a:pPr lvl="1"/>
-            <a:endParaRPr lang="en-US" dirty="0"/>
-          </a:p>
-          <a:p>
-            <a:r>
-              <a:rPr lang="en-US" dirty="0"/>
-              <a:t>Components:</a:t>
-            </a:r>
-          </a:p>
-          <a:p>
-            <a:pPr lvl="1"/>
-            <a:r>
-              <a:rPr lang="en-US" b="1" dirty="0"/>
-              <a:t>Listener</a:t>
-            </a:r>
-            <a:r>
-              <a:rPr lang="en-US" dirty="0"/>
-              <a:t>: handles requests from clients on a specified protocol and port then forwards to a target group</a:t>
-            </a:r>
-          </a:p>
-          <a:p>
-            <a:pPr lvl="1"/>
-            <a:endParaRPr lang="en-US" dirty="0"/>
-          </a:p>
-          <a:p>
-            <a:pPr lvl="1"/>
-            <a:r>
-              <a:rPr lang="en-US" b="1" dirty="0"/>
-              <a:t>Target group</a:t>
-            </a:r>
-            <a:r>
-              <a:rPr lang="en-US" dirty="0"/>
-              <a:t>: a set of registered targets (like EC2 instances) that the ELB can route requests to</a:t>
-            </a:r>
-          </a:p>
-          <a:p>
-            <a:pPr lvl="1"/>
-            <a:endParaRPr lang="en-US" dirty="0"/>
-          </a:p>
-          <a:p>
-            <a:pPr lvl="1"/>
-            <a:r>
-              <a:rPr lang="en-US" b="1" dirty="0" err="1"/>
-              <a:t>Healthcheck</a:t>
-            </a:r>
-            <a:r>
-              <a:rPr lang="en-US" dirty="0"/>
-              <a:t>: a periodic check which determines the availability of registered targets</a:t>
-            </a:r>
-          </a:p>
-          <a:p>
-            <a:pPr lvl="1"/>
-            <a:endParaRPr lang="en-US" dirty="0"/>
-          </a:p>
-          <a:p>
-            <a:endParaRPr lang="en-US" dirty="0"/>
-          </a:p>
-        </p:txBody>
-      </p:sp>
-    </p:spTree>
-    <p:extLst>
-      <p:ext uri="{BB962C8B-B14F-4D97-AF65-F5344CB8AC3E}">
-        <p14:creationId xmlns:p14="http://schemas.microsoft.com/office/powerpoint/2010/main" val="2090627441"/>
-      </p:ext>
-    </p:extLst>
-  </p:cSld>
-  <p:clrMapOvr>
-    <a:masterClrMapping/>
-  </p:clrMapOvr>
-</p:sld>
-</file>
-
-<file path=ppt/slides/slide50.xml><?xml version="1.0" encoding="utf-8"?>
+<file path=ppt/slides/slide51.xml><?xml version="1.0" encoding="utf-8"?>
 <p:sld xmlns:a="http://schemas.openxmlformats.org/drawingml/2006/main" xmlns:r="http://schemas.openxmlformats.org/officeDocument/2006/relationships" xmlns:p="http://schemas.openxmlformats.org/presentationml/2006/main">
   <p:cSld>
     <p:spTree>
@@ -9699,7 +9897,7 @@
 </p:sld>
 </file>
 
-<file path=ppt/slides/slide51.xml><?xml version="1.0" encoding="utf-8"?>
+<file path=ppt/slides/slide52.xml><?xml version="1.0" encoding="utf-8"?>
 <p:sld xmlns:a="http://schemas.openxmlformats.org/drawingml/2006/main" xmlns:r="http://schemas.openxmlformats.org/officeDocument/2006/relationships" xmlns:p="http://schemas.openxmlformats.org/presentationml/2006/main">
   <p:cSld>
     <p:spTree>

</xml_diff>